<commit_message>
Presentation updates with experiments
</commit_message>
<xml_diff>
--- a/MidtermPresentation/MidtermPresentation.pptx
+++ b/MidtermPresentation/MidtermPresentation.pptx
@@ -6,13 +6,20 @@
   </p:sldMasterIdLst>
   <p:sldIdLst>
     <p:sldId id="256" r:id="rId2"/>
-    <p:sldId id="258" r:id="rId3"/>
-    <p:sldId id="259" r:id="rId4"/>
-    <p:sldId id="260" r:id="rId5"/>
-    <p:sldId id="261" r:id="rId6"/>
-    <p:sldId id="262" r:id="rId7"/>
-    <p:sldId id="263" r:id="rId8"/>
-    <p:sldId id="264" r:id="rId9"/>
+    <p:sldId id="265" r:id="rId3"/>
+    <p:sldId id="260" r:id="rId4"/>
+    <p:sldId id="261" r:id="rId5"/>
+    <p:sldId id="266" r:id="rId6"/>
+    <p:sldId id="267" r:id="rId7"/>
+    <p:sldId id="262" r:id="rId8"/>
+    <p:sldId id="268" r:id="rId9"/>
+    <p:sldId id="269" r:id="rId10"/>
+    <p:sldId id="263" r:id="rId11"/>
+    <p:sldId id="270" r:id="rId12"/>
+    <p:sldId id="271" r:id="rId13"/>
+    <p:sldId id="272" r:id="rId14"/>
+    <p:sldId id="273" r:id="rId15"/>
+    <p:sldId id="264" r:id="rId16"/>
   </p:sldIdLst>
   <p:sldSz cx="12192000" cy="6858000"/>
   <p:notesSz cx="6858000" cy="9144000"/>
@@ -111,6 +118,11 @@
       </a:defRPr>
     </a:lvl9pPr>
   </p:defaultTextStyle>
+  <p:extLst>
+    <p:ext uri="{EFAFB233-063F-42B5-8137-9DF3F51BA10A}">
+      <p15:sldGuideLst xmlns:p15="http://schemas.microsoft.com/office/powerpoint/2012/main"/>
+    </p:ext>
+  </p:extLst>
 </p:presentation>
 </file>
 
@@ -282,7 +294,7 @@
           <a:p>
             <a:fld id="{BC58CC46-0132-4CEE-ABDB-36235E875E40}" type="datetimeFigureOut">
               <a:rPr lang="en-US" smtClean="0"/>
-              <a:t>11/10/2016</a:t>
+              <a:t>11/14/2016</a:t>
             </a:fld>
             <a:endParaRPr lang="en-US"/>
           </a:p>
@@ -510,7 +522,7 @@
           <a:p>
             <a:fld id="{BC58CC46-0132-4CEE-ABDB-36235E875E40}" type="datetimeFigureOut">
               <a:rPr lang="en-US" smtClean="0"/>
-              <a:t>11/10/2016</a:t>
+              <a:t>11/14/2016</a:t>
             </a:fld>
             <a:endParaRPr lang="en-US"/>
           </a:p>
@@ -690,7 +702,7 @@
           <a:p>
             <a:fld id="{BC58CC46-0132-4CEE-ABDB-36235E875E40}" type="datetimeFigureOut">
               <a:rPr lang="en-US" smtClean="0"/>
-              <a:t>11/10/2016</a:t>
+              <a:t>11/14/2016</a:t>
             </a:fld>
             <a:endParaRPr lang="en-US"/>
           </a:p>
@@ -860,7 +872,7 @@
           <a:p>
             <a:fld id="{BC58CC46-0132-4CEE-ABDB-36235E875E40}" type="datetimeFigureOut">
               <a:rPr lang="en-US" smtClean="0"/>
-              <a:t>11/10/2016</a:t>
+              <a:t>11/14/2016</a:t>
             </a:fld>
             <a:endParaRPr lang="en-US"/>
           </a:p>
@@ -1114,7 +1126,7 @@
           <a:p>
             <a:fld id="{BC58CC46-0132-4CEE-ABDB-36235E875E40}" type="datetimeFigureOut">
               <a:rPr lang="en-US" smtClean="0"/>
-              <a:t>11/10/2016</a:t>
+              <a:t>11/14/2016</a:t>
             </a:fld>
             <a:endParaRPr lang="en-US"/>
           </a:p>
@@ -1440,7 +1452,7 @@
           <a:p>
             <a:fld id="{BC58CC46-0132-4CEE-ABDB-36235E875E40}" type="datetimeFigureOut">
               <a:rPr lang="en-US" smtClean="0"/>
-              <a:t>11/10/2016</a:t>
+              <a:t>11/14/2016</a:t>
             </a:fld>
             <a:endParaRPr lang="en-US"/>
           </a:p>
@@ -1891,7 +1903,7 @@
           <a:p>
             <a:fld id="{BC58CC46-0132-4CEE-ABDB-36235E875E40}" type="datetimeFigureOut">
               <a:rPr lang="en-US" smtClean="0"/>
-              <a:t>11/10/2016</a:t>
+              <a:t>11/14/2016</a:t>
             </a:fld>
             <a:endParaRPr lang="en-US"/>
           </a:p>
@@ -2009,7 +2021,7 @@
           <a:p>
             <a:fld id="{BC58CC46-0132-4CEE-ABDB-36235E875E40}" type="datetimeFigureOut">
               <a:rPr lang="en-US" smtClean="0"/>
-              <a:t>11/10/2016</a:t>
+              <a:t>11/14/2016</a:t>
             </a:fld>
             <a:endParaRPr lang="en-US"/>
           </a:p>
@@ -2104,7 +2116,7 @@
           <a:p>
             <a:fld id="{BC58CC46-0132-4CEE-ABDB-36235E875E40}" type="datetimeFigureOut">
               <a:rPr lang="en-US" smtClean="0"/>
-              <a:t>11/10/2016</a:t>
+              <a:t>11/14/2016</a:t>
             </a:fld>
             <a:endParaRPr lang="en-US"/>
           </a:p>
@@ -2391,7 +2403,7 @@
           <a:p>
             <a:fld id="{BC58CC46-0132-4CEE-ABDB-36235E875E40}" type="datetimeFigureOut">
               <a:rPr lang="en-US" smtClean="0"/>
-              <a:t>11/10/2016</a:t>
+              <a:t>11/14/2016</a:t>
             </a:fld>
             <a:endParaRPr lang="en-US"/>
           </a:p>
@@ -2713,7 +2725,7 @@
           <a:p>
             <a:fld id="{BC58CC46-0132-4CEE-ABDB-36235E875E40}" type="datetimeFigureOut">
               <a:rPr lang="en-US" smtClean="0"/>
-              <a:t>11/10/2016</a:t>
+              <a:t>11/14/2016</a:t>
             </a:fld>
             <a:endParaRPr lang="en-US"/>
           </a:p>
@@ -2967,7 +2979,7 @@
           <a:p>
             <a:fld id="{BC58CC46-0132-4CEE-ABDB-36235E875E40}" type="datetimeFigureOut">
               <a:rPr lang="en-US" smtClean="0"/>
-              <a:t>11/10/2016</a:t>
+              <a:t>11/14/2016</a:t>
             </a:fld>
             <a:endParaRPr lang="en-US"/>
           </a:p>
@@ -3547,6 +3559,898 @@
 </p:sld>
 </file>
 
+<file path=ppt/slides/slide10.xml><?xml version="1.0" encoding="utf-8"?>
+<p:sld xmlns:a="http://schemas.openxmlformats.org/drawingml/2006/main" xmlns:r="http://schemas.openxmlformats.org/officeDocument/2006/relationships" xmlns:p="http://schemas.openxmlformats.org/presentationml/2006/main">
+  <p:cSld>
+    <p:spTree>
+      <p:nvGrpSpPr>
+        <p:cNvPr id="1" name=""/>
+        <p:cNvGrpSpPr/>
+        <p:nvPr/>
+      </p:nvGrpSpPr>
+      <p:grpSpPr>
+        <a:xfrm>
+          <a:off x="0" y="0"/>
+          <a:ext cx="0" cy="0"/>
+          <a:chOff x="0" y="0"/>
+          <a:chExt cx="0" cy="0"/>
+        </a:xfrm>
+      </p:grpSpPr>
+      <p:sp>
+        <p:nvSpPr>
+          <p:cNvPr id="2" name="Title 1"/>
+          <p:cNvSpPr>
+            <a:spLocks noGrp="1"/>
+          </p:cNvSpPr>
+          <p:nvPr>
+            <p:ph type="title"/>
+          </p:nvPr>
+        </p:nvSpPr>
+        <p:spPr/>
+        <p:txBody>
+          <a:bodyPr/>
+          <a:lstStyle/>
+          <a:p>
+            <a:r>
+              <a:rPr lang="en-US" dirty="0"/>
+              <a:t>Experimentation</a:t>
+            </a:r>
+          </a:p>
+        </p:txBody>
+      </p:sp>
+      <p:sp>
+        <p:nvSpPr>
+          <p:cNvPr id="3" name="Content Placeholder 2"/>
+          <p:cNvSpPr>
+            <a:spLocks noGrp="1"/>
+          </p:cNvSpPr>
+          <p:nvPr>
+            <p:ph idx="1"/>
+          </p:nvPr>
+        </p:nvSpPr>
+        <p:spPr/>
+        <p:txBody>
+          <a:bodyPr/>
+          <a:lstStyle/>
+          <a:p>
+            <a:r>
+              <a:rPr lang="en-US" dirty="0"/>
+              <a:t>Refer back to your experimentation plans and refine them</a:t>
+            </a:r>
+          </a:p>
+          <a:p>
+            <a:r>
+              <a:rPr lang="en-US" dirty="0"/>
+              <a:t>What aspects of your systems performance will you measure?</a:t>
+            </a:r>
+          </a:p>
+          <a:p>
+            <a:endParaRPr lang="en-US" dirty="0"/>
+          </a:p>
+          <a:p>
+            <a:endParaRPr lang="en-US" dirty="0"/>
+          </a:p>
+          <a:p>
+            <a:endParaRPr lang="en-US" dirty="0"/>
+          </a:p>
+          <a:p>
+            <a:endParaRPr lang="en-US" dirty="0"/>
+          </a:p>
+          <a:p>
+            <a:r>
+              <a:rPr lang="en-US" dirty="0" err="1"/>
+              <a:t>Ashkan</a:t>
+            </a:r>
+            <a:r>
+              <a:rPr lang="en-US" dirty="0"/>
+              <a:t> &amp; Su [done]</a:t>
+            </a:r>
+          </a:p>
+          <a:p>
+            <a:pPr lvl="1"/>
+            <a:r>
+              <a:rPr lang="en-US" dirty="0"/>
+              <a:t>Grid experimentation</a:t>
+            </a:r>
+          </a:p>
+          <a:p>
+            <a:r>
+              <a:rPr lang="en-US" dirty="0" err="1"/>
+              <a:t>Suhas</a:t>
+            </a:r>
+            <a:endParaRPr lang="en-US" dirty="0"/>
+          </a:p>
+          <a:p>
+            <a:pPr lvl="1"/>
+            <a:r>
+              <a:rPr lang="en-US" dirty="0"/>
+              <a:t>Delay experimentation between gaze and dwell</a:t>
+            </a:r>
+          </a:p>
+        </p:txBody>
+      </p:sp>
+    </p:spTree>
+    <p:extLst>
+      <p:ext uri="{BB962C8B-B14F-4D97-AF65-F5344CB8AC3E}">
+        <p14:creationId xmlns:p14="http://schemas.microsoft.com/office/powerpoint/2010/main" val="4289142875"/>
+      </p:ext>
+    </p:extLst>
+  </p:cSld>
+  <p:clrMapOvr>
+    <a:masterClrMapping/>
+  </p:clrMapOvr>
+</p:sld>
+</file>
+
+<file path=ppt/slides/slide11.xml><?xml version="1.0" encoding="utf-8"?>
+<p:sld xmlns:a="http://schemas.openxmlformats.org/drawingml/2006/main" xmlns:r="http://schemas.openxmlformats.org/officeDocument/2006/relationships" xmlns:p="http://schemas.openxmlformats.org/presentationml/2006/main">
+  <p:cSld>
+    <p:spTree>
+      <p:nvGrpSpPr>
+        <p:cNvPr id="1" name=""/>
+        <p:cNvGrpSpPr/>
+        <p:nvPr/>
+      </p:nvGrpSpPr>
+      <p:grpSpPr>
+        <a:xfrm>
+          <a:off x="0" y="0"/>
+          <a:ext cx="0" cy="0"/>
+          <a:chOff x="0" y="0"/>
+          <a:chExt cx="0" cy="0"/>
+        </a:xfrm>
+      </p:grpSpPr>
+      <p:sp>
+        <p:nvSpPr>
+          <p:cNvPr id="2" name="Title 1"/>
+          <p:cNvSpPr>
+            <a:spLocks noGrp="1"/>
+          </p:cNvSpPr>
+          <p:nvPr>
+            <p:ph type="title"/>
+          </p:nvPr>
+        </p:nvSpPr>
+        <p:spPr/>
+        <p:txBody>
+          <a:bodyPr/>
+          <a:lstStyle/>
+          <a:p>
+            <a:r>
+              <a:rPr lang="en-US" dirty="0"/>
+              <a:t>Experimentation for the Textbox Size </a:t>
+            </a:r>
+          </a:p>
+        </p:txBody>
+      </p:sp>
+      <p:sp>
+        <p:nvSpPr>
+          <p:cNvPr id="3" name="Content Placeholder 2"/>
+          <p:cNvSpPr>
+            <a:spLocks noGrp="1"/>
+          </p:cNvSpPr>
+          <p:nvPr>
+            <p:ph idx="1"/>
+          </p:nvPr>
+        </p:nvSpPr>
+        <p:spPr/>
+        <p:txBody>
+          <a:bodyPr/>
+          <a:lstStyle/>
+          <a:p>
+            <a:r>
+              <a:rPr lang="en-US" dirty="0"/>
+              <a:t>Goal: Determining reasonable word spacing amount:</a:t>
+            </a:r>
+          </a:p>
+          <a:p>
+            <a:r>
+              <a:rPr lang="en-US" dirty="0"/>
+              <a:t>5 initial textbox sizes were selected  </a:t>
+            </a:r>
+          </a:p>
+        </p:txBody>
+      </p:sp>
+      <p:pic>
+        <p:nvPicPr>
+          <p:cNvPr id="4" name="Picture 3"/>
+          <p:cNvPicPr>
+            <a:picLocks noChangeAspect="1"/>
+          </p:cNvPicPr>
+          <p:nvPr/>
+        </p:nvPicPr>
+        <p:blipFill>
+          <a:blip r:embed="rId2">
+            <a:extLst>
+              <a:ext uri="{28A0092B-C50C-407E-A947-70E740481C1C}">
+                <a14:useLocalDpi xmlns:a14="http://schemas.microsoft.com/office/drawing/2010/main" val="0"/>
+              </a:ext>
+            </a:extLst>
+          </a:blip>
+          <a:stretch>
+            <a:fillRect/>
+          </a:stretch>
+        </p:blipFill>
+        <p:spPr>
+          <a:xfrm>
+            <a:off x="437610" y="3395009"/>
+            <a:ext cx="2743200" cy="1712455"/>
+          </a:xfrm>
+          <a:prstGeom prst="rect">
+            <a:avLst/>
+          </a:prstGeom>
+        </p:spPr>
+      </p:pic>
+      <p:pic>
+        <p:nvPicPr>
+          <p:cNvPr id="5" name="Picture 4"/>
+          <p:cNvPicPr>
+            <a:picLocks noChangeAspect="1"/>
+          </p:cNvPicPr>
+          <p:nvPr/>
+        </p:nvPicPr>
+        <p:blipFill>
+          <a:blip r:embed="rId3">
+            <a:extLst>
+              <a:ext uri="{28A0092B-C50C-407E-A947-70E740481C1C}">
+                <a14:useLocalDpi xmlns:a14="http://schemas.microsoft.com/office/drawing/2010/main" val="0"/>
+              </a:ext>
+            </a:extLst>
+          </a:blip>
+          <a:stretch>
+            <a:fillRect/>
+          </a:stretch>
+        </p:blipFill>
+        <p:spPr>
+          <a:xfrm>
+            <a:off x="3775821" y="3386894"/>
+            <a:ext cx="2743200" cy="1728683"/>
+          </a:xfrm>
+          <a:prstGeom prst="rect">
+            <a:avLst/>
+          </a:prstGeom>
+        </p:spPr>
+      </p:pic>
+      <p:pic>
+        <p:nvPicPr>
+          <p:cNvPr id="6" name="Picture 5"/>
+          <p:cNvPicPr>
+            <a:picLocks noChangeAspect="1"/>
+          </p:cNvPicPr>
+          <p:nvPr/>
+        </p:nvPicPr>
+        <p:blipFill>
+          <a:blip r:embed="rId4">
+            <a:extLst>
+              <a:ext uri="{28A0092B-C50C-407E-A947-70E740481C1C}">
+                <a14:useLocalDpi xmlns:a14="http://schemas.microsoft.com/office/drawing/2010/main" val="0"/>
+              </a:ext>
+            </a:extLst>
+          </a:blip>
+          <a:stretch>
+            <a:fillRect/>
+          </a:stretch>
+        </p:blipFill>
+        <p:spPr>
+          <a:xfrm>
+            <a:off x="7254102" y="3395009"/>
+            <a:ext cx="2743200" cy="1734576"/>
+          </a:xfrm>
+          <a:prstGeom prst="rect">
+            <a:avLst/>
+          </a:prstGeom>
+        </p:spPr>
+      </p:pic>
+      <p:sp>
+        <p:nvSpPr>
+          <p:cNvPr id="7" name="TextBox 6"/>
+          <p:cNvSpPr txBox="1"/>
+          <p:nvPr/>
+        </p:nvSpPr>
+        <p:spPr>
+          <a:xfrm>
+            <a:off x="890327" y="5280211"/>
+            <a:ext cx="1837765" cy="369332"/>
+          </a:xfrm>
+          <a:prstGeom prst="rect">
+            <a:avLst/>
+          </a:prstGeom>
+          <a:noFill/>
+        </p:spPr>
+        <p:txBody>
+          <a:bodyPr wrap="square" rtlCol="0">
+            <a:spAutoFit/>
+          </a:bodyPr>
+          <a:lstStyle/>
+          <a:p>
+            <a:r>
+              <a:rPr lang="en-US" dirty="0"/>
+              <a:t>11 * 5 grid line</a:t>
+            </a:r>
+          </a:p>
+        </p:txBody>
+      </p:sp>
+      <p:sp>
+        <p:nvSpPr>
+          <p:cNvPr id="8" name="TextBox 7"/>
+          <p:cNvSpPr txBox="1"/>
+          <p:nvPr/>
+        </p:nvSpPr>
+        <p:spPr>
+          <a:xfrm>
+            <a:off x="4228538" y="5298141"/>
+            <a:ext cx="1837765" cy="369332"/>
+          </a:xfrm>
+          <a:prstGeom prst="rect">
+            <a:avLst/>
+          </a:prstGeom>
+          <a:noFill/>
+        </p:spPr>
+        <p:txBody>
+          <a:bodyPr wrap="square" rtlCol="0">
+            <a:spAutoFit/>
+          </a:bodyPr>
+          <a:lstStyle/>
+          <a:p>
+            <a:r>
+              <a:rPr lang="en-US" dirty="0"/>
+              <a:t>11 * 9 grid line</a:t>
+            </a:r>
+          </a:p>
+        </p:txBody>
+      </p:sp>
+      <p:sp>
+        <p:nvSpPr>
+          <p:cNvPr id="9" name="TextBox 8"/>
+          <p:cNvSpPr txBox="1"/>
+          <p:nvPr/>
+        </p:nvSpPr>
+        <p:spPr>
+          <a:xfrm>
+            <a:off x="7706819" y="5285583"/>
+            <a:ext cx="1912310" cy="369332"/>
+          </a:xfrm>
+          <a:prstGeom prst="rect">
+            <a:avLst/>
+          </a:prstGeom>
+          <a:noFill/>
+        </p:spPr>
+        <p:txBody>
+          <a:bodyPr wrap="square" rtlCol="0">
+            <a:spAutoFit/>
+          </a:bodyPr>
+          <a:lstStyle/>
+          <a:p>
+            <a:r>
+              <a:rPr lang="en-US" dirty="0"/>
+              <a:t>11 * 11 grid line</a:t>
+            </a:r>
+          </a:p>
+        </p:txBody>
+      </p:sp>
+    </p:spTree>
+    <p:extLst>
+      <p:ext uri="{BB962C8B-B14F-4D97-AF65-F5344CB8AC3E}">
+        <p14:creationId xmlns:p14="http://schemas.microsoft.com/office/powerpoint/2010/main" val="3628369559"/>
+      </p:ext>
+    </p:extLst>
+  </p:cSld>
+  <p:clrMapOvr>
+    <a:masterClrMapping/>
+  </p:clrMapOvr>
+</p:sld>
+</file>
+
+<file path=ppt/slides/slide12.xml><?xml version="1.0" encoding="utf-8"?>
+<p:sld xmlns:a="http://schemas.openxmlformats.org/drawingml/2006/main" xmlns:r="http://schemas.openxmlformats.org/officeDocument/2006/relationships" xmlns:p="http://schemas.openxmlformats.org/presentationml/2006/main">
+  <p:cSld>
+    <p:spTree>
+      <p:nvGrpSpPr>
+        <p:cNvPr id="1" name=""/>
+        <p:cNvGrpSpPr/>
+        <p:nvPr/>
+      </p:nvGrpSpPr>
+      <p:grpSpPr>
+        <a:xfrm>
+          <a:off x="0" y="0"/>
+          <a:ext cx="0" cy="0"/>
+          <a:chOff x="0" y="0"/>
+          <a:chExt cx="0" cy="0"/>
+        </a:xfrm>
+      </p:grpSpPr>
+      <p:sp>
+        <p:nvSpPr>
+          <p:cNvPr id="2" name="Title 1"/>
+          <p:cNvSpPr>
+            <a:spLocks noGrp="1"/>
+          </p:cNvSpPr>
+          <p:nvPr>
+            <p:ph type="title"/>
+          </p:nvPr>
+        </p:nvSpPr>
+        <p:spPr/>
+        <p:txBody>
+          <a:bodyPr/>
+          <a:lstStyle/>
+          <a:p>
+            <a:r>
+              <a:rPr lang="en-US" dirty="0"/>
+              <a:t>Experimentation for the Textbox Size </a:t>
+            </a:r>
+          </a:p>
+        </p:txBody>
+      </p:sp>
+      <mc:AlternateContent xmlns:mc="http://schemas.openxmlformats.org/markup-compatibility/2006" xmlns:a14="http://schemas.microsoft.com/office/drawing/2010/main">
+        <mc:Choice Requires="a14">
+          <p:sp>
+            <p:nvSpPr>
+              <p:cNvPr id="3" name="Content Placeholder 2"/>
+              <p:cNvSpPr>
+                <a:spLocks noGrp="1"/>
+              </p:cNvSpPr>
+              <p:nvPr>
+                <p:ph idx="1"/>
+              </p:nvPr>
+            </p:nvSpPr>
+            <p:spPr/>
+            <p:txBody>
+              <a:bodyPr/>
+              <a:lstStyle/>
+              <a:p>
+                <a:r>
+                  <a:rPr lang="en-US" dirty="0"/>
+                  <a:t>Goal: Determining reasonable textbox size:</a:t>
+                </a:r>
+              </a:p>
+              <a:p>
+                <a:r>
+                  <a:rPr lang="en-US" dirty="0"/>
+                  <a:t>The accuracy for each textbox sized were calculated</a:t>
+                </a:r>
+              </a:p>
+              <a:p>
+                <a:r>
+                  <a:rPr lang="en-US" dirty="0"/>
+                  <a:t>  </a:t>
+                </a:r>
+                <a14:m>
+                  <m:oMath xmlns:m="http://schemas.openxmlformats.org/officeDocument/2006/math">
+                    <m:r>
+                      <a:rPr lang="en-US" b="0" i="1" smtClean="0">
+                        <a:latin typeface="Cambria Math" panose="02040503050406030204" pitchFamily="18" charset="0"/>
+                      </a:rPr>
+                      <m:t>𝐴𝑐𝑢𝑟𝑎𝑐𝑦</m:t>
+                    </m:r>
+                    <m:r>
+                      <a:rPr lang="en-US" b="0" i="1" smtClean="0">
+                        <a:latin typeface="Cambria Math" panose="02040503050406030204" pitchFamily="18" charset="0"/>
+                      </a:rPr>
+                      <m:t>= </m:t>
+                    </m:r>
+                    <m:f>
+                      <m:fPr>
+                        <m:ctrlPr>
+                          <a:rPr lang="en-US" b="0" i="1" smtClean="0">
+                            <a:latin typeface="Cambria Math" panose="02040503050406030204" pitchFamily="18" charset="0"/>
+                          </a:rPr>
+                        </m:ctrlPr>
+                      </m:fPr>
+                      <m:num>
+                        <m:r>
+                          <a:rPr lang="en-US" b="0" i="1" smtClean="0">
+                            <a:latin typeface="Cambria Math" panose="02040503050406030204" pitchFamily="18" charset="0"/>
+                          </a:rPr>
+                          <m:t>𝐶𝑜𝑟𝑟𝑒𝑐𝑙𝑦</m:t>
+                        </m:r>
+                        <m:r>
+                          <a:rPr lang="en-US" b="0" i="1" smtClean="0">
+                            <a:latin typeface="Cambria Math" panose="02040503050406030204" pitchFamily="18" charset="0"/>
+                          </a:rPr>
+                          <m:t> </m:t>
+                        </m:r>
+                        <m:r>
+                          <a:rPr lang="en-US" b="0" i="1" smtClean="0">
+                            <a:latin typeface="Cambria Math" panose="02040503050406030204" pitchFamily="18" charset="0"/>
+                          </a:rPr>
+                          <m:t>𝑑𝑒𝑡𝑒𝑐𝑡𝑒𝑑</m:t>
+                        </m:r>
+                        <m:r>
+                          <a:rPr lang="en-US" b="0" i="1" smtClean="0">
+                            <a:latin typeface="Cambria Math" panose="02040503050406030204" pitchFamily="18" charset="0"/>
+                          </a:rPr>
+                          <m:t> </m:t>
+                        </m:r>
+                        <m:r>
+                          <a:rPr lang="en-US" b="0" i="1" smtClean="0">
+                            <a:latin typeface="Cambria Math" panose="02040503050406030204" pitchFamily="18" charset="0"/>
+                          </a:rPr>
+                          <m:t>𝑤𝑜𝑟𝑑</m:t>
+                        </m:r>
+                      </m:num>
+                      <m:den>
+                        <m:r>
+                          <a:rPr lang="en-US" b="0" i="1" smtClean="0">
+                            <a:latin typeface="Cambria Math" panose="02040503050406030204" pitchFamily="18" charset="0"/>
+                          </a:rPr>
+                          <m:t>𝑇𝑜𝑡𝑎𝑙</m:t>
+                        </m:r>
+                        <m:r>
+                          <a:rPr lang="en-US" b="0" i="1" smtClean="0">
+                            <a:latin typeface="Cambria Math" panose="02040503050406030204" pitchFamily="18" charset="0"/>
+                          </a:rPr>
+                          <m:t> </m:t>
+                        </m:r>
+                        <m:r>
+                          <a:rPr lang="en-US" b="0" i="1" smtClean="0">
+                            <a:latin typeface="Cambria Math" panose="02040503050406030204" pitchFamily="18" charset="0"/>
+                          </a:rPr>
+                          <m:t>𝑛𝑢𝑚𝑏𝑒𝑟</m:t>
+                        </m:r>
+                        <m:r>
+                          <a:rPr lang="en-US" b="0" i="1" smtClean="0">
+                            <a:latin typeface="Cambria Math" panose="02040503050406030204" pitchFamily="18" charset="0"/>
+                          </a:rPr>
+                          <m:t> </m:t>
+                        </m:r>
+                        <m:r>
+                          <a:rPr lang="en-US" b="0" i="1" smtClean="0">
+                            <a:latin typeface="Cambria Math" panose="02040503050406030204" pitchFamily="18" charset="0"/>
+                          </a:rPr>
+                          <m:t>𝑜𝑓</m:t>
+                        </m:r>
+                        <m:r>
+                          <a:rPr lang="en-US" b="0" i="1" smtClean="0">
+                            <a:latin typeface="Cambria Math" panose="02040503050406030204" pitchFamily="18" charset="0"/>
+                          </a:rPr>
+                          <m:t> </m:t>
+                        </m:r>
+                        <m:r>
+                          <a:rPr lang="en-US" b="0" i="1" smtClean="0">
+                            <a:latin typeface="Cambria Math" panose="02040503050406030204" pitchFamily="18" charset="0"/>
+                          </a:rPr>
+                          <m:t>𝑤𝑜𝑟𝑑</m:t>
+                        </m:r>
+                      </m:den>
+                    </m:f>
+                  </m:oMath>
+                </a14:m>
+                <a:endParaRPr lang="en-US" dirty="0"/>
+              </a:p>
+            </p:txBody>
+          </p:sp>
+        </mc:Choice>
+        <mc:Fallback xmlns="">
+          <p:sp>
+            <p:nvSpPr>
+              <p:cNvPr id="3" name="Content Placeholder 2"/>
+              <p:cNvSpPr>
+                <a:spLocks noGrp="1" noRot="1" noChangeAspect="1" noMove="1" noResize="1" noEditPoints="1" noAdjustHandles="1" noChangeArrowheads="1" noChangeShapeType="1" noTextEdit="1"/>
+              </p:cNvSpPr>
+              <p:nvPr>
+                <p:ph idx="1"/>
+              </p:nvPr>
+            </p:nvSpPr>
+            <p:spPr>
+              <a:blipFill rotWithShape="0">
+                <a:blip r:embed="rId2"/>
+                <a:stretch>
+                  <a:fillRect l="-142" t="-980"/>
+                </a:stretch>
+              </a:blipFill>
+            </p:spPr>
+            <p:txBody>
+              <a:bodyPr/>
+              <a:lstStyle/>
+              <a:p>
+                <a:r>
+                  <a:rPr lang="en-US">
+                    <a:noFill/>
+                  </a:rPr>
+                  <a:t> </a:t>
+                </a:r>
+              </a:p>
+            </p:txBody>
+          </p:sp>
+        </mc:Fallback>
+      </mc:AlternateContent>
+    </p:spTree>
+    <p:extLst>
+      <p:ext uri="{BB962C8B-B14F-4D97-AF65-F5344CB8AC3E}">
+        <p14:creationId xmlns:p14="http://schemas.microsoft.com/office/powerpoint/2010/main" val="2269370597"/>
+      </p:ext>
+    </p:extLst>
+  </p:cSld>
+  <p:clrMapOvr>
+    <a:masterClrMapping/>
+  </p:clrMapOvr>
+</p:sld>
+</file>
+
+<file path=ppt/slides/slide13.xml><?xml version="1.0" encoding="utf-8"?>
+<p:sld xmlns:a="http://schemas.openxmlformats.org/drawingml/2006/main" xmlns:r="http://schemas.openxmlformats.org/officeDocument/2006/relationships" xmlns:p="http://schemas.openxmlformats.org/presentationml/2006/main">
+  <p:cSld>
+    <p:spTree>
+      <p:nvGrpSpPr>
+        <p:cNvPr id="1" name=""/>
+        <p:cNvGrpSpPr/>
+        <p:nvPr/>
+      </p:nvGrpSpPr>
+      <p:grpSpPr>
+        <a:xfrm>
+          <a:off x="0" y="0"/>
+          <a:ext cx="0" cy="0"/>
+          <a:chOff x="0" y="0"/>
+          <a:chExt cx="0" cy="0"/>
+        </a:xfrm>
+      </p:grpSpPr>
+      <p:sp>
+        <p:nvSpPr>
+          <p:cNvPr id="2" name="Title 1"/>
+          <p:cNvSpPr>
+            <a:spLocks noGrp="1"/>
+          </p:cNvSpPr>
+          <p:nvPr>
+            <p:ph type="title"/>
+          </p:nvPr>
+        </p:nvSpPr>
+        <p:spPr/>
+        <p:txBody>
+          <a:bodyPr/>
+          <a:lstStyle/>
+          <a:p>
+            <a:r>
+              <a:rPr lang="en-US" dirty="0"/>
+              <a:t>Experiment for the Delay Amounts</a:t>
+            </a:r>
+          </a:p>
+        </p:txBody>
+      </p:sp>
+      <p:sp>
+        <p:nvSpPr>
+          <p:cNvPr id="3" name="Content Placeholder 2"/>
+          <p:cNvSpPr>
+            <a:spLocks noGrp="1"/>
+          </p:cNvSpPr>
+          <p:nvPr>
+            <p:ph idx="1"/>
+          </p:nvPr>
+        </p:nvSpPr>
+        <p:spPr/>
+        <p:txBody>
+          <a:bodyPr/>
+          <a:lstStyle/>
+          <a:p>
+            <a:r>
+              <a:rPr lang="en-US" dirty="0"/>
+              <a:t>Goal: Determine reasonable delay</a:t>
+            </a:r>
+          </a:p>
+          <a:p>
+            <a:pPr lvl="1"/>
+            <a:r>
+              <a:rPr lang="en-US" dirty="0"/>
+              <a:t>Delay governs when text is activated</a:t>
+            </a:r>
+          </a:p>
+          <a:p>
+            <a:r>
+              <a:rPr lang="en-US" dirty="0"/>
+              <a:t>Setup various amounts of manual delay:</a:t>
+            </a:r>
+          </a:p>
+          <a:p>
+            <a:pPr lvl="1"/>
+            <a:r>
+              <a:rPr lang="en-US" dirty="0"/>
+              <a:t>Delay in milliseconds: 250, 500, 750, 1000</a:t>
+            </a:r>
+          </a:p>
+          <a:p>
+            <a:r>
+              <a:rPr lang="en-US" dirty="0"/>
+              <a:t>Ask participants to read segment of text where is word requires delay to activate</a:t>
+            </a:r>
+          </a:p>
+          <a:p>
+            <a:r>
+              <a:rPr lang="en-US" dirty="0"/>
+              <a:t>Participants rate user experience on Likert Scale of 1 to 5</a:t>
+            </a:r>
+          </a:p>
+          <a:p>
+            <a:pPr lvl="1"/>
+            <a:r>
+              <a:rPr lang="en-US" dirty="0"/>
+              <a:t>Require participants to provide feedback explaining choice</a:t>
+            </a:r>
+          </a:p>
+          <a:p>
+            <a:pPr lvl="1"/>
+            <a:r>
+              <a:rPr lang="en-US" dirty="0"/>
+              <a:t>Plan to choose average amount as acceptable delay</a:t>
+            </a:r>
+          </a:p>
+        </p:txBody>
+      </p:sp>
+    </p:spTree>
+    <p:extLst>
+      <p:ext uri="{BB962C8B-B14F-4D97-AF65-F5344CB8AC3E}">
+        <p14:creationId xmlns:p14="http://schemas.microsoft.com/office/powerpoint/2010/main" val="738672203"/>
+      </p:ext>
+    </p:extLst>
+  </p:cSld>
+  <p:clrMapOvr>
+    <a:masterClrMapping/>
+  </p:clrMapOvr>
+</p:sld>
+</file>
+
+<file path=ppt/slides/slide14.xml><?xml version="1.0" encoding="utf-8"?>
+<p:sld xmlns:a="http://schemas.openxmlformats.org/drawingml/2006/main" xmlns:r="http://schemas.openxmlformats.org/officeDocument/2006/relationships" xmlns:p="http://schemas.openxmlformats.org/presentationml/2006/main">
+  <p:cSld>
+    <p:spTree>
+      <p:nvGrpSpPr>
+        <p:cNvPr id="1" name=""/>
+        <p:cNvGrpSpPr/>
+        <p:nvPr/>
+      </p:nvGrpSpPr>
+      <p:grpSpPr>
+        <a:xfrm>
+          <a:off x="0" y="0"/>
+          <a:ext cx="0" cy="0"/>
+          <a:chOff x="0" y="0"/>
+          <a:chExt cx="0" cy="0"/>
+        </a:xfrm>
+      </p:grpSpPr>
+      <p:sp>
+        <p:nvSpPr>
+          <p:cNvPr id="2" name="Title 1"/>
+          <p:cNvSpPr>
+            <a:spLocks noGrp="1"/>
+          </p:cNvSpPr>
+          <p:nvPr>
+            <p:ph type="title"/>
+          </p:nvPr>
+        </p:nvSpPr>
+        <p:spPr/>
+        <p:txBody>
+          <a:bodyPr/>
+          <a:lstStyle/>
+          <a:p>
+            <a:r>
+              <a:rPr lang="en-US" dirty="0"/>
+              <a:t>Experiment </a:t>
+            </a:r>
+          </a:p>
+        </p:txBody>
+      </p:sp>
+      <p:sp>
+        <p:nvSpPr>
+          <p:cNvPr id="3" name="Content Placeholder 2"/>
+          <p:cNvSpPr>
+            <a:spLocks noGrp="1"/>
+          </p:cNvSpPr>
+          <p:nvPr>
+            <p:ph idx="1"/>
+          </p:nvPr>
+        </p:nvSpPr>
+        <p:spPr/>
+        <p:txBody>
+          <a:bodyPr/>
+          <a:lstStyle/>
+          <a:p>
+            <a:endParaRPr lang="en-US"/>
+          </a:p>
+        </p:txBody>
+      </p:sp>
+    </p:spTree>
+    <p:extLst>
+      <p:ext uri="{BB962C8B-B14F-4D97-AF65-F5344CB8AC3E}">
+        <p14:creationId xmlns:p14="http://schemas.microsoft.com/office/powerpoint/2010/main" val="3194865933"/>
+      </p:ext>
+    </p:extLst>
+  </p:cSld>
+  <p:clrMapOvr>
+    <a:masterClrMapping/>
+  </p:clrMapOvr>
+</p:sld>
+</file>
+
+<file path=ppt/slides/slide15.xml><?xml version="1.0" encoding="utf-8"?>
+<p:sld xmlns:a="http://schemas.openxmlformats.org/drawingml/2006/main" xmlns:r="http://schemas.openxmlformats.org/officeDocument/2006/relationships" xmlns:p="http://schemas.openxmlformats.org/presentationml/2006/main">
+  <p:cSld>
+    <p:spTree>
+      <p:nvGrpSpPr>
+        <p:cNvPr id="1" name=""/>
+        <p:cNvGrpSpPr/>
+        <p:nvPr/>
+      </p:nvGrpSpPr>
+      <p:grpSpPr>
+        <a:xfrm>
+          <a:off x="0" y="0"/>
+          <a:ext cx="0" cy="0"/>
+          <a:chOff x="0" y="0"/>
+          <a:chExt cx="0" cy="0"/>
+        </a:xfrm>
+      </p:grpSpPr>
+      <p:sp>
+        <p:nvSpPr>
+          <p:cNvPr id="2" name="Title 1"/>
+          <p:cNvSpPr>
+            <a:spLocks noGrp="1"/>
+          </p:cNvSpPr>
+          <p:nvPr>
+            <p:ph type="title"/>
+          </p:nvPr>
+        </p:nvSpPr>
+        <p:spPr/>
+        <p:txBody>
+          <a:bodyPr/>
+          <a:lstStyle/>
+          <a:p>
+            <a:r>
+              <a:rPr lang="en-US" dirty="0"/>
+              <a:t>Demo</a:t>
+            </a:r>
+          </a:p>
+        </p:txBody>
+      </p:sp>
+      <p:sp>
+        <p:nvSpPr>
+          <p:cNvPr id="3" name="Content Placeholder 2"/>
+          <p:cNvSpPr>
+            <a:spLocks noGrp="1"/>
+          </p:cNvSpPr>
+          <p:nvPr>
+            <p:ph idx="1"/>
+          </p:nvPr>
+        </p:nvSpPr>
+        <p:spPr/>
+        <p:txBody>
+          <a:bodyPr/>
+          <a:lstStyle/>
+          <a:p>
+            <a:r>
+              <a:rPr lang="en-US" dirty="0"/>
+              <a:t>Show what you have accomplished thus far</a:t>
+            </a:r>
+          </a:p>
+          <a:p>
+            <a:r>
+              <a:rPr lang="en-US" dirty="0"/>
+              <a:t>I expect to see the basic functionality of your system up and running</a:t>
+            </a:r>
+          </a:p>
+          <a:p>
+            <a:endParaRPr lang="en-US" dirty="0"/>
+          </a:p>
+          <a:p>
+            <a:endParaRPr lang="en-US" dirty="0"/>
+          </a:p>
+          <a:p>
+            <a:r>
+              <a:rPr lang="en-US" dirty="0" err="1"/>
+              <a:t>Suhas</a:t>
+            </a:r>
+            <a:r>
+              <a:rPr lang="en-US" dirty="0"/>
+              <a:t>’ computer</a:t>
+            </a:r>
+          </a:p>
+        </p:txBody>
+      </p:sp>
+    </p:spTree>
+    <p:extLst>
+      <p:ext uri="{BB962C8B-B14F-4D97-AF65-F5344CB8AC3E}">
+        <p14:creationId xmlns:p14="http://schemas.microsoft.com/office/powerpoint/2010/main" val="4098738424"/>
+      </p:ext>
+    </p:extLst>
+  </p:cSld>
+  <p:clrMapOvr>
+    <a:masterClrMapping/>
+  </p:clrMapOvr>
+</p:sld>
+</file>
+
 <file path=ppt/slides/slide2.xml><?xml version="1.0" encoding="utf-8"?>
 <p:sld xmlns:a="http://schemas.openxmlformats.org/drawingml/2006/main" xmlns:r="http://schemas.openxmlformats.org/officeDocument/2006/relationships" xmlns:p="http://schemas.openxmlformats.org/presentationml/2006/main">
   <p:cSld>
@@ -3596,39 +4500,105 @@
             <p:ph idx="1"/>
           </p:nvPr>
         </p:nvSpPr>
-        <p:spPr/>
-        <p:txBody>
-          <a:bodyPr/>
-          <a:lstStyle/>
-          <a:p>
-            <a:r>
-              <a:rPr lang="en-US" dirty="0"/>
-              <a:t>A clear description of the problem that you are trying to solve</a:t>
+        <p:spPr>
+          <a:xfrm>
+            <a:off x="1261872" y="1828800"/>
+            <a:ext cx="8595360" cy="3801035"/>
+          </a:xfrm>
+        </p:spPr>
+        <p:txBody>
+          <a:bodyPr>
+            <a:normAutofit/>
+          </a:bodyPr>
+          <a:lstStyle/>
+          <a:p>
+            <a:r>
+              <a:rPr lang="en-US" dirty="0"/>
+              <a:t>Converting the eye tracking into the precision text highlighting (tracking) during reading:</a:t>
+            </a:r>
+          </a:p>
+          <a:p>
+            <a:pPr marL="342900" indent="-342900">
+              <a:buFont typeface="+mj-lt"/>
+              <a:buAutoNum type="arabicPeriod"/>
+            </a:pPr>
+            <a:r>
+              <a:rPr lang="en-US" dirty="0"/>
+              <a:t>Appropriate User Interaction:</a:t>
             </a:r>
           </a:p>
           <a:p>
             <a:pPr lvl="1"/>
             <a:r>
               <a:rPr lang="en-US" dirty="0"/>
-              <a:t>focus on the specific aspects of your problem</a:t>
-            </a:r>
-          </a:p>
-          <a:p>
-            <a:endParaRPr lang="en-US" dirty="0"/>
-          </a:p>
-          <a:p>
+              <a:t>Gaze Trace options: Touch at gaze, Scroll at gaze, Mouse wrap on move, ….</a:t>
+            </a:r>
+          </a:p>
+          <a:p>
+            <a:pPr lvl="2"/>
+            <a:r>
+              <a:rPr lang="en-US" dirty="0"/>
+              <a:t>Text detection:</a:t>
+            </a:r>
+          </a:p>
+          <a:p>
+            <a:pPr lvl="3"/>
+            <a:r>
+              <a:rPr lang="en-US" dirty="0"/>
+              <a:t>Object characteristics: Shape, Dynamic or fix, Size</a:t>
+            </a:r>
+          </a:p>
+          <a:p>
+            <a:pPr marL="342900" indent="-342900">
+              <a:buFont typeface="+mj-lt"/>
+              <a:buAutoNum type="arabicPeriod"/>
+            </a:pPr>
+            <a:r>
+              <a:rPr lang="en-US" dirty="0"/>
+              <a:t>Action after detecting the text:</a:t>
+            </a:r>
+          </a:p>
+          <a:p>
+            <a:pPr lvl="1"/>
+            <a:r>
+              <a:rPr lang="en-US" dirty="0"/>
+              <a:t>Click a button to do something on the detected object</a:t>
+            </a:r>
+          </a:p>
+          <a:p>
+            <a:pPr marL="342900" indent="-342900">
+              <a:buFont typeface="+mj-lt"/>
+              <a:buAutoNum type="arabicPeriod"/>
+            </a:pPr>
+            <a:r>
+              <a:rPr lang="en-US" dirty="0"/>
+              <a:t>Limitation of the </a:t>
+            </a:r>
             <a:r>
               <a:rPr lang="en-US" dirty="0" err="1"/>
-              <a:t>Ashkan</a:t>
-            </a:r>
-            <a:endParaRPr lang="en-US" dirty="0"/>
+              <a:t>Tobii</a:t>
+            </a:r>
+            <a:r>
+              <a:rPr lang="en-US" dirty="0"/>
+              <a:t> eye engine</a:t>
+            </a:r>
+          </a:p>
+          <a:p>
+            <a:pPr marL="342900" indent="-342900">
+              <a:buFont typeface="+mj-lt"/>
+              <a:buAutoNum type="arabicPeriod"/>
+            </a:pPr>
+            <a:r>
+              <a:rPr lang="en-US" dirty="0"/>
+              <a:t>Speed of reading</a:t>
+            </a:r>
           </a:p>
         </p:txBody>
       </p:sp>
     </p:spTree>
     <p:extLst>
       <p:ext uri="{BB962C8B-B14F-4D97-AF65-F5344CB8AC3E}">
-        <p14:creationId xmlns:p14="http://schemas.microsoft.com/office/powerpoint/2010/main" val="1942710014"/>
+        <p14:creationId xmlns:p14="http://schemas.microsoft.com/office/powerpoint/2010/main" val="2461271802"/>
       </p:ext>
     </p:extLst>
   </p:cSld>
@@ -3672,7 +4642,7 @@
           <a:p>
             <a:r>
               <a:rPr lang="en-US" dirty="0"/>
-              <a:t>Example of Problem Formulation</a:t>
+              <a:t>Approach</a:t>
             </a:r>
           </a:p>
         </p:txBody>
@@ -3693,155 +4663,41 @@
           <a:lstStyle/>
           <a:p>
             <a:r>
-              <a:rPr lang="en-US" b="1" dirty="0"/>
-              <a:t>description</a:t>
+              <a:rPr lang="en-US" dirty="0"/>
+              <a:t>Describe how your system will work</a:t>
             </a:r>
           </a:p>
           <a:p>
             <a:pPr lvl="1"/>
             <a:r>
               <a:rPr lang="en-US" dirty="0"/>
-              <a:t>predict the location of a user based on signal strength measurements</a:t>
-            </a:r>
-          </a:p>
-          <a:p>
-            <a:r>
-              <a:rPr lang="en-US" b="1" dirty="0"/>
-              <a:t>input</a:t>
+              <a:t>by now you should have a clear plan of action </a:t>
+            </a:r>
+          </a:p>
+          <a:p>
+            <a:r>
+              <a:rPr lang="en-US" dirty="0"/>
+              <a:t>Make sure to include:</a:t>
             </a:r>
           </a:p>
           <a:p>
             <a:pPr lvl="1"/>
             <a:r>
               <a:rPr lang="en-US" dirty="0"/>
-              <a:t>a database of signal strength measurements</a:t>
+              <a:t>a diagram of showing the components of the system and how they interact</a:t>
             </a:r>
           </a:p>
           <a:p>
             <a:pPr lvl="1"/>
             <a:r>
               <a:rPr lang="en-US" dirty="0"/>
-              <a:t>are reference signal collected from the user</a:t>
-            </a:r>
-          </a:p>
-          <a:p>
-            <a:r>
-              <a:rPr lang="en-US" b="1" dirty="0"/>
-              <a:t>output: </a:t>
+              <a:t>a discussion of the technical challenges that you have (or will) overcome</a:t>
             </a:r>
           </a:p>
           <a:p>
             <a:pPr lvl="1"/>
             <a:r>
               <a:rPr lang="en-US" dirty="0"/>
-              <a:t>the location of the user</a:t>
-            </a:r>
-          </a:p>
-        </p:txBody>
-      </p:sp>
-    </p:spTree>
-    <p:extLst>
-      <p:ext uri="{BB962C8B-B14F-4D97-AF65-F5344CB8AC3E}">
-        <p14:creationId xmlns:p14="http://schemas.microsoft.com/office/powerpoint/2010/main" val="1754770774"/>
-      </p:ext>
-    </p:extLst>
-  </p:cSld>
-  <p:clrMapOvr>
-    <a:masterClrMapping/>
-  </p:clrMapOvr>
-</p:sld>
-</file>
-
-<file path=ppt/slides/slide4.xml><?xml version="1.0" encoding="utf-8"?>
-<p:sld xmlns:a="http://schemas.openxmlformats.org/drawingml/2006/main" xmlns:r="http://schemas.openxmlformats.org/officeDocument/2006/relationships" xmlns:p="http://schemas.openxmlformats.org/presentationml/2006/main">
-  <p:cSld>
-    <p:spTree>
-      <p:nvGrpSpPr>
-        <p:cNvPr id="1" name=""/>
-        <p:cNvGrpSpPr/>
-        <p:nvPr/>
-      </p:nvGrpSpPr>
-      <p:grpSpPr>
-        <a:xfrm>
-          <a:off x="0" y="0"/>
-          <a:ext cx="0" cy="0"/>
-          <a:chOff x="0" y="0"/>
-          <a:chExt cx="0" cy="0"/>
-        </a:xfrm>
-      </p:grpSpPr>
-      <p:sp>
-        <p:nvSpPr>
-          <p:cNvPr id="2" name="Title 1"/>
-          <p:cNvSpPr>
-            <a:spLocks noGrp="1"/>
-          </p:cNvSpPr>
-          <p:nvPr>
-            <p:ph type="title"/>
-          </p:nvPr>
-        </p:nvSpPr>
-        <p:spPr/>
-        <p:txBody>
-          <a:bodyPr/>
-          <a:lstStyle/>
-          <a:p>
-            <a:r>
-              <a:rPr lang="en-US" dirty="0"/>
-              <a:t>Approach</a:t>
-            </a:r>
-          </a:p>
-        </p:txBody>
-      </p:sp>
-      <p:sp>
-        <p:nvSpPr>
-          <p:cNvPr id="3" name="Content Placeholder 2"/>
-          <p:cNvSpPr>
-            <a:spLocks noGrp="1"/>
-          </p:cNvSpPr>
-          <p:nvPr>
-            <p:ph idx="1"/>
-          </p:nvPr>
-        </p:nvSpPr>
-        <p:spPr/>
-        <p:txBody>
-          <a:bodyPr/>
-          <a:lstStyle/>
-          <a:p>
-            <a:r>
-              <a:rPr lang="en-US" dirty="0"/>
-              <a:t>Describe how your system will work</a:t>
-            </a:r>
-          </a:p>
-          <a:p>
-            <a:pPr lvl="1"/>
-            <a:r>
-              <a:rPr lang="en-US" dirty="0"/>
-              <a:t>by now you should have a clear plan of action </a:t>
-            </a:r>
-          </a:p>
-          <a:p>
-            <a:r>
-              <a:rPr lang="en-US" dirty="0"/>
-              <a:t>Make sure to include:</a:t>
-            </a:r>
-          </a:p>
-          <a:p>
-            <a:pPr lvl="1"/>
-            <a:r>
-              <a:rPr lang="en-US" dirty="0"/>
-              <a:t>a diagram of showing the components of the system and how they interact</a:t>
-            </a:r>
-          </a:p>
-          <a:p>
-            <a:pPr lvl="1"/>
-            <a:r>
-              <a:rPr lang="en-US" dirty="0"/>
-              <a:t>a discussion of the technical challenges that you have (or will) overcome</a:t>
-            </a:r>
-          </a:p>
-          <a:p>
-            <a:pPr lvl="1"/>
-            <a:r>
-              <a:rPr lang="en-US" dirty="0"/>
               <a:t>what have you accomplished thus far</a:t>
             </a:r>
           </a:p>
@@ -3860,7 +4716,7 @@
           <a:p>
             <a:r>
               <a:rPr lang="en-US" dirty="0"/>
-              <a:t>Kyle – technical challenges &amp; what has been accomplished</a:t>
+              <a:t>Kyle – technical challenges &amp; what has been accomplished [done]</a:t>
             </a:r>
           </a:p>
         </p:txBody>
@@ -3878,7 +4734,7 @@
 </p:sld>
 </file>
 
-<file path=ppt/slides/slide5.xml><?xml version="1.0" encoding="utf-8"?>
+<file path=ppt/slides/slide4.xml><?xml version="1.0" encoding="utf-8"?>
 <p:sld xmlns:a="http://schemas.openxmlformats.org/drawingml/2006/main" xmlns:r="http://schemas.openxmlformats.org/officeDocument/2006/relationships" xmlns:p="http://schemas.openxmlformats.org/presentationml/2006/main">
   <p:cSld>
     <p:spTree>
@@ -3956,6 +4812,157 @@
 </p:sld>
 </file>
 
+<file path=ppt/slides/slide5.xml><?xml version="1.0" encoding="utf-8"?>
+<p:sld xmlns:a="http://schemas.openxmlformats.org/drawingml/2006/main" xmlns:r="http://schemas.openxmlformats.org/officeDocument/2006/relationships" xmlns:p="http://schemas.openxmlformats.org/presentationml/2006/main">
+  <p:cSld>
+    <p:spTree>
+      <p:nvGrpSpPr>
+        <p:cNvPr id="1" name=""/>
+        <p:cNvGrpSpPr/>
+        <p:nvPr/>
+      </p:nvGrpSpPr>
+      <p:grpSpPr>
+        <a:xfrm>
+          <a:off x="0" y="0"/>
+          <a:ext cx="0" cy="0"/>
+          <a:chOff x="0" y="0"/>
+          <a:chExt cx="0" cy="0"/>
+        </a:xfrm>
+      </p:grpSpPr>
+      <p:sp>
+        <p:nvSpPr>
+          <p:cNvPr id="2" name="Title 1"/>
+          <p:cNvSpPr>
+            <a:spLocks noGrp="1"/>
+          </p:cNvSpPr>
+          <p:nvPr>
+            <p:ph type="title"/>
+          </p:nvPr>
+        </p:nvSpPr>
+        <p:spPr/>
+        <p:txBody>
+          <a:bodyPr/>
+          <a:lstStyle/>
+          <a:p>
+            <a:r>
+              <a:rPr lang="en-US" dirty="0"/>
+              <a:t>The Query Snapshot Cycle</a:t>
+            </a:r>
+          </a:p>
+        </p:txBody>
+      </p:sp>
+      <p:pic>
+        <p:nvPicPr>
+          <p:cNvPr id="4" name="Content Placeholder 3"/>
+          <p:cNvPicPr>
+            <a:picLocks noGrp="1" noChangeAspect="1"/>
+          </p:cNvPicPr>
+          <p:nvPr>
+            <p:ph idx="1"/>
+          </p:nvPr>
+        </p:nvPicPr>
+        <p:blipFill>
+          <a:blip r:embed="rId2">
+            <a:extLst>
+              <a:ext uri="{28A0092B-C50C-407E-A947-70E740481C1C}">
+                <a14:useLocalDpi xmlns:a14="http://schemas.microsoft.com/office/drawing/2010/main" val="0"/>
+              </a:ext>
+            </a:extLst>
+          </a:blip>
+          <a:stretch>
+            <a:fillRect/>
+          </a:stretch>
+        </p:blipFill>
+        <p:spPr>
+          <a:xfrm>
+            <a:off x="4386537" y="699655"/>
+            <a:ext cx="6314526" cy="5458690"/>
+          </a:xfrm>
+        </p:spPr>
+      </p:pic>
+      <p:sp>
+        <p:nvSpPr>
+          <p:cNvPr id="5" name="Text Placeholder 4"/>
+          <p:cNvSpPr>
+            <a:spLocks noGrp="1"/>
+          </p:cNvSpPr>
+          <p:nvPr>
+            <p:ph type="body" sz="half" idx="2"/>
+          </p:nvPr>
+        </p:nvSpPr>
+        <p:spPr/>
+        <p:txBody>
+          <a:bodyPr/>
+          <a:lstStyle/>
+          <a:p>
+            <a:pPr marL="285750" indent="-285750">
+              <a:buFont typeface="Arial" panose="020B0604020202020204" pitchFamily="34" charset="0"/>
+              <a:buChar char="•"/>
+            </a:pPr>
+            <a:r>
+              <a:rPr lang="en-US" dirty="0"/>
+              <a:t>First attempt to determine how to create interactors within application</a:t>
+            </a:r>
+          </a:p>
+          <a:p>
+            <a:pPr marL="285750" indent="-285750">
+              <a:buFont typeface="Arial" panose="020B0604020202020204" pitchFamily="34" charset="0"/>
+              <a:buChar char="•"/>
+            </a:pPr>
+            <a:r>
+              <a:rPr lang="en-US" dirty="0"/>
+              <a:t>Requires both keyboard and gaze in conjunction</a:t>
+            </a:r>
+          </a:p>
+          <a:p>
+            <a:pPr marL="285750" indent="-285750">
+              <a:buFont typeface="Arial" panose="020B0604020202020204" pitchFamily="34" charset="0"/>
+              <a:buChar char="•"/>
+            </a:pPr>
+            <a:r>
+              <a:rPr lang="en-US" dirty="0"/>
+              <a:t>Process:</a:t>
+            </a:r>
+          </a:p>
+          <a:p>
+            <a:pPr marL="742950" lvl="1" indent="-285750">
+              <a:buFont typeface="Arial" panose="020B0604020202020204" pitchFamily="34" charset="0"/>
+              <a:buChar char="•"/>
+            </a:pPr>
+            <a:r>
+              <a:rPr lang="en-US" dirty="0"/>
+              <a:t>Press key to activate snapshot</a:t>
+            </a:r>
+          </a:p>
+          <a:p>
+            <a:pPr marL="742950" lvl="1" indent="-285750">
+              <a:buFont typeface="Arial" panose="020B0604020202020204" pitchFamily="34" charset="0"/>
+              <a:buChar char="•"/>
+            </a:pPr>
+            <a:r>
+              <a:rPr lang="en-US" dirty="0" err="1"/>
+              <a:t>EyeX</a:t>
+            </a:r>
+            <a:r>
+              <a:rPr lang="en-US" dirty="0"/>
+              <a:t> Engine queries screen to determine what item occurs at coordinates of user gaze</a:t>
+            </a:r>
+          </a:p>
+        </p:txBody>
+      </p:sp>
+    </p:spTree>
+    <p:extLst>
+      <p:ext uri="{BB962C8B-B14F-4D97-AF65-F5344CB8AC3E}">
+        <p14:creationId xmlns:p14="http://schemas.microsoft.com/office/powerpoint/2010/main" val="1211660829"/>
+      </p:ext>
+    </p:extLst>
+  </p:cSld>
+  <p:clrMapOvr>
+    <a:masterClrMapping/>
+  </p:clrMapOvr>
+</p:sld>
+</file>
+
 <file path=ppt/slides/slide6.xml><?xml version="1.0" encoding="utf-8"?>
 <p:sld xmlns:a="http://schemas.openxmlformats.org/drawingml/2006/main" xmlns:r="http://schemas.openxmlformats.org/officeDocument/2006/relationships" xmlns:p="http://schemas.openxmlformats.org/presentationml/2006/main">
   <p:cSld>
@@ -3990,7 +4997,7 @@
           <a:p>
             <a:r>
               <a:rPr lang="en-US" dirty="0"/>
-              <a:t>Related Work</a:t>
+              <a:t>Gaze-Aware Behavior</a:t>
             </a:r>
           </a:p>
         </p:txBody>
@@ -4007,69 +5014,90 @@
         </p:nvSpPr>
         <p:spPr/>
         <p:txBody>
-          <a:bodyPr/>
-          <a:lstStyle/>
-          <a:p>
-            <a:r>
-              <a:rPr lang="en-US" dirty="0"/>
-              <a:t>Describe how your system builds on prior work</a:t>
+          <a:bodyPr>
+            <a:normAutofit/>
+          </a:bodyPr>
+          <a:lstStyle/>
+          <a:p>
+            <a:r>
+              <a:rPr lang="en-US" dirty="0"/>
+              <a:t>Create a set of items that are </a:t>
+            </a:r>
+            <a:r>
+              <a:rPr lang="en-US" dirty="0" err="1"/>
+              <a:t>interactable</a:t>
+            </a:r>
+            <a:r>
+              <a:rPr lang="en-US" dirty="0"/>
+              <a:t> subject to user’s eye-gaze</a:t>
+            </a:r>
+          </a:p>
+          <a:p>
+            <a:r>
+              <a:rPr lang="en-US" dirty="0"/>
+              <a:t>Launch event when user’s gaze enters boundaries of interactor</a:t>
+            </a:r>
+          </a:p>
+          <a:p>
+            <a:r>
+              <a:rPr lang="en-US" dirty="0"/>
+              <a:t>Apply delay time</a:t>
             </a:r>
           </a:p>
           <a:p>
             <a:pPr lvl="1"/>
             <a:r>
               <a:rPr lang="en-US" dirty="0"/>
-              <a:t>what other systems are related to your work</a:t>
+              <a:t>Add inertia to account to rapid, random eye movements</a:t>
             </a:r>
           </a:p>
           <a:p>
             <a:pPr lvl="1"/>
             <a:r>
               <a:rPr lang="en-US" dirty="0"/>
-              <a:t>how did others overcome the challenges that you face</a:t>
+              <a:t>Gaze point must start on interactor until response is triggered</a:t>
             </a:r>
           </a:p>
           <a:p>
             <a:pPr lvl="1"/>
             <a:r>
               <a:rPr lang="en-US" dirty="0"/>
-              <a:t>do their solutions apply to your case</a:t>
-            </a:r>
-          </a:p>
-          <a:p>
-            <a:pPr lvl="2"/>
-            <a:r>
-              <a:rPr lang="en-US" dirty="0"/>
-              <a:t>if not, what novel ideals did you have to incorporate to make your system work</a:t>
+              <a:t>Manually adjustable delay parameter</a:t>
+            </a:r>
+          </a:p>
+          <a:p>
+            <a:r>
+              <a:rPr lang="en-US" dirty="0"/>
+              <a:t>Provide focus points:</a:t>
             </a:r>
           </a:p>
           <a:p>
             <a:pPr lvl="1"/>
             <a:r>
               <a:rPr lang="en-US" dirty="0"/>
-              <a:t>make sure to include at least two references</a:t>
-            </a:r>
-          </a:p>
-          <a:p>
-            <a:endParaRPr lang="en-US" dirty="0"/>
-          </a:p>
-          <a:p>
-            <a:endParaRPr lang="en-US" dirty="0"/>
-          </a:p>
-          <a:p>
+              <a:t>Visual hotspot: captions, buttons, etc.</a:t>
+            </a:r>
+          </a:p>
+          <a:p>
+            <a:pPr lvl="1"/>
+            <a:r>
+              <a:rPr lang="en-US" dirty="0"/>
+              <a:t>Sufficiently separation. Spacing around/between visual elements and/or increased size.  (</a:t>
+            </a:r>
             <a:r>
               <a:rPr lang="en-US" dirty="0" err="1"/>
-              <a:t>Suhas</a:t>
-            </a:r>
-            <a:r>
-              <a:rPr lang="en-US" dirty="0"/>
-              <a:t> – technical details</a:t>
-            </a:r>
-          </a:p>
-          <a:p>
-            <a:r>
-              <a:rPr lang="en-US" dirty="0"/>
-              <a:t>Kyle – research in the area (references) </a:t>
+              <a:t>Tobii</a:t>
+            </a:r>
+            <a:r>
+              <a:rPr lang="en-US" dirty="0"/>
+              <a:t> developers note: spacing effective than size.)</a:t>
+            </a:r>
+          </a:p>
+          <a:p>
+            <a:pPr lvl="1"/>
+            <a:r>
+              <a:rPr lang="en-US" dirty="0"/>
+              <a:t>Care in visual feedback given.  Example, highlight only text or visual hotspot of button.</a:t>
             </a:r>
           </a:p>
         </p:txBody>
@@ -4077,7 +5105,7 @@
     </p:spTree>
     <p:extLst>
       <p:ext uri="{BB962C8B-B14F-4D97-AF65-F5344CB8AC3E}">
-        <p14:creationId xmlns:p14="http://schemas.microsoft.com/office/powerpoint/2010/main" val="471565324"/>
+        <p14:creationId xmlns:p14="http://schemas.microsoft.com/office/powerpoint/2010/main" val="200234278"/>
       </p:ext>
     </p:extLst>
   </p:cSld>
@@ -4121,7 +5149,7 @@
           <a:p>
             <a:r>
               <a:rPr lang="en-US" dirty="0"/>
-              <a:t>Experimentation</a:t>
+              <a:t>Related Work</a:t>
             </a:r>
           </a:p>
         </p:txBody>
@@ -4143,13 +5171,42 @@
           <a:p>
             <a:r>
               <a:rPr lang="en-US" dirty="0"/>
-              <a:t>Refer back to your experimentation plans and refine them</a:t>
-            </a:r>
-          </a:p>
-          <a:p>
-            <a:r>
-              <a:rPr lang="en-US" dirty="0"/>
-              <a:t>What aspects of your systems performance will you measure?</a:t>
+              <a:t>Describe how your system builds on prior work</a:t>
+            </a:r>
+          </a:p>
+          <a:p>
+            <a:pPr lvl="1"/>
+            <a:r>
+              <a:rPr lang="en-US" dirty="0"/>
+              <a:t>what other systems are related to your work</a:t>
+            </a:r>
+          </a:p>
+          <a:p>
+            <a:pPr lvl="1"/>
+            <a:r>
+              <a:rPr lang="en-US" dirty="0"/>
+              <a:t>how did others overcome the challenges that you face</a:t>
+            </a:r>
+          </a:p>
+          <a:p>
+            <a:pPr lvl="1"/>
+            <a:r>
+              <a:rPr lang="en-US" dirty="0"/>
+              <a:t>do their solutions apply to your case</a:t>
+            </a:r>
+          </a:p>
+          <a:p>
+            <a:pPr lvl="2"/>
+            <a:r>
+              <a:rPr lang="en-US" dirty="0"/>
+              <a:t>if not, what novel ideals did you have to incorporate to make your system work</a:t>
+            </a:r>
+          </a:p>
+          <a:p>
+            <a:pPr lvl="1"/>
+            <a:r>
+              <a:rPr lang="en-US" dirty="0"/>
+              <a:t>make sure to include at least two references</a:t>
             </a:r>
           </a:p>
           <a:p>
@@ -4159,57 +5216,27 @@
             <a:endParaRPr lang="en-US" dirty="0"/>
           </a:p>
           <a:p>
-            <a:endParaRPr lang="en-US" dirty="0"/>
-          </a:p>
-          <a:p>
-            <a:endParaRPr lang="en-US" dirty="0"/>
-          </a:p>
-          <a:p>
-            <a:r>
-              <a:rPr lang="en-US" dirty="0" err="1"/>
-              <a:t>Ashkan</a:t>
-            </a:r>
-            <a:r>
-              <a:rPr lang="en-US" dirty="0"/>
-              <a:t> &amp; Su</a:t>
-            </a:r>
-          </a:p>
-          <a:p>
-            <a:pPr lvl="1"/>
-            <a:r>
-              <a:rPr lang="en-US" dirty="0"/>
-              <a:t>Grid experimentation</a:t>
-            </a:r>
-          </a:p>
-          <a:p>
-            <a:r>
-              <a:rPr lang="en-US" dirty="0"/>
-              <a:t>Kyle &amp; </a:t>
-            </a:r>
             <a:r>
               <a:rPr lang="en-US" dirty="0" err="1"/>
               <a:t>Suhas</a:t>
             </a:r>
-            <a:endParaRPr lang="en-US" dirty="0"/>
-          </a:p>
-          <a:p>
-            <a:pPr lvl="1"/>
-            <a:r>
-              <a:rPr lang="en-US" dirty="0"/>
-              <a:t>Delay experimentation between gaze </a:t>
-            </a:r>
-            <a:r>
-              <a:rPr lang="en-US"/>
-              <a:t>and dwell</a:t>
-            </a:r>
-            <a:endParaRPr lang="en-US" dirty="0"/>
+            <a:r>
+              <a:rPr lang="en-US" dirty="0"/>
+              <a:t> – technical details and gamming applications</a:t>
+            </a:r>
+          </a:p>
+          <a:p>
+            <a:r>
+              <a:rPr lang="en-US" dirty="0"/>
+              <a:t>Kyle – research in the area (references)  [done]</a:t>
+            </a:r>
           </a:p>
         </p:txBody>
       </p:sp>
     </p:spTree>
     <p:extLst>
       <p:ext uri="{BB962C8B-B14F-4D97-AF65-F5344CB8AC3E}">
-        <p14:creationId xmlns:p14="http://schemas.microsoft.com/office/powerpoint/2010/main" val="4289142875"/>
+        <p14:creationId xmlns:p14="http://schemas.microsoft.com/office/powerpoint/2010/main" val="471565324"/>
       </p:ext>
     </p:extLst>
   </p:cSld>
@@ -4253,7 +5280,7 @@
           <a:p>
             <a:r>
               <a:rPr lang="en-US" dirty="0"/>
-              <a:t>Demo</a:t>
+              <a:t>Gaze vs. Mouse</a:t>
             </a:r>
           </a:p>
         </p:txBody>
@@ -4265,44 +5292,362 @@
             <a:spLocks noGrp="1"/>
           </p:cNvSpPr>
           <p:nvPr>
-            <p:ph idx="1"/>
-          </p:nvPr>
-        </p:nvSpPr>
-        <p:spPr/>
-        <p:txBody>
-          <a:bodyPr/>
-          <a:lstStyle/>
-          <a:p>
-            <a:r>
-              <a:rPr lang="en-US" dirty="0"/>
-              <a:t>Show what you have accomplished thus far</a:t>
-            </a:r>
-          </a:p>
-          <a:p>
-            <a:r>
-              <a:rPr lang="en-US" dirty="0"/>
-              <a:t>I expect to see the basic functionality of your system up and running</a:t>
-            </a:r>
-          </a:p>
-          <a:p>
+            <p:ph sz="half" idx="1"/>
+          </p:nvPr>
+        </p:nvSpPr>
+        <p:spPr/>
+        <p:txBody>
+          <a:bodyPr/>
+          <a:lstStyle/>
+          <a:p>
+            <a:r>
+              <a:rPr lang="en-US" dirty="0"/>
+              <a:t>Gaze tends to be quick and natural</a:t>
+            </a:r>
+          </a:p>
+          <a:p>
+            <a:r>
+              <a:rPr lang="en-US" dirty="0"/>
+              <a:t>Can be slow and error prone</a:t>
+            </a:r>
+          </a:p>
+          <a:p>
+            <a:pPr lvl="1"/>
+            <a:r>
+              <a:rPr lang="en-US" dirty="0"/>
+              <a:t>Difficulty distinguishing between intended or unintended gaze</a:t>
+            </a:r>
+          </a:p>
+          <a:p>
+            <a:r>
+              <a:rPr lang="en-US" dirty="0" err="1"/>
+              <a:t>actigaze</a:t>
+            </a:r>
             <a:endParaRPr lang="en-US" dirty="0"/>
           </a:p>
           <a:p>
-            <a:endParaRPr lang="en-US" dirty="0"/>
-          </a:p>
-          <a:p>
-            <a:r>
-              <a:rPr lang="en-US" dirty="0" err="1"/>
-              <a:t>Suhas</a:t>
-            </a:r>
-            <a:endParaRPr lang="en-US" dirty="0"/>
+            <a:pPr lvl="1"/>
+            <a:r>
+              <a:rPr lang="en-US" dirty="0"/>
+              <a:t>Attempts to solve the problem by using color coordination to confirm gaze targets</a:t>
+            </a:r>
+          </a:p>
+          <a:p>
+            <a:pPr lvl="1"/>
+            <a:r>
+              <a:rPr lang="en-US" dirty="0"/>
+              <a:t>Allows for hands-free browsing of webpages</a:t>
+            </a:r>
+          </a:p>
+          <a:p>
+            <a:pPr lvl="1"/>
+            <a:r>
+              <a:rPr lang="en-US" dirty="0"/>
+              <a:t>Current implementation only on selected Wikipedia articles (offline)</a:t>
+            </a:r>
+          </a:p>
+          <a:p>
+            <a:pPr lvl="1"/>
+            <a:r>
+              <a:rPr lang="en-US" dirty="0"/>
+              <a:t>Requires algorithm to correctly identify and highlight clickable links</a:t>
+            </a:r>
+          </a:p>
+        </p:txBody>
+      </p:sp>
+      <p:pic>
+        <p:nvPicPr>
+          <p:cNvPr id="5" name="Content Placeholder 4"/>
+          <p:cNvPicPr>
+            <a:picLocks noGrp="1" noChangeAspect="1"/>
+          </p:cNvPicPr>
+          <p:nvPr>
+            <p:ph sz="half" idx="2"/>
+          </p:nvPr>
+        </p:nvPicPr>
+        <p:blipFill>
+          <a:blip r:embed="rId2">
+            <a:extLst>
+              <a:ext uri="{28A0092B-C50C-407E-A947-70E740481C1C}">
+                <a14:useLocalDpi xmlns:a14="http://schemas.microsoft.com/office/drawing/2010/main" val="0"/>
+              </a:ext>
+            </a:extLst>
+          </a:blip>
+          <a:stretch>
+            <a:fillRect/>
+          </a:stretch>
+        </p:blipFill>
+        <p:spPr>
+          <a:xfrm>
+            <a:off x="6126163" y="1833385"/>
+            <a:ext cx="4481512" cy="4342167"/>
+          </a:xfrm>
+        </p:spPr>
+      </p:pic>
+      <p:sp>
+        <p:nvSpPr>
+          <p:cNvPr id="6" name="TextBox 5"/>
+          <p:cNvSpPr txBox="1"/>
+          <p:nvPr/>
+        </p:nvSpPr>
+        <p:spPr>
+          <a:xfrm>
+            <a:off x="1261872" y="6175552"/>
+            <a:ext cx="1925782" cy="304800"/>
+          </a:xfrm>
+          <a:prstGeom prst="rect">
+            <a:avLst/>
+          </a:prstGeom>
+          <a:noFill/>
+        </p:spPr>
+        <p:txBody>
+          <a:bodyPr wrap="square" rtlCol="0">
+            <a:spAutoFit/>
+          </a:bodyPr>
+          <a:lstStyle/>
+          <a:p>
+            <a:r>
+              <a:rPr lang="en-US" sz="1400" dirty="0" err="1"/>
+              <a:t>Lutteroth</a:t>
+            </a:r>
+            <a:r>
+              <a:rPr lang="en-US" sz="1400" dirty="0"/>
+              <a:t> et al. 2015</a:t>
+            </a:r>
           </a:p>
         </p:txBody>
       </p:sp>
     </p:spTree>
     <p:extLst>
       <p:ext uri="{BB962C8B-B14F-4D97-AF65-F5344CB8AC3E}">
-        <p14:creationId xmlns:p14="http://schemas.microsoft.com/office/powerpoint/2010/main" val="4098738424"/>
+        <p14:creationId xmlns:p14="http://schemas.microsoft.com/office/powerpoint/2010/main" val="393577610"/>
+      </p:ext>
+    </p:extLst>
+  </p:cSld>
+  <p:clrMapOvr>
+    <a:masterClrMapping/>
+  </p:clrMapOvr>
+</p:sld>
+</file>
+
+<file path=ppt/slides/slide9.xml><?xml version="1.0" encoding="utf-8"?>
+<p:sld xmlns:a="http://schemas.openxmlformats.org/drawingml/2006/main" xmlns:r="http://schemas.openxmlformats.org/officeDocument/2006/relationships" xmlns:p="http://schemas.openxmlformats.org/presentationml/2006/main">
+  <p:cSld>
+    <p:spTree>
+      <p:nvGrpSpPr>
+        <p:cNvPr id="1" name=""/>
+        <p:cNvGrpSpPr/>
+        <p:nvPr/>
+      </p:nvGrpSpPr>
+      <p:grpSpPr>
+        <a:xfrm>
+          <a:off x="0" y="0"/>
+          <a:ext cx="0" cy="0"/>
+          <a:chOff x="0" y="0"/>
+          <a:chExt cx="0" cy="0"/>
+        </a:xfrm>
+      </p:grpSpPr>
+      <p:sp>
+        <p:nvSpPr>
+          <p:cNvPr id="2" name="Title 1"/>
+          <p:cNvSpPr>
+            <a:spLocks noGrp="1"/>
+          </p:cNvSpPr>
+          <p:nvPr>
+            <p:ph type="title"/>
+          </p:nvPr>
+        </p:nvSpPr>
+        <p:spPr/>
+        <p:txBody>
+          <a:bodyPr/>
+          <a:lstStyle/>
+          <a:p>
+            <a:r>
+              <a:rPr lang="en-US" dirty="0"/>
+              <a:t>Where does gaze fall?</a:t>
+            </a:r>
+          </a:p>
+        </p:txBody>
+      </p:sp>
+      <p:pic>
+        <p:nvPicPr>
+          <p:cNvPr id="6" name="Content Placeholder 5"/>
+          <p:cNvPicPr>
+            <a:picLocks noGrp="1" noChangeAspect="1"/>
+          </p:cNvPicPr>
+          <p:nvPr>
+            <p:ph sz="half" idx="1"/>
+          </p:nvPr>
+        </p:nvPicPr>
+        <p:blipFill>
+          <a:blip r:embed="rId2">
+            <a:extLst>
+              <a:ext uri="{28A0092B-C50C-407E-A947-70E740481C1C}">
+                <a14:useLocalDpi xmlns:a14="http://schemas.microsoft.com/office/drawing/2010/main" val="0"/>
+              </a:ext>
+            </a:extLst>
+          </a:blip>
+          <a:stretch>
+            <a:fillRect/>
+          </a:stretch>
+        </p:blipFill>
+        <p:spPr>
+          <a:xfrm>
+            <a:off x="326881" y="1691322"/>
+            <a:ext cx="4479925" cy="3357552"/>
+          </a:xfrm>
+        </p:spPr>
+      </p:pic>
+      <p:pic>
+        <p:nvPicPr>
+          <p:cNvPr id="7" name="Content Placeholder 6"/>
+          <p:cNvPicPr>
+            <a:picLocks noGrp="1" noChangeAspect="1"/>
+          </p:cNvPicPr>
+          <p:nvPr>
+            <p:ph sz="half" idx="2"/>
+          </p:nvPr>
+        </p:nvPicPr>
+        <p:blipFill>
+          <a:blip r:embed="rId3">
+            <a:extLst>
+              <a:ext uri="{28A0092B-C50C-407E-A947-70E740481C1C}">
+                <a14:useLocalDpi xmlns:a14="http://schemas.microsoft.com/office/drawing/2010/main" val="0"/>
+              </a:ext>
+            </a:extLst>
+          </a:blip>
+          <a:stretch>
+            <a:fillRect/>
+          </a:stretch>
+        </p:blipFill>
+        <p:spPr>
+          <a:xfrm>
+            <a:off x="2205327" y="5262205"/>
+            <a:ext cx="4481512" cy="975873"/>
+          </a:xfrm>
+        </p:spPr>
+      </p:pic>
+      <p:sp>
+        <p:nvSpPr>
+          <p:cNvPr id="8" name="TextBox 7"/>
+          <p:cNvSpPr txBox="1"/>
+          <p:nvPr/>
+        </p:nvSpPr>
+        <p:spPr>
+          <a:xfrm>
+            <a:off x="3414244" y="6235936"/>
+            <a:ext cx="2063677" cy="276999"/>
+          </a:xfrm>
+          <a:prstGeom prst="rect">
+            <a:avLst/>
+          </a:prstGeom>
+          <a:noFill/>
+        </p:spPr>
+        <p:txBody>
+          <a:bodyPr wrap="square" rtlCol="0">
+            <a:spAutoFit/>
+          </a:bodyPr>
+          <a:lstStyle/>
+          <a:p>
+            <a:r>
+              <a:rPr lang="en-US" sz="1200" dirty="0"/>
+              <a:t>Retrieved from Wikipedia</a:t>
+            </a:r>
+          </a:p>
+        </p:txBody>
+      </p:sp>
+      <p:sp>
+        <p:nvSpPr>
+          <p:cNvPr id="9" name="TextBox 8"/>
+          <p:cNvSpPr txBox="1"/>
+          <p:nvPr/>
+        </p:nvSpPr>
+        <p:spPr>
+          <a:xfrm>
+            <a:off x="326881" y="5017040"/>
+            <a:ext cx="2327564" cy="276999"/>
+          </a:xfrm>
+          <a:prstGeom prst="rect">
+            <a:avLst/>
+          </a:prstGeom>
+          <a:noFill/>
+        </p:spPr>
+        <p:txBody>
+          <a:bodyPr wrap="square" rtlCol="0">
+            <a:spAutoFit/>
+          </a:bodyPr>
+          <a:lstStyle/>
+          <a:p>
+            <a:r>
+              <a:rPr lang="en-US" sz="1200" dirty="0"/>
+              <a:t>Evans and Saint-Aubin, 2005</a:t>
+            </a:r>
+          </a:p>
+        </p:txBody>
+      </p:sp>
+      <p:pic>
+        <p:nvPicPr>
+          <p:cNvPr id="10" name="Picture 9"/>
+          <p:cNvPicPr>
+            <a:picLocks noChangeAspect="1"/>
+          </p:cNvPicPr>
+          <p:nvPr/>
+        </p:nvPicPr>
+        <p:blipFill>
+          <a:blip r:embed="rId4">
+            <a:extLst>
+              <a:ext uri="{28A0092B-C50C-407E-A947-70E740481C1C}">
+                <a14:useLocalDpi xmlns:a14="http://schemas.microsoft.com/office/drawing/2010/main" val="0"/>
+              </a:ext>
+            </a:extLst>
+          </a:blip>
+          <a:stretch>
+            <a:fillRect/>
+          </a:stretch>
+        </p:blipFill>
+        <p:spPr>
+          <a:xfrm>
+            <a:off x="6247824" y="1828512"/>
+            <a:ext cx="4260848" cy="3195636"/>
+          </a:xfrm>
+          <a:prstGeom prst="rect">
+            <a:avLst/>
+          </a:prstGeom>
+        </p:spPr>
+      </p:pic>
+      <p:sp>
+        <p:nvSpPr>
+          <p:cNvPr id="11" name="TextBox 10"/>
+          <p:cNvSpPr txBox="1"/>
+          <p:nvPr/>
+        </p:nvSpPr>
+        <p:spPr>
+          <a:xfrm>
+            <a:off x="7268459" y="5011988"/>
+            <a:ext cx="2219577" cy="276999"/>
+          </a:xfrm>
+          <a:prstGeom prst="rect">
+            <a:avLst/>
+          </a:prstGeom>
+          <a:noFill/>
+        </p:spPr>
+        <p:txBody>
+          <a:bodyPr wrap="square" rtlCol="0">
+            <a:spAutoFit/>
+          </a:bodyPr>
+          <a:lstStyle/>
+          <a:p>
+            <a:r>
+              <a:rPr lang="en-US" sz="1200" dirty="0"/>
+              <a:t>Retrieved from Usability.gov</a:t>
+            </a:r>
+          </a:p>
+        </p:txBody>
+      </p:sp>
+    </p:spTree>
+    <p:extLst>
+      <p:ext uri="{BB962C8B-B14F-4D97-AF65-F5344CB8AC3E}">
+        <p14:creationId xmlns:p14="http://schemas.microsoft.com/office/powerpoint/2010/main" val="1986291368"/>
       </p:ext>
     </p:extLst>
   </p:cSld>

</xml_diff>

<commit_message>
References added to presentation
</commit_message>
<xml_diff>
--- a/MidtermPresentation/MidtermPresentation.pptx
+++ b/MidtermPresentation/MidtermPresentation.pptx
@@ -11,15 +11,14 @@
     <p:sldId id="261" r:id="rId5"/>
     <p:sldId id="266" r:id="rId6"/>
     <p:sldId id="267" r:id="rId7"/>
-    <p:sldId id="262" r:id="rId8"/>
-    <p:sldId id="268" r:id="rId9"/>
-    <p:sldId id="269" r:id="rId10"/>
-    <p:sldId id="263" r:id="rId11"/>
-    <p:sldId id="270" r:id="rId12"/>
-    <p:sldId id="271" r:id="rId13"/>
-    <p:sldId id="272" r:id="rId14"/>
-    <p:sldId id="273" r:id="rId15"/>
-    <p:sldId id="264" r:id="rId16"/>
+    <p:sldId id="268" r:id="rId8"/>
+    <p:sldId id="269" r:id="rId9"/>
+    <p:sldId id="270" r:id="rId10"/>
+    <p:sldId id="271" r:id="rId11"/>
+    <p:sldId id="272" r:id="rId12"/>
+    <p:sldId id="273" r:id="rId13"/>
+    <p:sldId id="264" r:id="rId14"/>
+    <p:sldId id="274" r:id="rId15"/>
   </p:sldIdLst>
   <p:sldSz cx="12192000" cy="6858000"/>
   <p:notesSz cx="6858000" cy="9144000"/>
@@ -3593,386 +3592,6 @@
           <a:p>
             <a:r>
               <a:rPr lang="en-US" dirty="0"/>
-              <a:t>Experimentation</a:t>
-            </a:r>
-          </a:p>
-        </p:txBody>
-      </p:sp>
-      <p:sp>
-        <p:nvSpPr>
-          <p:cNvPr id="3" name="Content Placeholder 2"/>
-          <p:cNvSpPr>
-            <a:spLocks noGrp="1"/>
-          </p:cNvSpPr>
-          <p:nvPr>
-            <p:ph idx="1"/>
-          </p:nvPr>
-        </p:nvSpPr>
-        <p:spPr/>
-        <p:txBody>
-          <a:bodyPr/>
-          <a:lstStyle/>
-          <a:p>
-            <a:r>
-              <a:rPr lang="en-US" dirty="0"/>
-              <a:t>Refer back to your experimentation plans and refine them</a:t>
-            </a:r>
-          </a:p>
-          <a:p>
-            <a:r>
-              <a:rPr lang="en-US" dirty="0"/>
-              <a:t>What aspects of your systems performance will you measure?</a:t>
-            </a:r>
-          </a:p>
-          <a:p>
-            <a:endParaRPr lang="en-US" dirty="0"/>
-          </a:p>
-          <a:p>
-            <a:endParaRPr lang="en-US" dirty="0"/>
-          </a:p>
-          <a:p>
-            <a:endParaRPr lang="en-US" dirty="0"/>
-          </a:p>
-          <a:p>
-            <a:endParaRPr lang="en-US" dirty="0"/>
-          </a:p>
-          <a:p>
-            <a:r>
-              <a:rPr lang="en-US" dirty="0" err="1"/>
-              <a:t>Ashkan</a:t>
-            </a:r>
-            <a:r>
-              <a:rPr lang="en-US" dirty="0"/>
-              <a:t> &amp; Su [done]</a:t>
-            </a:r>
-          </a:p>
-          <a:p>
-            <a:pPr lvl="1"/>
-            <a:r>
-              <a:rPr lang="en-US" dirty="0"/>
-              <a:t>Grid experimentation</a:t>
-            </a:r>
-          </a:p>
-          <a:p>
-            <a:r>
-              <a:rPr lang="en-US" dirty="0" err="1"/>
-              <a:t>Suhas</a:t>
-            </a:r>
-            <a:endParaRPr lang="en-US" dirty="0"/>
-          </a:p>
-          <a:p>
-            <a:pPr lvl="1"/>
-            <a:r>
-              <a:rPr lang="en-US" dirty="0"/>
-              <a:t>Delay experimentation between gaze and dwell</a:t>
-            </a:r>
-          </a:p>
-        </p:txBody>
-      </p:sp>
-    </p:spTree>
-    <p:extLst>
-      <p:ext uri="{BB962C8B-B14F-4D97-AF65-F5344CB8AC3E}">
-        <p14:creationId xmlns:p14="http://schemas.microsoft.com/office/powerpoint/2010/main" val="4289142875"/>
-      </p:ext>
-    </p:extLst>
-  </p:cSld>
-  <p:clrMapOvr>
-    <a:masterClrMapping/>
-  </p:clrMapOvr>
-</p:sld>
-</file>
-
-<file path=ppt/slides/slide11.xml><?xml version="1.0" encoding="utf-8"?>
-<p:sld xmlns:a="http://schemas.openxmlformats.org/drawingml/2006/main" xmlns:r="http://schemas.openxmlformats.org/officeDocument/2006/relationships" xmlns:p="http://schemas.openxmlformats.org/presentationml/2006/main">
-  <p:cSld>
-    <p:spTree>
-      <p:nvGrpSpPr>
-        <p:cNvPr id="1" name=""/>
-        <p:cNvGrpSpPr/>
-        <p:nvPr/>
-      </p:nvGrpSpPr>
-      <p:grpSpPr>
-        <a:xfrm>
-          <a:off x="0" y="0"/>
-          <a:ext cx="0" cy="0"/>
-          <a:chOff x="0" y="0"/>
-          <a:chExt cx="0" cy="0"/>
-        </a:xfrm>
-      </p:grpSpPr>
-      <p:sp>
-        <p:nvSpPr>
-          <p:cNvPr id="2" name="Title 1"/>
-          <p:cNvSpPr>
-            <a:spLocks noGrp="1"/>
-          </p:cNvSpPr>
-          <p:nvPr>
-            <p:ph type="title"/>
-          </p:nvPr>
-        </p:nvSpPr>
-        <p:spPr/>
-        <p:txBody>
-          <a:bodyPr/>
-          <a:lstStyle/>
-          <a:p>
-            <a:r>
-              <a:rPr lang="en-US" dirty="0"/>
-              <a:t>Experimentation for the Textbox Size </a:t>
-            </a:r>
-          </a:p>
-        </p:txBody>
-      </p:sp>
-      <p:sp>
-        <p:nvSpPr>
-          <p:cNvPr id="3" name="Content Placeholder 2"/>
-          <p:cNvSpPr>
-            <a:spLocks noGrp="1"/>
-          </p:cNvSpPr>
-          <p:nvPr>
-            <p:ph idx="1"/>
-          </p:nvPr>
-        </p:nvSpPr>
-        <p:spPr/>
-        <p:txBody>
-          <a:bodyPr/>
-          <a:lstStyle/>
-          <a:p>
-            <a:r>
-              <a:rPr lang="en-US" dirty="0"/>
-              <a:t>Goal: Determining reasonable word spacing amount:</a:t>
-            </a:r>
-          </a:p>
-          <a:p>
-            <a:r>
-              <a:rPr lang="en-US" dirty="0"/>
-              <a:t>5 initial textbox sizes were selected  </a:t>
-            </a:r>
-          </a:p>
-        </p:txBody>
-      </p:sp>
-      <p:pic>
-        <p:nvPicPr>
-          <p:cNvPr id="4" name="Picture 3"/>
-          <p:cNvPicPr>
-            <a:picLocks noChangeAspect="1"/>
-          </p:cNvPicPr>
-          <p:nvPr/>
-        </p:nvPicPr>
-        <p:blipFill>
-          <a:blip r:embed="rId2">
-            <a:extLst>
-              <a:ext uri="{28A0092B-C50C-407E-A947-70E740481C1C}">
-                <a14:useLocalDpi xmlns:a14="http://schemas.microsoft.com/office/drawing/2010/main" val="0"/>
-              </a:ext>
-            </a:extLst>
-          </a:blip>
-          <a:stretch>
-            <a:fillRect/>
-          </a:stretch>
-        </p:blipFill>
-        <p:spPr>
-          <a:xfrm>
-            <a:off x="437610" y="3395009"/>
-            <a:ext cx="2743200" cy="1712455"/>
-          </a:xfrm>
-          <a:prstGeom prst="rect">
-            <a:avLst/>
-          </a:prstGeom>
-        </p:spPr>
-      </p:pic>
-      <p:pic>
-        <p:nvPicPr>
-          <p:cNvPr id="5" name="Picture 4"/>
-          <p:cNvPicPr>
-            <a:picLocks noChangeAspect="1"/>
-          </p:cNvPicPr>
-          <p:nvPr/>
-        </p:nvPicPr>
-        <p:blipFill>
-          <a:blip r:embed="rId3">
-            <a:extLst>
-              <a:ext uri="{28A0092B-C50C-407E-A947-70E740481C1C}">
-                <a14:useLocalDpi xmlns:a14="http://schemas.microsoft.com/office/drawing/2010/main" val="0"/>
-              </a:ext>
-            </a:extLst>
-          </a:blip>
-          <a:stretch>
-            <a:fillRect/>
-          </a:stretch>
-        </p:blipFill>
-        <p:spPr>
-          <a:xfrm>
-            <a:off x="3775821" y="3386894"/>
-            <a:ext cx="2743200" cy="1728683"/>
-          </a:xfrm>
-          <a:prstGeom prst="rect">
-            <a:avLst/>
-          </a:prstGeom>
-        </p:spPr>
-      </p:pic>
-      <p:pic>
-        <p:nvPicPr>
-          <p:cNvPr id="6" name="Picture 5"/>
-          <p:cNvPicPr>
-            <a:picLocks noChangeAspect="1"/>
-          </p:cNvPicPr>
-          <p:nvPr/>
-        </p:nvPicPr>
-        <p:blipFill>
-          <a:blip r:embed="rId4">
-            <a:extLst>
-              <a:ext uri="{28A0092B-C50C-407E-A947-70E740481C1C}">
-                <a14:useLocalDpi xmlns:a14="http://schemas.microsoft.com/office/drawing/2010/main" val="0"/>
-              </a:ext>
-            </a:extLst>
-          </a:blip>
-          <a:stretch>
-            <a:fillRect/>
-          </a:stretch>
-        </p:blipFill>
-        <p:spPr>
-          <a:xfrm>
-            <a:off x="7254102" y="3395009"/>
-            <a:ext cx="2743200" cy="1734576"/>
-          </a:xfrm>
-          <a:prstGeom prst="rect">
-            <a:avLst/>
-          </a:prstGeom>
-        </p:spPr>
-      </p:pic>
-      <p:sp>
-        <p:nvSpPr>
-          <p:cNvPr id="7" name="TextBox 6"/>
-          <p:cNvSpPr txBox="1"/>
-          <p:nvPr/>
-        </p:nvSpPr>
-        <p:spPr>
-          <a:xfrm>
-            <a:off x="890327" y="5280211"/>
-            <a:ext cx="1837765" cy="369332"/>
-          </a:xfrm>
-          <a:prstGeom prst="rect">
-            <a:avLst/>
-          </a:prstGeom>
-          <a:noFill/>
-        </p:spPr>
-        <p:txBody>
-          <a:bodyPr wrap="square" rtlCol="0">
-            <a:spAutoFit/>
-          </a:bodyPr>
-          <a:lstStyle/>
-          <a:p>
-            <a:r>
-              <a:rPr lang="en-US" dirty="0"/>
-              <a:t>11 * 5 grid line</a:t>
-            </a:r>
-          </a:p>
-        </p:txBody>
-      </p:sp>
-      <p:sp>
-        <p:nvSpPr>
-          <p:cNvPr id="8" name="TextBox 7"/>
-          <p:cNvSpPr txBox="1"/>
-          <p:nvPr/>
-        </p:nvSpPr>
-        <p:spPr>
-          <a:xfrm>
-            <a:off x="4228538" y="5298141"/>
-            <a:ext cx="1837765" cy="369332"/>
-          </a:xfrm>
-          <a:prstGeom prst="rect">
-            <a:avLst/>
-          </a:prstGeom>
-          <a:noFill/>
-        </p:spPr>
-        <p:txBody>
-          <a:bodyPr wrap="square" rtlCol="0">
-            <a:spAutoFit/>
-          </a:bodyPr>
-          <a:lstStyle/>
-          <a:p>
-            <a:r>
-              <a:rPr lang="en-US" dirty="0"/>
-              <a:t>11 * 9 grid line</a:t>
-            </a:r>
-          </a:p>
-        </p:txBody>
-      </p:sp>
-      <p:sp>
-        <p:nvSpPr>
-          <p:cNvPr id="9" name="TextBox 8"/>
-          <p:cNvSpPr txBox="1"/>
-          <p:nvPr/>
-        </p:nvSpPr>
-        <p:spPr>
-          <a:xfrm>
-            <a:off x="7706819" y="5285583"/>
-            <a:ext cx="1912310" cy="369332"/>
-          </a:xfrm>
-          <a:prstGeom prst="rect">
-            <a:avLst/>
-          </a:prstGeom>
-          <a:noFill/>
-        </p:spPr>
-        <p:txBody>
-          <a:bodyPr wrap="square" rtlCol="0">
-            <a:spAutoFit/>
-          </a:bodyPr>
-          <a:lstStyle/>
-          <a:p>
-            <a:r>
-              <a:rPr lang="en-US" dirty="0"/>
-              <a:t>11 * 11 grid line</a:t>
-            </a:r>
-          </a:p>
-        </p:txBody>
-      </p:sp>
-    </p:spTree>
-    <p:extLst>
-      <p:ext uri="{BB962C8B-B14F-4D97-AF65-F5344CB8AC3E}">
-        <p14:creationId xmlns:p14="http://schemas.microsoft.com/office/powerpoint/2010/main" val="3628369559"/>
-      </p:ext>
-    </p:extLst>
-  </p:cSld>
-  <p:clrMapOvr>
-    <a:masterClrMapping/>
-  </p:clrMapOvr>
-</p:sld>
-</file>
-
-<file path=ppt/slides/slide12.xml><?xml version="1.0" encoding="utf-8"?>
-<p:sld xmlns:a="http://schemas.openxmlformats.org/drawingml/2006/main" xmlns:r="http://schemas.openxmlformats.org/officeDocument/2006/relationships" xmlns:p="http://schemas.openxmlformats.org/presentationml/2006/main">
-  <p:cSld>
-    <p:spTree>
-      <p:nvGrpSpPr>
-        <p:cNvPr id="1" name=""/>
-        <p:cNvGrpSpPr/>
-        <p:nvPr/>
-      </p:nvGrpSpPr>
-      <p:grpSpPr>
-        <a:xfrm>
-          <a:off x="0" y="0"/>
-          <a:ext cx="0" cy="0"/>
-          <a:chOff x="0" y="0"/>
-          <a:chExt cx="0" cy="0"/>
-        </a:xfrm>
-      </p:grpSpPr>
-      <p:sp>
-        <p:nvSpPr>
-          <p:cNvPr id="2" name="Title 1"/>
-          <p:cNvSpPr>
-            <a:spLocks noGrp="1"/>
-          </p:cNvSpPr>
-          <p:nvPr>
-            <p:ph type="title"/>
-          </p:nvPr>
-        </p:nvSpPr>
-        <p:spPr/>
-        <p:txBody>
-          <a:bodyPr/>
-          <a:lstStyle/>
-          <a:p>
-            <a:r>
-              <a:rPr lang="en-US" dirty="0"/>
               <a:t>Experimentation for the Textbox Size </a:t>
             </a:r>
           </a:p>
@@ -4164,6 +3783,200 @@
 </p:sld>
 </file>
 
+<file path=ppt/slides/slide11.xml><?xml version="1.0" encoding="utf-8"?>
+<p:sld xmlns:a="http://schemas.openxmlformats.org/drawingml/2006/main" xmlns:r="http://schemas.openxmlformats.org/officeDocument/2006/relationships" xmlns:p="http://schemas.openxmlformats.org/presentationml/2006/main">
+  <p:cSld>
+    <p:spTree>
+      <p:nvGrpSpPr>
+        <p:cNvPr id="1" name=""/>
+        <p:cNvGrpSpPr/>
+        <p:nvPr/>
+      </p:nvGrpSpPr>
+      <p:grpSpPr>
+        <a:xfrm>
+          <a:off x="0" y="0"/>
+          <a:ext cx="0" cy="0"/>
+          <a:chOff x="0" y="0"/>
+          <a:chExt cx="0" cy="0"/>
+        </a:xfrm>
+      </p:grpSpPr>
+      <p:sp>
+        <p:nvSpPr>
+          <p:cNvPr id="2" name="Title 1"/>
+          <p:cNvSpPr>
+            <a:spLocks noGrp="1"/>
+          </p:cNvSpPr>
+          <p:nvPr>
+            <p:ph type="title"/>
+          </p:nvPr>
+        </p:nvSpPr>
+        <p:spPr/>
+        <p:txBody>
+          <a:bodyPr/>
+          <a:lstStyle/>
+          <a:p>
+            <a:r>
+              <a:rPr lang="en-US" dirty="0"/>
+              <a:t>Experiment for the Delay Amounts</a:t>
+            </a:r>
+          </a:p>
+        </p:txBody>
+      </p:sp>
+      <p:sp>
+        <p:nvSpPr>
+          <p:cNvPr id="3" name="Content Placeholder 2"/>
+          <p:cNvSpPr>
+            <a:spLocks noGrp="1"/>
+          </p:cNvSpPr>
+          <p:nvPr>
+            <p:ph idx="1"/>
+          </p:nvPr>
+        </p:nvSpPr>
+        <p:spPr/>
+        <p:txBody>
+          <a:bodyPr/>
+          <a:lstStyle/>
+          <a:p>
+            <a:r>
+              <a:rPr lang="en-US" dirty="0"/>
+              <a:t>Goal: Determine reasonable delay</a:t>
+            </a:r>
+          </a:p>
+          <a:p>
+            <a:pPr lvl="1"/>
+            <a:r>
+              <a:rPr lang="en-US" dirty="0"/>
+              <a:t>Delay governs when text is activated</a:t>
+            </a:r>
+          </a:p>
+          <a:p>
+            <a:r>
+              <a:rPr lang="en-US" dirty="0"/>
+              <a:t>Setup various amounts of manual delay:</a:t>
+            </a:r>
+          </a:p>
+          <a:p>
+            <a:pPr lvl="1"/>
+            <a:r>
+              <a:rPr lang="en-US" dirty="0"/>
+              <a:t>Delay in milliseconds: 250, 500, 750, 1000</a:t>
+            </a:r>
+          </a:p>
+          <a:p>
+            <a:r>
+              <a:rPr lang="en-US" dirty="0"/>
+              <a:t>Ask participants to read segment of text where is word requires delay to activate</a:t>
+            </a:r>
+          </a:p>
+          <a:p>
+            <a:r>
+              <a:rPr lang="en-US" dirty="0"/>
+              <a:t>Participants rate user experience on Likert Scale of 1 to 5</a:t>
+            </a:r>
+          </a:p>
+          <a:p>
+            <a:pPr lvl="1"/>
+            <a:r>
+              <a:rPr lang="en-US" dirty="0"/>
+              <a:t>Require participants to provide feedback explaining choice</a:t>
+            </a:r>
+          </a:p>
+          <a:p>
+            <a:pPr lvl="1"/>
+            <a:r>
+              <a:rPr lang="en-US" dirty="0"/>
+              <a:t>Plan to choose average amount as acceptable delay</a:t>
+            </a:r>
+          </a:p>
+        </p:txBody>
+      </p:sp>
+    </p:spTree>
+    <p:extLst>
+      <p:ext uri="{BB962C8B-B14F-4D97-AF65-F5344CB8AC3E}">
+        <p14:creationId xmlns:p14="http://schemas.microsoft.com/office/powerpoint/2010/main" val="738672203"/>
+      </p:ext>
+    </p:extLst>
+  </p:cSld>
+  <p:clrMapOvr>
+    <a:masterClrMapping/>
+  </p:clrMapOvr>
+</p:sld>
+</file>
+
+<file path=ppt/slides/slide12.xml><?xml version="1.0" encoding="utf-8"?>
+<p:sld xmlns:a="http://schemas.openxmlformats.org/drawingml/2006/main" xmlns:r="http://schemas.openxmlformats.org/officeDocument/2006/relationships" xmlns:p="http://schemas.openxmlformats.org/presentationml/2006/main">
+  <p:cSld>
+    <p:spTree>
+      <p:nvGrpSpPr>
+        <p:cNvPr id="1" name=""/>
+        <p:cNvGrpSpPr/>
+        <p:nvPr/>
+      </p:nvGrpSpPr>
+      <p:grpSpPr>
+        <a:xfrm>
+          <a:off x="0" y="0"/>
+          <a:ext cx="0" cy="0"/>
+          <a:chOff x="0" y="0"/>
+          <a:chExt cx="0" cy="0"/>
+        </a:xfrm>
+      </p:grpSpPr>
+      <p:sp>
+        <p:nvSpPr>
+          <p:cNvPr id="2" name="Title 1"/>
+          <p:cNvSpPr>
+            <a:spLocks noGrp="1"/>
+          </p:cNvSpPr>
+          <p:nvPr>
+            <p:ph type="title"/>
+          </p:nvPr>
+        </p:nvSpPr>
+        <p:spPr/>
+        <p:txBody>
+          <a:bodyPr/>
+          <a:lstStyle/>
+          <a:p>
+            <a:r>
+              <a:rPr lang="en-US" dirty="0"/>
+              <a:t>Experiment on Spacing between Interactors </a:t>
+            </a:r>
+          </a:p>
+        </p:txBody>
+      </p:sp>
+      <p:sp>
+        <p:nvSpPr>
+          <p:cNvPr id="3" name="Content Placeholder 2"/>
+          <p:cNvSpPr>
+            <a:spLocks noGrp="1"/>
+          </p:cNvSpPr>
+          <p:nvPr>
+            <p:ph idx="1"/>
+          </p:nvPr>
+        </p:nvSpPr>
+        <p:spPr/>
+        <p:txBody>
+          <a:bodyPr/>
+          <a:lstStyle/>
+          <a:p>
+            <a:r>
+              <a:rPr lang="en-US" dirty="0"/>
+              <a:t>SUHAS</a:t>
+            </a:r>
+          </a:p>
+        </p:txBody>
+      </p:sp>
+    </p:spTree>
+    <p:extLst>
+      <p:ext uri="{BB962C8B-B14F-4D97-AF65-F5344CB8AC3E}">
+        <p14:creationId xmlns:p14="http://schemas.microsoft.com/office/powerpoint/2010/main" val="3194865933"/>
+      </p:ext>
+    </p:extLst>
+  </p:cSld>
+  <p:clrMapOvr>
+    <a:masterClrMapping/>
+  </p:clrMapOvr>
+</p:sld>
+</file>
+
 <file path=ppt/slides/slide13.xml><?xml version="1.0" encoding="utf-8"?>
 <p:sld xmlns:a="http://schemas.openxmlformats.org/drawingml/2006/main" xmlns:r="http://schemas.openxmlformats.org/officeDocument/2006/relationships" xmlns:p="http://schemas.openxmlformats.org/presentationml/2006/main">
   <p:cSld>
@@ -4198,7 +4011,7 @@
           <a:p>
             <a:r>
               <a:rPr lang="en-US" dirty="0"/>
-              <a:t>Experiment for the Delay Amounts</a:t>
+              <a:t>Demo</a:t>
             </a:r>
           </a:p>
         </p:txBody>
@@ -4220,53 +4033,35 @@
           <a:p>
             <a:r>
               <a:rPr lang="en-US" dirty="0"/>
-              <a:t>Goal: Determine reasonable delay</a:t>
-            </a:r>
-          </a:p>
-          <a:p>
-            <a:pPr lvl="1"/>
-            <a:r>
-              <a:rPr lang="en-US" dirty="0"/>
-              <a:t>Delay governs when text is activated</a:t>
-            </a:r>
-          </a:p>
-          <a:p>
-            <a:r>
-              <a:rPr lang="en-US" dirty="0"/>
-              <a:t>Setup various amounts of manual delay:</a:t>
-            </a:r>
-          </a:p>
-          <a:p>
-            <a:pPr lvl="1"/>
-            <a:r>
-              <a:rPr lang="en-US" dirty="0"/>
-              <a:t>Delay in milliseconds: 250, 500, 750, 1000</a:t>
-            </a:r>
-          </a:p>
-          <a:p>
-            <a:r>
-              <a:rPr lang="en-US" dirty="0"/>
-              <a:t>Ask participants to read segment of text where is word requires delay to activate</a:t>
-            </a:r>
-          </a:p>
-          <a:p>
-            <a:r>
-              <a:rPr lang="en-US" dirty="0"/>
-              <a:t>Participants rate user experience on Likert Scale of 1 to 5</a:t>
-            </a:r>
-          </a:p>
-          <a:p>
-            <a:pPr lvl="1"/>
-            <a:r>
-              <a:rPr lang="en-US" dirty="0"/>
-              <a:t>Require participants to provide feedback explaining choice</a:t>
-            </a:r>
-          </a:p>
-          <a:p>
-            <a:pPr lvl="1"/>
-            <a:r>
-              <a:rPr lang="en-US" dirty="0"/>
-              <a:t>Plan to choose average amount as acceptable delay</a:t>
+              <a:t>Show what you have accomplished thus far</a:t>
+            </a:r>
+          </a:p>
+          <a:p>
+            <a:r>
+              <a:rPr lang="en-US" dirty="0"/>
+              <a:t>I expect to see the basic functionality of your system up and running</a:t>
+            </a:r>
+          </a:p>
+          <a:p>
+            <a:endParaRPr lang="en-US" dirty="0"/>
+          </a:p>
+          <a:p>
+            <a:r>
+              <a:rPr lang="en-US" dirty="0"/>
+              <a:t>SUHAS</a:t>
+            </a:r>
+          </a:p>
+          <a:p>
+            <a:endParaRPr lang="en-US" dirty="0"/>
+          </a:p>
+          <a:p>
+            <a:r>
+              <a:rPr lang="en-US" dirty="0" err="1"/>
+              <a:t>Suhas</a:t>
+            </a:r>
+            <a:r>
+              <a:rPr lang="en-US" dirty="0"/>
+              <a:t>’ computer</a:t>
             </a:r>
           </a:p>
         </p:txBody>
@@ -4274,7 +4069,7 @@
     </p:spTree>
     <p:extLst>
       <p:ext uri="{BB962C8B-B14F-4D97-AF65-F5344CB8AC3E}">
-        <p14:creationId xmlns:p14="http://schemas.microsoft.com/office/powerpoint/2010/main" val="738672203"/>
+        <p14:creationId xmlns:p14="http://schemas.microsoft.com/office/powerpoint/2010/main" val="4098738424"/>
       </p:ext>
     </p:extLst>
   </p:cSld>
@@ -4318,7 +4113,7 @@
           <a:p>
             <a:r>
               <a:rPr lang="en-US" dirty="0"/>
-              <a:t>Experiment on Spacing between Interactors </a:t>
+              <a:t>References</a:t>
             </a:r>
           </a:p>
         </p:txBody>
@@ -4337,6 +4132,70 @@
         <p:txBody>
           <a:bodyPr/>
           <a:lstStyle/>
+          <a:p>
+            <a:r>
+              <a:rPr lang="en-US" dirty="0"/>
+              <a:t>Evans, M. A., &amp; Saint-Aubin, J. (2005). What children are looking at during shared storybook reading evidence from eye movement monitoring. </a:t>
+            </a:r>
+            <a:r>
+              <a:rPr lang="en-US" i="1" dirty="0"/>
+              <a:t>Psychological Science</a:t>
+            </a:r>
+            <a:r>
+              <a:rPr lang="en-US" dirty="0"/>
+              <a:t>, </a:t>
+            </a:r>
+            <a:r>
+              <a:rPr lang="en-US" i="1" dirty="0"/>
+              <a:t>16</a:t>
+            </a:r>
+            <a:r>
+              <a:rPr lang="en-US" dirty="0"/>
+              <a:t>(11), 913-920.</a:t>
+            </a:r>
+          </a:p>
+          <a:p>
+            <a:r>
+              <a:rPr lang="en-US" dirty="0"/>
+              <a:t>Eye Tracking. </a:t>
+            </a:r>
+            <a:r>
+              <a:rPr lang="en-US" dirty="0">
+                <a:hlinkClick r:id="rId2"/>
+              </a:rPr>
+              <a:t>https://www.usability.gov/how-to-and-tools/methods/eye-tracking.html</a:t>
+            </a:r>
+            <a:r>
+              <a:rPr lang="en-US" dirty="0"/>
+              <a:t>. (Retrieved Nov 11).</a:t>
+            </a:r>
+          </a:p>
+          <a:p>
+            <a:r>
+              <a:rPr lang="en-US" dirty="0" err="1"/>
+              <a:t>Lutteroth</a:t>
+            </a:r>
+            <a:r>
+              <a:rPr lang="en-US" dirty="0"/>
+              <a:t>, C., </a:t>
+            </a:r>
+            <a:r>
+              <a:rPr lang="en-US" dirty="0" err="1"/>
+              <a:t>Penkar</a:t>
+            </a:r>
+            <a:r>
+              <a:rPr lang="en-US" dirty="0"/>
+              <a:t>, M., &amp; Weber, G. (2015, November). Gaze vs. Mouse: A Fast and Accurate Gaze-Only Click Alternative. In </a:t>
+            </a:r>
+            <a:r>
+              <a:rPr lang="en-US" i="1" dirty="0"/>
+              <a:t>Proceedings of the 28th Annual ACM Symposium on User Interface Software &amp; Technology</a:t>
+            </a:r>
+            <a:r>
+              <a:rPr lang="en-US" dirty="0"/>
+              <a:t> (pp. 385-394). ACM.</a:t>
+            </a:r>
+          </a:p>
           <a:p>
             <a:endParaRPr lang="en-US" dirty="0"/>
           </a:p>
@@ -4345,103 +4204,7 @@
     </p:spTree>
     <p:extLst>
       <p:ext uri="{BB962C8B-B14F-4D97-AF65-F5344CB8AC3E}">
-        <p14:creationId xmlns:p14="http://schemas.microsoft.com/office/powerpoint/2010/main" val="3194865933"/>
-      </p:ext>
-    </p:extLst>
-  </p:cSld>
-  <p:clrMapOvr>
-    <a:masterClrMapping/>
-  </p:clrMapOvr>
-</p:sld>
-</file>
-
-<file path=ppt/slides/slide15.xml><?xml version="1.0" encoding="utf-8"?>
-<p:sld xmlns:a="http://schemas.openxmlformats.org/drawingml/2006/main" xmlns:r="http://schemas.openxmlformats.org/officeDocument/2006/relationships" xmlns:p="http://schemas.openxmlformats.org/presentationml/2006/main">
-  <p:cSld>
-    <p:spTree>
-      <p:nvGrpSpPr>
-        <p:cNvPr id="1" name=""/>
-        <p:cNvGrpSpPr/>
-        <p:nvPr/>
-      </p:nvGrpSpPr>
-      <p:grpSpPr>
-        <a:xfrm>
-          <a:off x="0" y="0"/>
-          <a:ext cx="0" cy="0"/>
-          <a:chOff x="0" y="0"/>
-          <a:chExt cx="0" cy="0"/>
-        </a:xfrm>
-      </p:grpSpPr>
-      <p:sp>
-        <p:nvSpPr>
-          <p:cNvPr id="2" name="Title 1"/>
-          <p:cNvSpPr>
-            <a:spLocks noGrp="1"/>
-          </p:cNvSpPr>
-          <p:nvPr>
-            <p:ph type="title"/>
-          </p:nvPr>
-        </p:nvSpPr>
-        <p:spPr/>
-        <p:txBody>
-          <a:bodyPr/>
-          <a:lstStyle/>
-          <a:p>
-            <a:r>
-              <a:rPr lang="en-US" dirty="0"/>
-              <a:t>Demo</a:t>
-            </a:r>
-          </a:p>
-        </p:txBody>
-      </p:sp>
-      <p:sp>
-        <p:nvSpPr>
-          <p:cNvPr id="3" name="Content Placeholder 2"/>
-          <p:cNvSpPr>
-            <a:spLocks noGrp="1"/>
-          </p:cNvSpPr>
-          <p:nvPr>
-            <p:ph idx="1"/>
-          </p:nvPr>
-        </p:nvSpPr>
-        <p:spPr/>
-        <p:txBody>
-          <a:bodyPr/>
-          <a:lstStyle/>
-          <a:p>
-            <a:r>
-              <a:rPr lang="en-US" dirty="0"/>
-              <a:t>Show what you have accomplished thus far</a:t>
-            </a:r>
-          </a:p>
-          <a:p>
-            <a:r>
-              <a:rPr lang="en-US" dirty="0"/>
-              <a:t>I expect to see the basic functionality of your system up and running</a:t>
-            </a:r>
-          </a:p>
-          <a:p>
-            <a:endParaRPr lang="en-US" dirty="0"/>
-          </a:p>
-          <a:p>
-            <a:endParaRPr lang="en-US" dirty="0"/>
-          </a:p>
-          <a:p>
-            <a:r>
-              <a:rPr lang="en-US" dirty="0" err="1"/>
-              <a:t>Suhas</a:t>
-            </a:r>
-            <a:r>
-              <a:rPr lang="en-US" dirty="0"/>
-              <a:t>’ computer</a:t>
-            </a:r>
-          </a:p>
-        </p:txBody>
-      </p:sp>
-    </p:spTree>
-    <p:extLst>
-      <p:ext uri="{BB962C8B-B14F-4D97-AF65-F5344CB8AC3E}">
-        <p14:creationId xmlns:p14="http://schemas.microsoft.com/office/powerpoint/2010/main" val="4098738424"/>
+        <p14:creationId xmlns:p14="http://schemas.microsoft.com/office/powerpoint/2010/main" val="2915036592"/>
       </p:ext>
     </p:extLst>
   </p:cSld>
@@ -5149,137 +4912,6 @@
           <a:p>
             <a:r>
               <a:rPr lang="en-US" dirty="0"/>
-              <a:t>Related Work</a:t>
-            </a:r>
-          </a:p>
-        </p:txBody>
-      </p:sp>
-      <p:sp>
-        <p:nvSpPr>
-          <p:cNvPr id="3" name="Content Placeholder 2"/>
-          <p:cNvSpPr>
-            <a:spLocks noGrp="1"/>
-          </p:cNvSpPr>
-          <p:nvPr>
-            <p:ph idx="1"/>
-          </p:nvPr>
-        </p:nvSpPr>
-        <p:spPr/>
-        <p:txBody>
-          <a:bodyPr/>
-          <a:lstStyle/>
-          <a:p>
-            <a:r>
-              <a:rPr lang="en-US" dirty="0"/>
-              <a:t>Describe how your system builds on prior work</a:t>
-            </a:r>
-          </a:p>
-          <a:p>
-            <a:pPr lvl="1"/>
-            <a:r>
-              <a:rPr lang="en-US" dirty="0"/>
-              <a:t>what other systems are related to your work</a:t>
-            </a:r>
-          </a:p>
-          <a:p>
-            <a:pPr lvl="1"/>
-            <a:r>
-              <a:rPr lang="en-US" dirty="0"/>
-              <a:t>how did others overcome the challenges that you face</a:t>
-            </a:r>
-          </a:p>
-          <a:p>
-            <a:pPr lvl="1"/>
-            <a:r>
-              <a:rPr lang="en-US" dirty="0"/>
-              <a:t>do their solutions apply to your case</a:t>
-            </a:r>
-          </a:p>
-          <a:p>
-            <a:pPr lvl="2"/>
-            <a:r>
-              <a:rPr lang="en-US" dirty="0"/>
-              <a:t>if not, what novel ideals did you have to incorporate to make your system work</a:t>
-            </a:r>
-          </a:p>
-          <a:p>
-            <a:pPr lvl="1"/>
-            <a:r>
-              <a:rPr lang="en-US" dirty="0"/>
-              <a:t>make sure to include at least two references</a:t>
-            </a:r>
-          </a:p>
-          <a:p>
-            <a:endParaRPr lang="en-US" dirty="0"/>
-          </a:p>
-          <a:p>
-            <a:endParaRPr lang="en-US" dirty="0"/>
-          </a:p>
-          <a:p>
-            <a:r>
-              <a:rPr lang="en-US" dirty="0" err="1"/>
-              <a:t>Suhas</a:t>
-            </a:r>
-            <a:r>
-              <a:rPr lang="en-US" dirty="0"/>
-              <a:t> – technical details and gamming applications</a:t>
-            </a:r>
-          </a:p>
-          <a:p>
-            <a:r>
-              <a:rPr lang="en-US" dirty="0"/>
-              <a:t>Kyle – research in the area (references)  [done]</a:t>
-            </a:r>
-          </a:p>
-        </p:txBody>
-      </p:sp>
-    </p:spTree>
-    <p:extLst>
-      <p:ext uri="{BB962C8B-B14F-4D97-AF65-F5344CB8AC3E}">
-        <p14:creationId xmlns:p14="http://schemas.microsoft.com/office/powerpoint/2010/main" val="471565324"/>
-      </p:ext>
-    </p:extLst>
-  </p:cSld>
-  <p:clrMapOvr>
-    <a:masterClrMapping/>
-  </p:clrMapOvr>
-</p:sld>
-</file>
-
-<file path=ppt/slides/slide8.xml><?xml version="1.0" encoding="utf-8"?>
-<p:sld xmlns:a="http://schemas.openxmlformats.org/drawingml/2006/main" xmlns:r="http://schemas.openxmlformats.org/officeDocument/2006/relationships" xmlns:p="http://schemas.openxmlformats.org/presentationml/2006/main">
-  <p:cSld>
-    <p:spTree>
-      <p:nvGrpSpPr>
-        <p:cNvPr id="1" name=""/>
-        <p:cNvGrpSpPr/>
-        <p:nvPr/>
-      </p:nvGrpSpPr>
-      <p:grpSpPr>
-        <a:xfrm>
-          <a:off x="0" y="0"/>
-          <a:ext cx="0" cy="0"/>
-          <a:chOff x="0" y="0"/>
-          <a:chExt cx="0" cy="0"/>
-        </a:xfrm>
-      </p:grpSpPr>
-      <p:sp>
-        <p:nvSpPr>
-          <p:cNvPr id="2" name="Title 1"/>
-          <p:cNvSpPr>
-            <a:spLocks noGrp="1"/>
-          </p:cNvSpPr>
-          <p:nvPr>
-            <p:ph type="title"/>
-          </p:nvPr>
-        </p:nvSpPr>
-        <p:spPr/>
-        <p:txBody>
-          <a:bodyPr/>
-          <a:lstStyle/>
-          <a:p>
-            <a:r>
-              <a:rPr lang="en-US" dirty="0"/>
               <a:t>Gaze vs. Mouse</a:t>
             </a:r>
           </a:p>
@@ -5430,7 +5062,7 @@
 </p:sld>
 </file>
 
-<file path=ppt/slides/slide9.xml><?xml version="1.0" encoding="utf-8"?>
+<file path=ppt/slides/slide8.xml><?xml version="1.0" encoding="utf-8"?>
 <p:sld xmlns:a="http://schemas.openxmlformats.org/drawingml/2006/main" xmlns:r="http://schemas.openxmlformats.org/officeDocument/2006/relationships" xmlns:p="http://schemas.openxmlformats.org/presentationml/2006/main">
   <p:cSld>
     <p:spTree>
@@ -5648,6 +5280,263 @@
     <p:extLst>
       <p:ext uri="{BB962C8B-B14F-4D97-AF65-F5344CB8AC3E}">
         <p14:creationId xmlns:p14="http://schemas.microsoft.com/office/powerpoint/2010/main" val="1986291368"/>
+      </p:ext>
+    </p:extLst>
+  </p:cSld>
+  <p:clrMapOvr>
+    <a:masterClrMapping/>
+  </p:clrMapOvr>
+</p:sld>
+</file>
+
+<file path=ppt/slides/slide9.xml><?xml version="1.0" encoding="utf-8"?>
+<p:sld xmlns:a="http://schemas.openxmlformats.org/drawingml/2006/main" xmlns:r="http://schemas.openxmlformats.org/officeDocument/2006/relationships" xmlns:p="http://schemas.openxmlformats.org/presentationml/2006/main">
+  <p:cSld>
+    <p:spTree>
+      <p:nvGrpSpPr>
+        <p:cNvPr id="1" name=""/>
+        <p:cNvGrpSpPr/>
+        <p:nvPr/>
+      </p:nvGrpSpPr>
+      <p:grpSpPr>
+        <a:xfrm>
+          <a:off x="0" y="0"/>
+          <a:ext cx="0" cy="0"/>
+          <a:chOff x="0" y="0"/>
+          <a:chExt cx="0" cy="0"/>
+        </a:xfrm>
+      </p:grpSpPr>
+      <p:sp>
+        <p:nvSpPr>
+          <p:cNvPr id="2" name="Title 1"/>
+          <p:cNvSpPr>
+            <a:spLocks noGrp="1"/>
+          </p:cNvSpPr>
+          <p:nvPr>
+            <p:ph type="title"/>
+          </p:nvPr>
+        </p:nvSpPr>
+        <p:spPr/>
+        <p:txBody>
+          <a:bodyPr/>
+          <a:lstStyle/>
+          <a:p>
+            <a:r>
+              <a:rPr lang="en-US" dirty="0"/>
+              <a:t>Experimentation for the Textbox Size </a:t>
+            </a:r>
+          </a:p>
+        </p:txBody>
+      </p:sp>
+      <p:sp>
+        <p:nvSpPr>
+          <p:cNvPr id="3" name="Content Placeholder 2"/>
+          <p:cNvSpPr>
+            <a:spLocks noGrp="1"/>
+          </p:cNvSpPr>
+          <p:nvPr>
+            <p:ph idx="1"/>
+          </p:nvPr>
+        </p:nvSpPr>
+        <p:spPr/>
+        <p:txBody>
+          <a:bodyPr/>
+          <a:lstStyle/>
+          <a:p>
+            <a:r>
+              <a:rPr lang="en-US" dirty="0"/>
+              <a:t>Goal: Determining reasonable word spacing amount:</a:t>
+            </a:r>
+          </a:p>
+          <a:p>
+            <a:r>
+              <a:rPr lang="en-US" dirty="0"/>
+              <a:t>5 initial textbox sizes were selected  </a:t>
+            </a:r>
+          </a:p>
+        </p:txBody>
+      </p:sp>
+      <p:pic>
+        <p:nvPicPr>
+          <p:cNvPr id="4" name="Picture 3"/>
+          <p:cNvPicPr>
+            <a:picLocks noChangeAspect="1"/>
+          </p:cNvPicPr>
+          <p:nvPr/>
+        </p:nvPicPr>
+        <p:blipFill>
+          <a:blip r:embed="rId2">
+            <a:extLst>
+              <a:ext uri="{28A0092B-C50C-407E-A947-70E740481C1C}">
+                <a14:useLocalDpi xmlns:a14="http://schemas.microsoft.com/office/drawing/2010/main" val="0"/>
+              </a:ext>
+            </a:extLst>
+          </a:blip>
+          <a:stretch>
+            <a:fillRect/>
+          </a:stretch>
+        </p:blipFill>
+        <p:spPr>
+          <a:xfrm>
+            <a:off x="437610" y="3395009"/>
+            <a:ext cx="2743200" cy="1712455"/>
+          </a:xfrm>
+          <a:prstGeom prst="rect">
+            <a:avLst/>
+          </a:prstGeom>
+        </p:spPr>
+      </p:pic>
+      <p:pic>
+        <p:nvPicPr>
+          <p:cNvPr id="5" name="Picture 4"/>
+          <p:cNvPicPr>
+            <a:picLocks noChangeAspect="1"/>
+          </p:cNvPicPr>
+          <p:nvPr/>
+        </p:nvPicPr>
+        <p:blipFill>
+          <a:blip r:embed="rId3">
+            <a:extLst>
+              <a:ext uri="{28A0092B-C50C-407E-A947-70E740481C1C}">
+                <a14:useLocalDpi xmlns:a14="http://schemas.microsoft.com/office/drawing/2010/main" val="0"/>
+              </a:ext>
+            </a:extLst>
+          </a:blip>
+          <a:stretch>
+            <a:fillRect/>
+          </a:stretch>
+        </p:blipFill>
+        <p:spPr>
+          <a:xfrm>
+            <a:off x="3775821" y="3386894"/>
+            <a:ext cx="2743200" cy="1728683"/>
+          </a:xfrm>
+          <a:prstGeom prst="rect">
+            <a:avLst/>
+          </a:prstGeom>
+        </p:spPr>
+      </p:pic>
+      <p:pic>
+        <p:nvPicPr>
+          <p:cNvPr id="6" name="Picture 5"/>
+          <p:cNvPicPr>
+            <a:picLocks noChangeAspect="1"/>
+          </p:cNvPicPr>
+          <p:nvPr/>
+        </p:nvPicPr>
+        <p:blipFill>
+          <a:blip r:embed="rId4">
+            <a:extLst>
+              <a:ext uri="{28A0092B-C50C-407E-A947-70E740481C1C}">
+                <a14:useLocalDpi xmlns:a14="http://schemas.microsoft.com/office/drawing/2010/main" val="0"/>
+              </a:ext>
+            </a:extLst>
+          </a:blip>
+          <a:stretch>
+            <a:fillRect/>
+          </a:stretch>
+        </p:blipFill>
+        <p:spPr>
+          <a:xfrm>
+            <a:off x="7254102" y="3395009"/>
+            <a:ext cx="2743200" cy="1734576"/>
+          </a:xfrm>
+          <a:prstGeom prst="rect">
+            <a:avLst/>
+          </a:prstGeom>
+        </p:spPr>
+      </p:pic>
+      <p:sp>
+        <p:nvSpPr>
+          <p:cNvPr id="7" name="TextBox 6"/>
+          <p:cNvSpPr txBox="1"/>
+          <p:nvPr/>
+        </p:nvSpPr>
+        <p:spPr>
+          <a:xfrm>
+            <a:off x="890327" y="5280211"/>
+            <a:ext cx="1837765" cy="369332"/>
+          </a:xfrm>
+          <a:prstGeom prst="rect">
+            <a:avLst/>
+          </a:prstGeom>
+          <a:noFill/>
+        </p:spPr>
+        <p:txBody>
+          <a:bodyPr wrap="square" rtlCol="0">
+            <a:spAutoFit/>
+          </a:bodyPr>
+          <a:lstStyle/>
+          <a:p>
+            <a:r>
+              <a:rPr lang="en-US" dirty="0"/>
+              <a:t>11 * 5 grid line</a:t>
+            </a:r>
+          </a:p>
+        </p:txBody>
+      </p:sp>
+      <p:sp>
+        <p:nvSpPr>
+          <p:cNvPr id="8" name="TextBox 7"/>
+          <p:cNvSpPr txBox="1"/>
+          <p:nvPr/>
+        </p:nvSpPr>
+        <p:spPr>
+          <a:xfrm>
+            <a:off x="4228538" y="5298141"/>
+            <a:ext cx="1837765" cy="369332"/>
+          </a:xfrm>
+          <a:prstGeom prst="rect">
+            <a:avLst/>
+          </a:prstGeom>
+          <a:noFill/>
+        </p:spPr>
+        <p:txBody>
+          <a:bodyPr wrap="square" rtlCol="0">
+            <a:spAutoFit/>
+          </a:bodyPr>
+          <a:lstStyle/>
+          <a:p>
+            <a:r>
+              <a:rPr lang="en-US" dirty="0"/>
+              <a:t>11 * 9 grid line</a:t>
+            </a:r>
+          </a:p>
+        </p:txBody>
+      </p:sp>
+      <p:sp>
+        <p:nvSpPr>
+          <p:cNvPr id="9" name="TextBox 8"/>
+          <p:cNvSpPr txBox="1"/>
+          <p:nvPr/>
+        </p:nvSpPr>
+        <p:spPr>
+          <a:xfrm>
+            <a:off x="7706819" y="5285583"/>
+            <a:ext cx="1912310" cy="369332"/>
+          </a:xfrm>
+          <a:prstGeom prst="rect">
+            <a:avLst/>
+          </a:prstGeom>
+          <a:noFill/>
+        </p:spPr>
+        <p:txBody>
+          <a:bodyPr wrap="square" rtlCol="0">
+            <a:spAutoFit/>
+          </a:bodyPr>
+          <a:lstStyle/>
+          <a:p>
+            <a:r>
+              <a:rPr lang="en-US" dirty="0"/>
+              <a:t>11 * 11 grid line</a:t>
+            </a:r>
+          </a:p>
+        </p:txBody>
+      </p:sp>
+    </p:spTree>
+    <p:extLst>
+      <p:ext uri="{BB962C8B-B14F-4D97-AF65-F5344CB8AC3E}">
+        <p14:creationId xmlns:p14="http://schemas.microsoft.com/office/powerpoint/2010/main" val="3628369559"/>
       </p:ext>
     </p:extLst>
   </p:cSld>

</xml_diff>

<commit_message>
update Su's and Ashkan ppt
add Su’s and Ashkan’s ppt in the midterm ppt.
</commit_message>
<xml_diff>
--- a/MidtermPresentation/MidtermPresentation.pptx
+++ b/MidtermPresentation/MidtermPresentation.pptx
@@ -7,18 +7,20 @@
   <p:sldIdLst>
     <p:sldId id="256" r:id="rId2"/>
     <p:sldId id="265" r:id="rId3"/>
-    <p:sldId id="260" r:id="rId4"/>
-    <p:sldId id="261" r:id="rId5"/>
-    <p:sldId id="266" r:id="rId6"/>
-    <p:sldId id="267" r:id="rId7"/>
-    <p:sldId id="268" r:id="rId8"/>
-    <p:sldId id="269" r:id="rId9"/>
-    <p:sldId id="270" r:id="rId10"/>
-    <p:sldId id="271" r:id="rId11"/>
-    <p:sldId id="272" r:id="rId12"/>
-    <p:sldId id="273" r:id="rId13"/>
-    <p:sldId id="264" r:id="rId14"/>
-    <p:sldId id="274" r:id="rId15"/>
+    <p:sldId id="275" r:id="rId4"/>
+    <p:sldId id="276" r:id="rId5"/>
+    <p:sldId id="277" r:id="rId6"/>
+    <p:sldId id="261" r:id="rId7"/>
+    <p:sldId id="266" r:id="rId8"/>
+    <p:sldId id="267" r:id="rId9"/>
+    <p:sldId id="268" r:id="rId10"/>
+    <p:sldId id="269" r:id="rId11"/>
+    <p:sldId id="270" r:id="rId12"/>
+    <p:sldId id="278" r:id="rId13"/>
+    <p:sldId id="272" r:id="rId14"/>
+    <p:sldId id="273" r:id="rId15"/>
+    <p:sldId id="264" r:id="rId16"/>
+    <p:sldId id="274" r:id="rId17"/>
   </p:sldIdLst>
   <p:sldSz cx="12192000" cy="6858000"/>
   <p:notesSz cx="6858000" cy="9144000"/>
@@ -125,6 +127,912 @@
 </p:presentation>
 </file>
 
+<file path=ppt/charts/chart1.xml><?xml version="1.0" encoding="utf-8"?>
+<c:chartSpace xmlns:c="http://schemas.openxmlformats.org/drawingml/2006/chart" xmlns:a="http://schemas.openxmlformats.org/drawingml/2006/main" xmlns:r="http://schemas.openxmlformats.org/officeDocument/2006/relationships">
+  <c:date1904 val="0"/>
+  <c:lang val="en-US"/>
+  <c:roundedCorners val="0"/>
+  <mc:AlternateContent xmlns:mc="http://schemas.openxmlformats.org/markup-compatibility/2006">
+    <mc:Choice xmlns:c14="http://schemas.microsoft.com/office/drawing/2007/8/2/chart" Requires="c14">
+      <c14:style val="102"/>
+    </mc:Choice>
+    <mc:Fallback>
+      <c:style val="2"/>
+    </mc:Fallback>
+  </mc:AlternateContent>
+  <c:clrMapOvr bg1="lt1" tx1="dk1" bg2="lt2" tx2="dk2" accent1="accent1" accent2="accent2" accent3="accent3" accent4="accent4" accent5="accent5" accent6="accent6" hlink="hlink" folHlink="folHlink"/>
+  <c:chart>
+    <c:autoTitleDeleted val="1"/>
+    <c:plotArea>
+      <c:layout/>
+      <c:lineChart>
+        <c:grouping val="standard"/>
+        <c:varyColors val="0"/>
+        <c:ser>
+          <c:idx val="0"/>
+          <c:order val="0"/>
+          <c:tx>
+            <c:strRef>
+              <c:f>Sheet1!$B$1</c:f>
+              <c:strCache>
+                <c:ptCount val="1"/>
+                <c:pt idx="0">
+                  <c:v>accuracy</c:v>
+                </c:pt>
+              </c:strCache>
+            </c:strRef>
+          </c:tx>
+          <c:spPr>
+            <a:ln w="28575" cap="rnd">
+              <a:solidFill>
+                <a:schemeClr val="accent1"/>
+              </a:solidFill>
+              <a:round/>
+            </a:ln>
+            <a:effectLst/>
+          </c:spPr>
+          <c:marker>
+            <c:symbol val="none"/>
+          </c:marker>
+          <c:cat>
+            <c:strRef>
+              <c:f>Sheet1!$A$2:$A$6</c:f>
+              <c:strCache>
+                <c:ptCount val="5"/>
+                <c:pt idx="0">
+                  <c:v>11 * 5</c:v>
+                </c:pt>
+                <c:pt idx="1">
+                  <c:v>11 * 7</c:v>
+                </c:pt>
+                <c:pt idx="2">
+                  <c:v>11 * 9</c:v>
+                </c:pt>
+                <c:pt idx="3">
+                  <c:v>11* 11</c:v>
+                </c:pt>
+                <c:pt idx="4">
+                  <c:v>11 * 13</c:v>
+                </c:pt>
+              </c:strCache>
+            </c:strRef>
+          </c:cat>
+          <c:val>
+            <c:numRef>
+              <c:f>Sheet1!$B$2:$B$6</c:f>
+              <c:numCache>
+                <c:formatCode>General</c:formatCode>
+                <c:ptCount val="5"/>
+                <c:pt idx="0">
+                  <c:v>100.0</c:v>
+                </c:pt>
+                <c:pt idx="1">
+                  <c:v>100.0</c:v>
+                </c:pt>
+                <c:pt idx="2">
+                  <c:v>85.0</c:v>
+                </c:pt>
+                <c:pt idx="3">
+                  <c:v>75.0</c:v>
+                </c:pt>
+                <c:pt idx="4">
+                  <c:v>55.0</c:v>
+                </c:pt>
+              </c:numCache>
+            </c:numRef>
+          </c:val>
+          <c:smooth val="0"/>
+        </c:ser>
+        <c:dLbls>
+          <c:showLegendKey val="0"/>
+          <c:showVal val="0"/>
+          <c:showCatName val="0"/>
+          <c:showSerName val="0"/>
+          <c:showPercent val="0"/>
+          <c:showBubbleSize val="0"/>
+        </c:dLbls>
+        <c:smooth val="0"/>
+        <c:axId val="2146871792"/>
+        <c:axId val="2146966592"/>
+      </c:lineChart>
+      <c:catAx>
+        <c:axId val="2146871792"/>
+        <c:scaling>
+          <c:orientation val="minMax"/>
+        </c:scaling>
+        <c:delete val="0"/>
+        <c:axPos val="b"/>
+        <c:title>
+          <c:tx>
+            <c:rich>
+              <a:bodyPr rot="0" spcFirstLastPara="1" vertOverflow="ellipsis" vert="horz" wrap="square" anchor="ctr" anchorCtr="1"/>
+              <a:lstStyle/>
+              <a:p>
+                <a:pPr>
+                  <a:defRPr sz="1200" b="0" i="0" u="none" strike="noStrike" kern="1200" baseline="0">
+                    <a:solidFill>
+                      <a:sysClr val="windowText" lastClr="000000"/>
+                    </a:solidFill>
+                    <a:latin typeface="Times New Roman" panose="02020603050405020304" pitchFamily="18" charset="0"/>
+                    <a:ea typeface="+mn-ea"/>
+                    <a:cs typeface="Times New Roman" panose="02020603050405020304" pitchFamily="18" charset="0"/>
+                  </a:defRPr>
+                </a:pPr>
+                <a:r>
+                  <a:rPr lang="en-US"/>
+                  <a:t>TextBox Size</a:t>
+                </a:r>
+              </a:p>
+            </c:rich>
+          </c:tx>
+          <c:layout/>
+          <c:overlay val="0"/>
+          <c:spPr>
+            <a:noFill/>
+            <a:ln>
+              <a:noFill/>
+            </a:ln>
+            <a:effectLst/>
+          </c:spPr>
+          <c:txPr>
+            <a:bodyPr rot="0" spcFirstLastPara="1" vertOverflow="ellipsis" vert="horz" wrap="square" anchor="ctr" anchorCtr="1"/>
+            <a:lstStyle/>
+            <a:p>
+              <a:pPr>
+                <a:defRPr sz="1200" b="0" i="0" u="none" strike="noStrike" kern="1200" baseline="0">
+                  <a:solidFill>
+                    <a:sysClr val="windowText" lastClr="000000"/>
+                  </a:solidFill>
+                  <a:latin typeface="Times New Roman" panose="02020603050405020304" pitchFamily="18" charset="0"/>
+                  <a:ea typeface="+mn-ea"/>
+                  <a:cs typeface="Times New Roman" panose="02020603050405020304" pitchFamily="18" charset="0"/>
+                </a:defRPr>
+              </a:pPr>
+              <a:endParaRPr lang="en-US"/>
+            </a:p>
+          </c:txPr>
+        </c:title>
+        <c:numFmt formatCode="General" sourceLinked="1"/>
+        <c:majorTickMark val="none"/>
+        <c:minorTickMark val="none"/>
+        <c:tickLblPos val="nextTo"/>
+        <c:spPr>
+          <a:noFill/>
+          <a:ln w="9525" cap="flat" cmpd="sng" algn="ctr">
+            <a:solidFill>
+              <a:schemeClr val="tx1">
+                <a:lumMod val="15000"/>
+                <a:lumOff val="85000"/>
+              </a:schemeClr>
+            </a:solidFill>
+            <a:round/>
+          </a:ln>
+          <a:effectLst/>
+        </c:spPr>
+        <c:txPr>
+          <a:bodyPr rot="-60000000" spcFirstLastPara="1" vertOverflow="ellipsis" vert="horz" wrap="square" anchor="ctr" anchorCtr="1"/>
+          <a:lstStyle/>
+          <a:p>
+            <a:pPr>
+              <a:defRPr sz="1200" b="0" i="0" u="none" strike="noStrike" kern="1200" baseline="0">
+                <a:solidFill>
+                  <a:sysClr val="windowText" lastClr="000000"/>
+                </a:solidFill>
+                <a:latin typeface="Times New Roman" panose="02020603050405020304" pitchFamily="18" charset="0"/>
+                <a:ea typeface="+mn-ea"/>
+                <a:cs typeface="Times New Roman" panose="02020603050405020304" pitchFamily="18" charset="0"/>
+              </a:defRPr>
+            </a:pPr>
+            <a:endParaRPr lang="en-US"/>
+          </a:p>
+        </c:txPr>
+        <c:crossAx val="2146966592"/>
+        <c:crosses val="autoZero"/>
+        <c:auto val="1"/>
+        <c:lblAlgn val="ctr"/>
+        <c:lblOffset val="100"/>
+        <c:noMultiLvlLbl val="0"/>
+      </c:catAx>
+      <c:valAx>
+        <c:axId val="2146966592"/>
+        <c:scaling>
+          <c:orientation val="minMax"/>
+        </c:scaling>
+        <c:delete val="0"/>
+        <c:axPos val="l"/>
+        <c:majorGridlines>
+          <c:spPr>
+            <a:ln w="9525" cap="flat" cmpd="sng" algn="ctr">
+              <a:solidFill>
+                <a:schemeClr val="tx1">
+                  <a:lumMod val="15000"/>
+                  <a:lumOff val="85000"/>
+                </a:schemeClr>
+              </a:solidFill>
+              <a:round/>
+            </a:ln>
+            <a:effectLst/>
+          </c:spPr>
+        </c:majorGridlines>
+        <c:title>
+          <c:tx>
+            <c:rich>
+              <a:bodyPr rot="-5400000" spcFirstLastPara="1" vertOverflow="ellipsis" vert="horz" wrap="square" anchor="ctr" anchorCtr="1"/>
+              <a:lstStyle/>
+              <a:p>
+                <a:pPr>
+                  <a:defRPr sz="1200" b="0" i="0" u="none" strike="noStrike" kern="1200" baseline="0">
+                    <a:solidFill>
+                      <a:sysClr val="windowText" lastClr="000000"/>
+                    </a:solidFill>
+                    <a:latin typeface="Times New Roman" panose="02020603050405020304" pitchFamily="18" charset="0"/>
+                    <a:ea typeface="+mn-ea"/>
+                    <a:cs typeface="Times New Roman" panose="02020603050405020304" pitchFamily="18" charset="0"/>
+                  </a:defRPr>
+                </a:pPr>
+                <a:r>
+                  <a:rPr lang="en-US"/>
+                  <a:t>Accuracy %</a:t>
+                </a:r>
+              </a:p>
+            </c:rich>
+          </c:tx>
+          <c:layout/>
+          <c:overlay val="0"/>
+          <c:spPr>
+            <a:noFill/>
+            <a:ln>
+              <a:noFill/>
+            </a:ln>
+            <a:effectLst/>
+          </c:spPr>
+          <c:txPr>
+            <a:bodyPr rot="-5400000" spcFirstLastPara="1" vertOverflow="ellipsis" vert="horz" wrap="square" anchor="ctr" anchorCtr="1"/>
+            <a:lstStyle/>
+            <a:p>
+              <a:pPr>
+                <a:defRPr sz="1200" b="0" i="0" u="none" strike="noStrike" kern="1200" baseline="0">
+                  <a:solidFill>
+                    <a:sysClr val="windowText" lastClr="000000"/>
+                  </a:solidFill>
+                  <a:latin typeface="Times New Roman" panose="02020603050405020304" pitchFamily="18" charset="0"/>
+                  <a:ea typeface="+mn-ea"/>
+                  <a:cs typeface="Times New Roman" panose="02020603050405020304" pitchFamily="18" charset="0"/>
+                </a:defRPr>
+              </a:pPr>
+              <a:endParaRPr lang="en-US"/>
+            </a:p>
+          </c:txPr>
+        </c:title>
+        <c:numFmt formatCode="General" sourceLinked="1"/>
+        <c:majorTickMark val="none"/>
+        <c:minorTickMark val="none"/>
+        <c:tickLblPos val="nextTo"/>
+        <c:spPr>
+          <a:noFill/>
+          <a:ln>
+            <a:noFill/>
+          </a:ln>
+          <a:effectLst/>
+        </c:spPr>
+        <c:txPr>
+          <a:bodyPr rot="-60000000" spcFirstLastPara="1" vertOverflow="ellipsis" vert="horz" wrap="square" anchor="ctr" anchorCtr="1"/>
+          <a:lstStyle/>
+          <a:p>
+            <a:pPr>
+              <a:defRPr sz="1200" b="0" i="0" u="none" strike="noStrike" kern="1200" baseline="0">
+                <a:solidFill>
+                  <a:sysClr val="windowText" lastClr="000000"/>
+                </a:solidFill>
+                <a:latin typeface="Times New Roman" panose="02020603050405020304" pitchFamily="18" charset="0"/>
+                <a:ea typeface="+mn-ea"/>
+                <a:cs typeface="Times New Roman" panose="02020603050405020304" pitchFamily="18" charset="0"/>
+              </a:defRPr>
+            </a:pPr>
+            <a:endParaRPr lang="en-US"/>
+          </a:p>
+        </c:txPr>
+        <c:crossAx val="2146871792"/>
+        <c:crosses val="autoZero"/>
+        <c:crossBetween val="between"/>
+      </c:valAx>
+      <c:spPr>
+        <a:noFill/>
+        <a:ln>
+          <a:noFill/>
+        </a:ln>
+        <a:effectLst/>
+      </c:spPr>
+    </c:plotArea>
+    <c:plotVisOnly val="1"/>
+    <c:dispBlanksAs val="gap"/>
+    <c:showDLblsOverMax val="0"/>
+  </c:chart>
+  <c:spPr>
+    <a:noFill/>
+    <a:ln>
+      <a:noFill/>
+    </a:ln>
+    <a:effectLst/>
+  </c:spPr>
+  <c:txPr>
+    <a:bodyPr/>
+    <a:lstStyle/>
+    <a:p>
+      <a:pPr>
+        <a:defRPr sz="1200">
+          <a:solidFill>
+            <a:sysClr val="windowText" lastClr="000000"/>
+          </a:solidFill>
+          <a:latin typeface="Times New Roman" panose="02020603050405020304" pitchFamily="18" charset="0"/>
+          <a:cs typeface="Times New Roman" panose="02020603050405020304" pitchFamily="18" charset="0"/>
+        </a:defRPr>
+      </a:pPr>
+      <a:endParaRPr lang="en-US"/>
+    </a:p>
+  </c:txPr>
+  <c:externalData r:id="rId4">
+    <c:autoUpdate val="0"/>
+  </c:externalData>
+</c:chartSpace>
+</file>
+
+<file path=ppt/charts/colors1.xml><?xml version="1.0" encoding="utf-8"?>
+<cs:colorStyle xmlns:cs="http://schemas.microsoft.com/office/drawing/2012/chartStyle" xmlns:a="http://schemas.openxmlformats.org/drawingml/2006/main" meth="cycle" id="10">
+  <a:schemeClr val="accent1"/>
+  <a:schemeClr val="accent2"/>
+  <a:schemeClr val="accent3"/>
+  <a:schemeClr val="accent4"/>
+  <a:schemeClr val="accent5"/>
+  <a:schemeClr val="accent6"/>
+  <cs:variation/>
+  <cs:variation>
+    <a:lumMod val="60000"/>
+  </cs:variation>
+  <cs:variation>
+    <a:lumMod val="80000"/>
+    <a:lumOff val="20000"/>
+  </cs:variation>
+  <cs:variation>
+    <a:lumMod val="80000"/>
+  </cs:variation>
+  <cs:variation>
+    <a:lumMod val="60000"/>
+    <a:lumOff val="40000"/>
+  </cs:variation>
+  <cs:variation>
+    <a:lumMod val="50000"/>
+  </cs:variation>
+  <cs:variation>
+    <a:lumMod val="70000"/>
+    <a:lumOff val="30000"/>
+  </cs:variation>
+  <cs:variation>
+    <a:lumMod val="70000"/>
+  </cs:variation>
+  <cs:variation>
+    <a:lumMod val="50000"/>
+    <a:lumOff val="50000"/>
+  </cs:variation>
+</cs:colorStyle>
+</file>
+
+<file path=ppt/charts/style1.xml><?xml version="1.0" encoding="utf-8"?>
+<cs:chartStyle xmlns:cs="http://schemas.microsoft.com/office/drawing/2012/chartStyle" xmlns:a="http://schemas.openxmlformats.org/drawingml/2006/main" id="227">
+  <cs:axisTitle>
+    <cs:lnRef idx="0"/>
+    <cs:fillRef idx="0"/>
+    <cs:effectRef idx="0"/>
+    <cs:fontRef idx="minor">
+      <a:schemeClr val="tx1">
+        <a:lumMod val="65000"/>
+        <a:lumOff val="35000"/>
+      </a:schemeClr>
+    </cs:fontRef>
+    <cs:defRPr sz="1000" kern="1200"/>
+  </cs:axisTitle>
+  <cs:categoryAxis>
+    <cs:lnRef idx="0"/>
+    <cs:fillRef idx="0"/>
+    <cs:effectRef idx="0"/>
+    <cs:fontRef idx="minor">
+      <a:schemeClr val="tx1">
+        <a:lumMod val="65000"/>
+        <a:lumOff val="35000"/>
+      </a:schemeClr>
+    </cs:fontRef>
+    <cs:spPr>
+      <a:ln w="9525" cap="flat" cmpd="sng" algn="ctr">
+        <a:solidFill>
+          <a:schemeClr val="tx1">
+            <a:lumMod val="15000"/>
+            <a:lumOff val="85000"/>
+          </a:schemeClr>
+        </a:solidFill>
+        <a:round/>
+      </a:ln>
+    </cs:spPr>
+    <cs:defRPr sz="900" kern="1200"/>
+  </cs:categoryAxis>
+  <cs:chartArea mods="allowNoFillOverride allowNoLineOverride">
+    <cs:lnRef idx="0"/>
+    <cs:fillRef idx="0"/>
+    <cs:effectRef idx="0"/>
+    <cs:fontRef idx="minor">
+      <a:schemeClr val="tx1"/>
+    </cs:fontRef>
+    <cs:spPr>
+      <a:solidFill>
+        <a:schemeClr val="bg1"/>
+      </a:solidFill>
+      <a:ln w="9525" cap="flat" cmpd="sng" algn="ctr">
+        <a:solidFill>
+          <a:schemeClr val="tx1">
+            <a:lumMod val="15000"/>
+            <a:lumOff val="85000"/>
+          </a:schemeClr>
+        </a:solidFill>
+        <a:round/>
+      </a:ln>
+    </cs:spPr>
+    <cs:defRPr sz="1000" kern="1200"/>
+  </cs:chartArea>
+  <cs:dataLabel>
+    <cs:lnRef idx="0"/>
+    <cs:fillRef idx="0"/>
+    <cs:effectRef idx="0"/>
+    <cs:fontRef idx="minor">
+      <a:schemeClr val="tx1">
+        <a:lumMod val="75000"/>
+        <a:lumOff val="25000"/>
+      </a:schemeClr>
+    </cs:fontRef>
+    <cs:defRPr sz="900" kern="1200"/>
+  </cs:dataLabel>
+  <cs:dataLabelCallout>
+    <cs:lnRef idx="0"/>
+    <cs:fillRef idx="0"/>
+    <cs:effectRef idx="0"/>
+    <cs:fontRef idx="minor">
+      <a:schemeClr val="dk1">
+        <a:lumMod val="65000"/>
+        <a:lumOff val="35000"/>
+      </a:schemeClr>
+    </cs:fontRef>
+    <cs:spPr>
+      <a:solidFill>
+        <a:schemeClr val="lt1"/>
+      </a:solidFill>
+      <a:ln>
+        <a:solidFill>
+          <a:schemeClr val="dk1">
+            <a:lumMod val="25000"/>
+            <a:lumOff val="75000"/>
+          </a:schemeClr>
+        </a:solidFill>
+      </a:ln>
+    </cs:spPr>
+    <cs:defRPr sz="900" kern="1200"/>
+    <cs:bodyPr rot="0" spcFirstLastPara="1" vertOverflow="clip" horzOverflow="clip" vert="horz" wrap="square" lIns="36576" tIns="18288" rIns="36576" bIns="18288" anchor="ctr" anchorCtr="1">
+      <a:spAutoFit/>
+    </cs:bodyPr>
+  </cs:dataLabelCallout>
+  <cs:dataPoint>
+    <cs:lnRef idx="0"/>
+    <cs:fillRef idx="1">
+      <cs:styleClr val="auto"/>
+    </cs:fillRef>
+    <cs:effectRef idx="0"/>
+    <cs:fontRef idx="minor">
+      <a:schemeClr val="tx1"/>
+    </cs:fontRef>
+    <cs:spPr>
+      <a:solidFill>
+        <a:schemeClr val="phClr"/>
+      </a:solidFill>
+    </cs:spPr>
+  </cs:dataPoint>
+  <cs:dataPoint3D>
+    <cs:lnRef idx="0"/>
+    <cs:fillRef idx="1">
+      <cs:styleClr val="auto"/>
+    </cs:fillRef>
+    <cs:effectRef idx="0"/>
+    <cs:fontRef idx="minor">
+      <a:schemeClr val="tx1"/>
+    </cs:fontRef>
+    <cs:spPr>
+      <a:solidFill>
+        <a:schemeClr val="phClr"/>
+      </a:solidFill>
+    </cs:spPr>
+  </cs:dataPoint3D>
+  <cs:dataPointLine>
+    <cs:lnRef idx="0">
+      <cs:styleClr val="auto"/>
+    </cs:lnRef>
+    <cs:fillRef idx="1"/>
+    <cs:effectRef idx="0"/>
+    <cs:fontRef idx="minor">
+      <a:schemeClr val="tx1"/>
+    </cs:fontRef>
+    <cs:spPr>
+      <a:ln w="28575" cap="rnd">
+        <a:solidFill>
+          <a:schemeClr val="phClr"/>
+        </a:solidFill>
+        <a:round/>
+      </a:ln>
+    </cs:spPr>
+  </cs:dataPointLine>
+  <cs:dataPointMarker>
+    <cs:lnRef idx="0">
+      <cs:styleClr val="auto"/>
+    </cs:lnRef>
+    <cs:fillRef idx="1">
+      <cs:styleClr val="auto"/>
+    </cs:fillRef>
+    <cs:effectRef idx="0"/>
+    <cs:fontRef idx="minor">
+      <a:schemeClr val="tx1"/>
+    </cs:fontRef>
+    <cs:spPr>
+      <a:solidFill>
+        <a:schemeClr val="phClr"/>
+      </a:solidFill>
+      <a:ln w="9525">
+        <a:solidFill>
+          <a:schemeClr val="phClr"/>
+        </a:solidFill>
+      </a:ln>
+    </cs:spPr>
+  </cs:dataPointMarker>
+  <cs:dataPointMarkerLayout symbol="circle" size="5"/>
+  <cs:dataPointWireframe>
+    <cs:lnRef idx="0">
+      <cs:styleClr val="auto"/>
+    </cs:lnRef>
+    <cs:fillRef idx="1"/>
+    <cs:effectRef idx="0"/>
+    <cs:fontRef idx="minor">
+      <a:schemeClr val="tx1"/>
+    </cs:fontRef>
+    <cs:spPr>
+      <a:ln w="9525" cap="rnd">
+        <a:solidFill>
+          <a:schemeClr val="phClr"/>
+        </a:solidFill>
+        <a:round/>
+      </a:ln>
+    </cs:spPr>
+  </cs:dataPointWireframe>
+  <cs:dataTable>
+    <cs:lnRef idx="0"/>
+    <cs:fillRef idx="0"/>
+    <cs:effectRef idx="0"/>
+    <cs:fontRef idx="minor">
+      <a:schemeClr val="tx1">
+        <a:lumMod val="65000"/>
+        <a:lumOff val="35000"/>
+      </a:schemeClr>
+    </cs:fontRef>
+    <cs:spPr>
+      <a:noFill/>
+      <a:ln w="9525" cap="flat" cmpd="sng" algn="ctr">
+        <a:solidFill>
+          <a:schemeClr val="tx1">
+            <a:lumMod val="15000"/>
+            <a:lumOff val="85000"/>
+          </a:schemeClr>
+        </a:solidFill>
+        <a:round/>
+      </a:ln>
+    </cs:spPr>
+    <cs:defRPr sz="900" kern="1200"/>
+  </cs:dataTable>
+  <cs:downBar>
+    <cs:lnRef idx="0"/>
+    <cs:fillRef idx="0"/>
+    <cs:effectRef idx="0"/>
+    <cs:fontRef idx="minor">
+      <a:schemeClr val="dk1"/>
+    </cs:fontRef>
+    <cs:spPr>
+      <a:solidFill>
+        <a:schemeClr val="dk1">
+          <a:lumMod val="65000"/>
+          <a:lumOff val="35000"/>
+        </a:schemeClr>
+      </a:solidFill>
+      <a:ln w="9525">
+        <a:solidFill>
+          <a:schemeClr val="tx1">
+            <a:lumMod val="65000"/>
+            <a:lumOff val="35000"/>
+          </a:schemeClr>
+        </a:solidFill>
+      </a:ln>
+    </cs:spPr>
+  </cs:downBar>
+  <cs:dropLine>
+    <cs:lnRef idx="0"/>
+    <cs:fillRef idx="0"/>
+    <cs:effectRef idx="0"/>
+    <cs:fontRef idx="minor">
+      <a:schemeClr val="tx1"/>
+    </cs:fontRef>
+    <cs:spPr>
+      <a:ln w="9525" cap="flat" cmpd="sng" algn="ctr">
+        <a:solidFill>
+          <a:schemeClr val="tx1">
+            <a:lumMod val="35000"/>
+            <a:lumOff val="65000"/>
+          </a:schemeClr>
+        </a:solidFill>
+        <a:round/>
+      </a:ln>
+    </cs:spPr>
+  </cs:dropLine>
+  <cs:errorBar>
+    <cs:lnRef idx="0"/>
+    <cs:fillRef idx="0"/>
+    <cs:effectRef idx="0"/>
+    <cs:fontRef idx="minor">
+      <a:schemeClr val="tx1"/>
+    </cs:fontRef>
+    <cs:spPr>
+      <a:ln w="9525" cap="flat" cmpd="sng" algn="ctr">
+        <a:solidFill>
+          <a:schemeClr val="tx1">
+            <a:lumMod val="65000"/>
+            <a:lumOff val="35000"/>
+          </a:schemeClr>
+        </a:solidFill>
+        <a:round/>
+      </a:ln>
+    </cs:spPr>
+  </cs:errorBar>
+  <cs:floor>
+    <cs:lnRef idx="0"/>
+    <cs:fillRef idx="0"/>
+    <cs:effectRef idx="0"/>
+    <cs:fontRef idx="minor">
+      <a:schemeClr val="tx1"/>
+    </cs:fontRef>
+    <cs:spPr>
+      <a:noFill/>
+      <a:ln>
+        <a:noFill/>
+      </a:ln>
+    </cs:spPr>
+  </cs:floor>
+  <cs:gridlineMajor>
+    <cs:lnRef idx="0"/>
+    <cs:fillRef idx="0"/>
+    <cs:effectRef idx="0"/>
+    <cs:fontRef idx="minor">
+      <a:schemeClr val="tx1"/>
+    </cs:fontRef>
+    <cs:spPr>
+      <a:ln w="9525" cap="flat" cmpd="sng" algn="ctr">
+        <a:solidFill>
+          <a:schemeClr val="tx1">
+            <a:lumMod val="15000"/>
+            <a:lumOff val="85000"/>
+          </a:schemeClr>
+        </a:solidFill>
+        <a:round/>
+      </a:ln>
+    </cs:spPr>
+  </cs:gridlineMajor>
+  <cs:gridlineMinor>
+    <cs:lnRef idx="0"/>
+    <cs:fillRef idx="0"/>
+    <cs:effectRef idx="0"/>
+    <cs:fontRef idx="minor">
+      <a:schemeClr val="tx1"/>
+    </cs:fontRef>
+    <cs:spPr>
+      <a:ln w="9525" cap="flat" cmpd="sng" algn="ctr">
+        <a:solidFill>
+          <a:schemeClr val="tx1">
+            <a:lumMod val="5000"/>
+            <a:lumOff val="95000"/>
+          </a:schemeClr>
+        </a:solidFill>
+        <a:round/>
+      </a:ln>
+    </cs:spPr>
+  </cs:gridlineMinor>
+  <cs:hiLoLine>
+    <cs:lnRef idx="0"/>
+    <cs:fillRef idx="0"/>
+    <cs:effectRef idx="0"/>
+    <cs:fontRef idx="minor">
+      <a:schemeClr val="tx1"/>
+    </cs:fontRef>
+    <cs:spPr>
+      <a:ln w="9525" cap="flat" cmpd="sng" algn="ctr">
+        <a:solidFill>
+          <a:schemeClr val="tx1">
+            <a:lumMod val="75000"/>
+            <a:lumOff val="25000"/>
+          </a:schemeClr>
+        </a:solidFill>
+        <a:round/>
+      </a:ln>
+    </cs:spPr>
+  </cs:hiLoLine>
+  <cs:leaderLine>
+    <cs:lnRef idx="0"/>
+    <cs:fillRef idx="0"/>
+    <cs:effectRef idx="0"/>
+    <cs:fontRef idx="minor">
+      <a:schemeClr val="tx1"/>
+    </cs:fontRef>
+    <cs:spPr>
+      <a:ln w="9525" cap="flat" cmpd="sng" algn="ctr">
+        <a:solidFill>
+          <a:schemeClr val="tx1">
+            <a:lumMod val="35000"/>
+            <a:lumOff val="65000"/>
+          </a:schemeClr>
+        </a:solidFill>
+        <a:round/>
+      </a:ln>
+    </cs:spPr>
+  </cs:leaderLine>
+  <cs:legend>
+    <cs:lnRef idx="0"/>
+    <cs:fillRef idx="0"/>
+    <cs:effectRef idx="0"/>
+    <cs:fontRef idx="minor">
+      <a:schemeClr val="tx1">
+        <a:lumMod val="65000"/>
+        <a:lumOff val="35000"/>
+      </a:schemeClr>
+    </cs:fontRef>
+    <cs:defRPr sz="900" kern="1200"/>
+  </cs:legend>
+  <cs:plotArea mods="allowNoFillOverride allowNoLineOverride">
+    <cs:lnRef idx="0"/>
+    <cs:fillRef idx="0"/>
+    <cs:effectRef idx="0"/>
+    <cs:fontRef idx="minor">
+      <a:schemeClr val="tx1"/>
+    </cs:fontRef>
+  </cs:plotArea>
+  <cs:plotArea3D mods="allowNoFillOverride allowNoLineOverride">
+    <cs:lnRef idx="0"/>
+    <cs:fillRef idx="0"/>
+    <cs:effectRef idx="0"/>
+    <cs:fontRef idx="minor">
+      <a:schemeClr val="tx1"/>
+    </cs:fontRef>
+  </cs:plotArea3D>
+  <cs:seriesAxis>
+    <cs:lnRef idx="0"/>
+    <cs:fillRef idx="0"/>
+    <cs:effectRef idx="0"/>
+    <cs:fontRef idx="minor">
+      <a:schemeClr val="tx1">
+        <a:lumMod val="65000"/>
+        <a:lumOff val="35000"/>
+      </a:schemeClr>
+    </cs:fontRef>
+    <cs:defRPr sz="900" kern="1200"/>
+  </cs:seriesAxis>
+  <cs:seriesLine>
+    <cs:lnRef idx="0"/>
+    <cs:fillRef idx="0"/>
+    <cs:effectRef idx="0"/>
+    <cs:fontRef idx="minor">
+      <a:schemeClr val="tx1"/>
+    </cs:fontRef>
+    <cs:spPr>
+      <a:ln w="9525" cap="flat" cmpd="sng" algn="ctr">
+        <a:solidFill>
+          <a:schemeClr val="tx1">
+            <a:lumMod val="35000"/>
+            <a:lumOff val="65000"/>
+          </a:schemeClr>
+        </a:solidFill>
+        <a:round/>
+      </a:ln>
+    </cs:spPr>
+  </cs:seriesLine>
+  <cs:title>
+    <cs:lnRef idx="0"/>
+    <cs:fillRef idx="0"/>
+    <cs:effectRef idx="0"/>
+    <cs:fontRef idx="minor">
+      <a:schemeClr val="tx1">
+        <a:lumMod val="65000"/>
+        <a:lumOff val="35000"/>
+      </a:schemeClr>
+    </cs:fontRef>
+    <cs:defRPr sz="1400" b="0" kern="1200" spc="0" baseline="0"/>
+  </cs:title>
+  <cs:trendline>
+    <cs:lnRef idx="0">
+      <cs:styleClr val="auto"/>
+    </cs:lnRef>
+    <cs:fillRef idx="0"/>
+    <cs:effectRef idx="0"/>
+    <cs:fontRef idx="minor">
+      <a:schemeClr val="tx1"/>
+    </cs:fontRef>
+    <cs:spPr>
+      <a:ln w="19050" cap="rnd">
+        <a:solidFill>
+          <a:schemeClr val="phClr"/>
+        </a:solidFill>
+        <a:prstDash val="sysDot"/>
+      </a:ln>
+    </cs:spPr>
+  </cs:trendline>
+  <cs:trendlineLabel>
+    <cs:lnRef idx="0"/>
+    <cs:fillRef idx="0"/>
+    <cs:effectRef idx="0"/>
+    <cs:fontRef idx="minor">
+      <a:schemeClr val="tx1">
+        <a:lumMod val="65000"/>
+        <a:lumOff val="35000"/>
+      </a:schemeClr>
+    </cs:fontRef>
+    <cs:defRPr sz="900" kern="1200"/>
+  </cs:trendlineLabel>
+  <cs:upBar>
+    <cs:lnRef idx="0"/>
+    <cs:fillRef idx="0"/>
+    <cs:effectRef idx="0"/>
+    <cs:fontRef idx="minor">
+      <a:schemeClr val="dk1"/>
+    </cs:fontRef>
+    <cs:spPr>
+      <a:solidFill>
+        <a:schemeClr val="lt1"/>
+      </a:solidFill>
+      <a:ln w="9525">
+        <a:solidFill>
+          <a:schemeClr val="tx1">
+            <a:lumMod val="15000"/>
+            <a:lumOff val="85000"/>
+          </a:schemeClr>
+        </a:solidFill>
+      </a:ln>
+    </cs:spPr>
+  </cs:upBar>
+  <cs:valueAxis>
+    <cs:lnRef idx="0"/>
+    <cs:fillRef idx="0"/>
+    <cs:effectRef idx="0"/>
+    <cs:fontRef idx="minor">
+      <a:schemeClr val="tx1">
+        <a:lumMod val="65000"/>
+        <a:lumOff val="35000"/>
+      </a:schemeClr>
+    </cs:fontRef>
+    <cs:defRPr sz="900" kern="1200"/>
+  </cs:valueAxis>
+  <cs:wall>
+    <cs:lnRef idx="0"/>
+    <cs:fillRef idx="0"/>
+    <cs:effectRef idx="0"/>
+    <cs:fontRef idx="minor">
+      <a:schemeClr val="tx1"/>
+    </cs:fontRef>
+    <cs:spPr>
+      <a:noFill/>
+      <a:ln>
+        <a:noFill/>
+      </a:ln>
+    </cs:spPr>
+  </cs:wall>
+</cs:chartStyle>
+</file>
+
 <file path=ppt/slideLayouts/slideLayout1.xml><?xml version="1.0" encoding="utf-8"?>
 <p:sldLayout xmlns:a="http://schemas.openxmlformats.org/drawingml/2006/main" xmlns:r="http://schemas.openxmlformats.org/officeDocument/2006/relationships" xmlns:p="http://schemas.openxmlformats.org/presentationml/2006/main" showMasterSp="0" type="title" preserve="1">
   <p:cSld name="Title Slide">
@@ -293,7 +1201,7 @@
           <a:p>
             <a:fld id="{BC58CC46-0132-4CEE-ABDB-36235E875E40}" type="datetimeFigureOut">
               <a:rPr lang="en-US" smtClean="0"/>
-              <a:t>11/14/2016</a:t>
+              <a:t>11/15/16</a:t>
             </a:fld>
             <a:endParaRPr lang="en-US"/>
           </a:p>
@@ -521,7 +1429,7 @@
           <a:p>
             <a:fld id="{BC58CC46-0132-4CEE-ABDB-36235E875E40}" type="datetimeFigureOut">
               <a:rPr lang="en-US" smtClean="0"/>
-              <a:t>11/14/2016</a:t>
+              <a:t>11/15/16</a:t>
             </a:fld>
             <a:endParaRPr lang="en-US"/>
           </a:p>
@@ -701,7 +1609,7 @@
           <a:p>
             <a:fld id="{BC58CC46-0132-4CEE-ABDB-36235E875E40}" type="datetimeFigureOut">
               <a:rPr lang="en-US" smtClean="0"/>
-              <a:t>11/14/2016</a:t>
+              <a:t>11/15/16</a:t>
             </a:fld>
             <a:endParaRPr lang="en-US"/>
           </a:p>
@@ -871,7 +1779,7 @@
           <a:p>
             <a:fld id="{BC58CC46-0132-4CEE-ABDB-36235E875E40}" type="datetimeFigureOut">
               <a:rPr lang="en-US" smtClean="0"/>
-              <a:t>11/14/2016</a:t>
+              <a:t>11/15/16</a:t>
             </a:fld>
             <a:endParaRPr lang="en-US"/>
           </a:p>
@@ -1125,7 +2033,7 @@
           <a:p>
             <a:fld id="{BC58CC46-0132-4CEE-ABDB-36235E875E40}" type="datetimeFigureOut">
               <a:rPr lang="en-US" smtClean="0"/>
-              <a:t>11/14/2016</a:t>
+              <a:t>11/15/16</a:t>
             </a:fld>
             <a:endParaRPr lang="en-US"/>
           </a:p>
@@ -1451,7 +2359,7 @@
           <a:p>
             <a:fld id="{BC58CC46-0132-4CEE-ABDB-36235E875E40}" type="datetimeFigureOut">
               <a:rPr lang="en-US" smtClean="0"/>
-              <a:t>11/14/2016</a:t>
+              <a:t>11/15/16</a:t>
             </a:fld>
             <a:endParaRPr lang="en-US"/>
           </a:p>
@@ -1902,7 +2810,7 @@
           <a:p>
             <a:fld id="{BC58CC46-0132-4CEE-ABDB-36235E875E40}" type="datetimeFigureOut">
               <a:rPr lang="en-US" smtClean="0"/>
-              <a:t>11/14/2016</a:t>
+              <a:t>11/15/16</a:t>
             </a:fld>
             <a:endParaRPr lang="en-US"/>
           </a:p>
@@ -2020,7 +2928,7 @@
           <a:p>
             <a:fld id="{BC58CC46-0132-4CEE-ABDB-36235E875E40}" type="datetimeFigureOut">
               <a:rPr lang="en-US" smtClean="0"/>
-              <a:t>11/14/2016</a:t>
+              <a:t>11/15/16</a:t>
             </a:fld>
             <a:endParaRPr lang="en-US"/>
           </a:p>
@@ -2115,7 +3023,7 @@
           <a:p>
             <a:fld id="{BC58CC46-0132-4CEE-ABDB-36235E875E40}" type="datetimeFigureOut">
               <a:rPr lang="en-US" smtClean="0"/>
-              <a:t>11/14/2016</a:t>
+              <a:t>11/15/16</a:t>
             </a:fld>
             <a:endParaRPr lang="en-US"/>
           </a:p>
@@ -2402,7 +3310,7 @@
           <a:p>
             <a:fld id="{BC58CC46-0132-4CEE-ABDB-36235E875E40}" type="datetimeFigureOut">
               <a:rPr lang="en-US" smtClean="0"/>
-              <a:t>11/14/2016</a:t>
+              <a:t>11/15/16</a:t>
             </a:fld>
             <a:endParaRPr lang="en-US"/>
           </a:p>
@@ -2724,7 +3632,7 @@
           <a:p>
             <a:fld id="{BC58CC46-0132-4CEE-ABDB-36235E875E40}" type="datetimeFigureOut">
               <a:rPr lang="en-US" smtClean="0"/>
-              <a:t>11/14/2016</a:t>
+              <a:t>11/15/16</a:t>
             </a:fld>
             <a:endParaRPr lang="en-US"/>
           </a:p>
@@ -2978,7 +3886,7 @@
           <a:p>
             <a:fld id="{BC58CC46-0132-4CEE-ABDB-36235E875E40}" type="datetimeFigureOut">
               <a:rPr lang="en-US" smtClean="0"/>
-              <a:t>11/14/2016</a:t>
+              <a:t>11/15/16</a:t>
             </a:fld>
             <a:endParaRPr lang="en-US"/>
           </a:p>
@@ -3592,8 +4500,493 @@
           <a:p>
             <a:r>
               <a:rPr lang="en-US" dirty="0"/>
+              <a:t>Where does gaze fall?</a:t>
+            </a:r>
+          </a:p>
+        </p:txBody>
+      </p:sp>
+      <p:pic>
+        <p:nvPicPr>
+          <p:cNvPr id="6" name="Content Placeholder 5"/>
+          <p:cNvPicPr>
+            <a:picLocks noGrp="1" noChangeAspect="1"/>
+          </p:cNvPicPr>
+          <p:nvPr>
+            <p:ph sz="half" idx="1"/>
+          </p:nvPr>
+        </p:nvPicPr>
+        <p:blipFill>
+          <a:blip r:embed="rId2">
+            <a:extLst>
+              <a:ext uri="{28A0092B-C50C-407E-A947-70E740481C1C}">
+                <a14:useLocalDpi xmlns:a14="http://schemas.microsoft.com/office/drawing/2010/main" val="0"/>
+              </a:ext>
+            </a:extLst>
+          </a:blip>
+          <a:stretch>
+            <a:fillRect/>
+          </a:stretch>
+        </p:blipFill>
+        <p:spPr>
+          <a:xfrm>
+            <a:off x="326881" y="1691322"/>
+            <a:ext cx="4479925" cy="3357552"/>
+          </a:xfrm>
+        </p:spPr>
+      </p:pic>
+      <p:pic>
+        <p:nvPicPr>
+          <p:cNvPr id="7" name="Content Placeholder 6"/>
+          <p:cNvPicPr>
+            <a:picLocks noGrp="1" noChangeAspect="1"/>
+          </p:cNvPicPr>
+          <p:nvPr>
+            <p:ph sz="half" idx="2"/>
+          </p:nvPr>
+        </p:nvPicPr>
+        <p:blipFill>
+          <a:blip r:embed="rId3">
+            <a:extLst>
+              <a:ext uri="{28A0092B-C50C-407E-A947-70E740481C1C}">
+                <a14:useLocalDpi xmlns:a14="http://schemas.microsoft.com/office/drawing/2010/main" val="0"/>
+              </a:ext>
+            </a:extLst>
+          </a:blip>
+          <a:stretch>
+            <a:fillRect/>
+          </a:stretch>
+        </p:blipFill>
+        <p:spPr>
+          <a:xfrm>
+            <a:off x="2205327" y="5262205"/>
+            <a:ext cx="4481512" cy="975873"/>
+          </a:xfrm>
+        </p:spPr>
+      </p:pic>
+      <p:sp>
+        <p:nvSpPr>
+          <p:cNvPr id="8" name="TextBox 7"/>
+          <p:cNvSpPr txBox="1"/>
+          <p:nvPr/>
+        </p:nvSpPr>
+        <p:spPr>
+          <a:xfrm>
+            <a:off x="3414244" y="6235936"/>
+            <a:ext cx="2063677" cy="276999"/>
+          </a:xfrm>
+          <a:prstGeom prst="rect">
+            <a:avLst/>
+          </a:prstGeom>
+          <a:noFill/>
+        </p:spPr>
+        <p:txBody>
+          <a:bodyPr wrap="square" rtlCol="0">
+            <a:spAutoFit/>
+          </a:bodyPr>
+          <a:lstStyle/>
+          <a:p>
+            <a:r>
+              <a:rPr lang="en-US" sz="1200" dirty="0"/>
+              <a:t>Retrieved from Wikipedia</a:t>
+            </a:r>
+          </a:p>
+        </p:txBody>
+      </p:sp>
+      <p:sp>
+        <p:nvSpPr>
+          <p:cNvPr id="9" name="TextBox 8"/>
+          <p:cNvSpPr txBox="1"/>
+          <p:nvPr/>
+        </p:nvSpPr>
+        <p:spPr>
+          <a:xfrm>
+            <a:off x="326881" y="5017040"/>
+            <a:ext cx="2327564" cy="276999"/>
+          </a:xfrm>
+          <a:prstGeom prst="rect">
+            <a:avLst/>
+          </a:prstGeom>
+          <a:noFill/>
+        </p:spPr>
+        <p:txBody>
+          <a:bodyPr wrap="square" rtlCol="0">
+            <a:spAutoFit/>
+          </a:bodyPr>
+          <a:lstStyle/>
+          <a:p>
+            <a:r>
+              <a:rPr lang="en-US" sz="1200" dirty="0"/>
+              <a:t>Evans and Saint-Aubin, 2005</a:t>
+            </a:r>
+          </a:p>
+        </p:txBody>
+      </p:sp>
+      <p:pic>
+        <p:nvPicPr>
+          <p:cNvPr id="10" name="Picture 9"/>
+          <p:cNvPicPr>
+            <a:picLocks noChangeAspect="1"/>
+          </p:cNvPicPr>
+          <p:nvPr/>
+        </p:nvPicPr>
+        <p:blipFill>
+          <a:blip r:embed="rId4">
+            <a:extLst>
+              <a:ext uri="{28A0092B-C50C-407E-A947-70E740481C1C}">
+                <a14:useLocalDpi xmlns:a14="http://schemas.microsoft.com/office/drawing/2010/main" val="0"/>
+              </a:ext>
+            </a:extLst>
+          </a:blip>
+          <a:stretch>
+            <a:fillRect/>
+          </a:stretch>
+        </p:blipFill>
+        <p:spPr>
+          <a:xfrm>
+            <a:off x="6247824" y="1828512"/>
+            <a:ext cx="4260848" cy="3195636"/>
+          </a:xfrm>
+          <a:prstGeom prst="rect">
+            <a:avLst/>
+          </a:prstGeom>
+        </p:spPr>
+      </p:pic>
+      <p:sp>
+        <p:nvSpPr>
+          <p:cNvPr id="11" name="TextBox 10"/>
+          <p:cNvSpPr txBox="1"/>
+          <p:nvPr/>
+        </p:nvSpPr>
+        <p:spPr>
+          <a:xfrm>
+            <a:off x="7268459" y="5011988"/>
+            <a:ext cx="2219577" cy="276999"/>
+          </a:xfrm>
+          <a:prstGeom prst="rect">
+            <a:avLst/>
+          </a:prstGeom>
+          <a:noFill/>
+        </p:spPr>
+        <p:txBody>
+          <a:bodyPr wrap="square" rtlCol="0">
+            <a:spAutoFit/>
+          </a:bodyPr>
+          <a:lstStyle/>
+          <a:p>
+            <a:r>
+              <a:rPr lang="en-US" sz="1200" dirty="0"/>
+              <a:t>Retrieved from Usability.gov</a:t>
+            </a:r>
+          </a:p>
+        </p:txBody>
+      </p:sp>
+    </p:spTree>
+    <p:extLst>
+      <p:ext uri="{BB962C8B-B14F-4D97-AF65-F5344CB8AC3E}">
+        <p14:creationId xmlns:p14="http://schemas.microsoft.com/office/powerpoint/2010/main" val="1986291368"/>
+      </p:ext>
+    </p:extLst>
+  </p:cSld>
+  <p:clrMapOvr>
+    <a:masterClrMapping/>
+  </p:clrMapOvr>
+</p:sld>
+</file>
+
+<file path=ppt/slides/slide11.xml><?xml version="1.0" encoding="utf-8"?>
+<p:sld xmlns:a="http://schemas.openxmlformats.org/drawingml/2006/main" xmlns:r="http://schemas.openxmlformats.org/officeDocument/2006/relationships" xmlns:p="http://schemas.openxmlformats.org/presentationml/2006/main">
+  <p:cSld>
+    <p:spTree>
+      <p:nvGrpSpPr>
+        <p:cNvPr id="1" name=""/>
+        <p:cNvGrpSpPr/>
+        <p:nvPr/>
+      </p:nvGrpSpPr>
+      <p:grpSpPr>
+        <a:xfrm>
+          <a:off x="0" y="0"/>
+          <a:ext cx="0" cy="0"/>
+          <a:chOff x="0" y="0"/>
+          <a:chExt cx="0" cy="0"/>
+        </a:xfrm>
+      </p:grpSpPr>
+      <p:sp>
+        <p:nvSpPr>
+          <p:cNvPr id="2" name="Title 1"/>
+          <p:cNvSpPr>
+            <a:spLocks noGrp="1"/>
+          </p:cNvSpPr>
+          <p:nvPr>
+            <p:ph type="title"/>
+          </p:nvPr>
+        </p:nvSpPr>
+        <p:spPr/>
+        <p:txBody>
+          <a:bodyPr/>
+          <a:lstStyle/>
+          <a:p>
+            <a:r>
+              <a:rPr lang="en-US" dirty="0"/>
               <a:t>Experimentation for the Textbox Size </a:t>
             </a:r>
+          </a:p>
+        </p:txBody>
+      </p:sp>
+      <p:sp>
+        <p:nvSpPr>
+          <p:cNvPr id="3" name="Content Placeholder 2"/>
+          <p:cNvSpPr>
+            <a:spLocks noGrp="1"/>
+          </p:cNvSpPr>
+          <p:nvPr>
+            <p:ph idx="1"/>
+          </p:nvPr>
+        </p:nvSpPr>
+        <p:spPr/>
+        <p:txBody>
+          <a:bodyPr/>
+          <a:lstStyle/>
+          <a:p>
+            <a:r>
+              <a:rPr lang="en-US" dirty="0"/>
+              <a:t>Goal: Determining reasonable word spacing amount:</a:t>
+            </a:r>
+          </a:p>
+          <a:p>
+            <a:r>
+              <a:rPr lang="en-US" dirty="0"/>
+              <a:t>5 initial textbox sizes were selected  </a:t>
+            </a:r>
+          </a:p>
+        </p:txBody>
+      </p:sp>
+      <p:pic>
+        <p:nvPicPr>
+          <p:cNvPr id="4" name="Picture 3"/>
+          <p:cNvPicPr>
+            <a:picLocks noChangeAspect="1"/>
+          </p:cNvPicPr>
+          <p:nvPr/>
+        </p:nvPicPr>
+        <p:blipFill>
+          <a:blip r:embed="rId2">
+            <a:extLst>
+              <a:ext uri="{28A0092B-C50C-407E-A947-70E740481C1C}">
+                <a14:useLocalDpi xmlns:a14="http://schemas.microsoft.com/office/drawing/2010/main" val="0"/>
+              </a:ext>
+            </a:extLst>
+          </a:blip>
+          <a:stretch>
+            <a:fillRect/>
+          </a:stretch>
+        </p:blipFill>
+        <p:spPr>
+          <a:xfrm>
+            <a:off x="437610" y="3395009"/>
+            <a:ext cx="2743200" cy="1712455"/>
+          </a:xfrm>
+          <a:prstGeom prst="rect">
+            <a:avLst/>
+          </a:prstGeom>
+        </p:spPr>
+      </p:pic>
+      <p:pic>
+        <p:nvPicPr>
+          <p:cNvPr id="5" name="Picture 4"/>
+          <p:cNvPicPr>
+            <a:picLocks noChangeAspect="1"/>
+          </p:cNvPicPr>
+          <p:nvPr/>
+        </p:nvPicPr>
+        <p:blipFill>
+          <a:blip r:embed="rId3">
+            <a:extLst>
+              <a:ext uri="{28A0092B-C50C-407E-A947-70E740481C1C}">
+                <a14:useLocalDpi xmlns:a14="http://schemas.microsoft.com/office/drawing/2010/main" val="0"/>
+              </a:ext>
+            </a:extLst>
+          </a:blip>
+          <a:stretch>
+            <a:fillRect/>
+          </a:stretch>
+        </p:blipFill>
+        <p:spPr>
+          <a:xfrm>
+            <a:off x="3775821" y="3386894"/>
+            <a:ext cx="2743200" cy="1728683"/>
+          </a:xfrm>
+          <a:prstGeom prst="rect">
+            <a:avLst/>
+          </a:prstGeom>
+        </p:spPr>
+      </p:pic>
+      <p:pic>
+        <p:nvPicPr>
+          <p:cNvPr id="6" name="Picture 5"/>
+          <p:cNvPicPr>
+            <a:picLocks noChangeAspect="1"/>
+          </p:cNvPicPr>
+          <p:nvPr/>
+        </p:nvPicPr>
+        <p:blipFill>
+          <a:blip r:embed="rId4">
+            <a:extLst>
+              <a:ext uri="{28A0092B-C50C-407E-A947-70E740481C1C}">
+                <a14:useLocalDpi xmlns:a14="http://schemas.microsoft.com/office/drawing/2010/main" val="0"/>
+              </a:ext>
+            </a:extLst>
+          </a:blip>
+          <a:stretch>
+            <a:fillRect/>
+          </a:stretch>
+        </p:blipFill>
+        <p:spPr>
+          <a:xfrm>
+            <a:off x="7254102" y="3395009"/>
+            <a:ext cx="2743200" cy="1734576"/>
+          </a:xfrm>
+          <a:prstGeom prst="rect">
+            <a:avLst/>
+          </a:prstGeom>
+        </p:spPr>
+      </p:pic>
+      <p:sp>
+        <p:nvSpPr>
+          <p:cNvPr id="7" name="TextBox 6"/>
+          <p:cNvSpPr txBox="1"/>
+          <p:nvPr/>
+        </p:nvSpPr>
+        <p:spPr>
+          <a:xfrm>
+            <a:off x="890327" y="5280211"/>
+            <a:ext cx="1837765" cy="369332"/>
+          </a:xfrm>
+          <a:prstGeom prst="rect">
+            <a:avLst/>
+          </a:prstGeom>
+          <a:noFill/>
+        </p:spPr>
+        <p:txBody>
+          <a:bodyPr wrap="square" rtlCol="0">
+            <a:spAutoFit/>
+          </a:bodyPr>
+          <a:lstStyle/>
+          <a:p>
+            <a:r>
+              <a:rPr lang="en-US" dirty="0"/>
+              <a:t>11 * 5 grid line</a:t>
+            </a:r>
+          </a:p>
+        </p:txBody>
+      </p:sp>
+      <p:sp>
+        <p:nvSpPr>
+          <p:cNvPr id="8" name="TextBox 7"/>
+          <p:cNvSpPr txBox="1"/>
+          <p:nvPr/>
+        </p:nvSpPr>
+        <p:spPr>
+          <a:xfrm>
+            <a:off x="4228538" y="5298141"/>
+            <a:ext cx="1837765" cy="369332"/>
+          </a:xfrm>
+          <a:prstGeom prst="rect">
+            <a:avLst/>
+          </a:prstGeom>
+          <a:noFill/>
+        </p:spPr>
+        <p:txBody>
+          <a:bodyPr wrap="square" rtlCol="0">
+            <a:spAutoFit/>
+          </a:bodyPr>
+          <a:lstStyle/>
+          <a:p>
+            <a:r>
+              <a:rPr lang="en-US" dirty="0"/>
+              <a:t>11 * 9 grid line</a:t>
+            </a:r>
+          </a:p>
+        </p:txBody>
+      </p:sp>
+      <p:sp>
+        <p:nvSpPr>
+          <p:cNvPr id="9" name="TextBox 8"/>
+          <p:cNvSpPr txBox="1"/>
+          <p:nvPr/>
+        </p:nvSpPr>
+        <p:spPr>
+          <a:xfrm>
+            <a:off x="7706819" y="5285583"/>
+            <a:ext cx="1912310" cy="369332"/>
+          </a:xfrm>
+          <a:prstGeom prst="rect">
+            <a:avLst/>
+          </a:prstGeom>
+          <a:noFill/>
+        </p:spPr>
+        <p:txBody>
+          <a:bodyPr wrap="square" rtlCol="0">
+            <a:spAutoFit/>
+          </a:bodyPr>
+          <a:lstStyle/>
+          <a:p>
+            <a:r>
+              <a:rPr lang="en-US" dirty="0"/>
+              <a:t>11 * 11 grid line</a:t>
+            </a:r>
+          </a:p>
+        </p:txBody>
+      </p:sp>
+    </p:spTree>
+    <p:extLst>
+      <p:ext uri="{BB962C8B-B14F-4D97-AF65-F5344CB8AC3E}">
+        <p14:creationId xmlns:p14="http://schemas.microsoft.com/office/powerpoint/2010/main" val="3628369559"/>
+      </p:ext>
+    </p:extLst>
+  </p:cSld>
+  <p:clrMapOvr>
+    <a:masterClrMapping/>
+  </p:clrMapOvr>
+</p:sld>
+</file>
+
+<file path=ppt/slides/slide12.xml><?xml version="1.0" encoding="utf-8"?>
+<p:sld xmlns:a="http://schemas.openxmlformats.org/drawingml/2006/main" xmlns:r="http://schemas.openxmlformats.org/officeDocument/2006/relationships" xmlns:p="http://schemas.openxmlformats.org/presentationml/2006/main">
+  <p:cSld>
+    <p:spTree>
+      <p:nvGrpSpPr>
+        <p:cNvPr id="1" name=""/>
+        <p:cNvGrpSpPr/>
+        <p:nvPr/>
+      </p:nvGrpSpPr>
+      <p:grpSpPr>
+        <a:xfrm>
+          <a:off x="0" y="0"/>
+          <a:ext cx="0" cy="0"/>
+          <a:chOff x="0" y="0"/>
+          <a:chExt cx="0" cy="0"/>
+        </a:xfrm>
+      </p:grpSpPr>
+      <p:sp>
+        <p:nvSpPr>
+          <p:cNvPr id="2" name="Title 1"/>
+          <p:cNvSpPr>
+            <a:spLocks noGrp="1"/>
+          </p:cNvSpPr>
+          <p:nvPr>
+            <p:ph type="title"/>
+          </p:nvPr>
+        </p:nvSpPr>
+        <p:spPr/>
+        <p:txBody>
+          <a:bodyPr/>
+          <a:lstStyle/>
+          <a:p>
+            <a:r>
+              <a:rPr lang="en-US" dirty="0" smtClean="0"/>
+              <a:t>Experimentation for the Textbox Size </a:t>
+            </a:r>
+            <a:endParaRPr lang="en-US" dirty="0"/>
           </a:p>
         </p:txBody>
       </p:sp>
@@ -3615,7 +5008,7 @@
               <a:lstStyle/>
               <a:p>
                 <a:r>
-                  <a:rPr lang="en-US" dirty="0"/>
+                  <a:rPr lang="en-US" dirty="0" smtClean="0"/>
                   <a:t>Goal: Determining reasonable textbox size:</a:t>
                 </a:r>
               </a:p>
@@ -3627,7 +5020,7 @@
               </a:p>
               <a:p>
                 <a:r>
-                  <a:rPr lang="en-US" dirty="0"/>
+                  <a:rPr lang="en-US" dirty="0" smtClean="0"/>
                   <a:t>  </a:t>
                 </a:r>
                 <a14:m>
@@ -3648,7 +5041,7 @@
                       <m:fPr>
                         <m:ctrlPr>
                           <a:rPr lang="en-US" b="0" i="1" smtClean="0">
-                            <a:latin typeface="Cambria Math" panose="02040503050406030204" pitchFamily="18" charset="0"/>
+                            <a:latin typeface="Cambria Math" charset="0"/>
                           </a:rPr>
                         </m:ctrlPr>
                       </m:fPr>
@@ -3770,204 +5163,80 @@
           </p:sp>
         </mc:Fallback>
       </mc:AlternateContent>
+      <p:graphicFrame>
+        <p:nvGraphicFramePr>
+          <p:cNvPr id="6" name="Chart 5"/>
+          <p:cNvGraphicFramePr>
+            <a:graphicFrameLocks/>
+          </p:cNvGraphicFramePr>
+          <p:nvPr>
+            <p:extLst/>
+          </p:nvPr>
+        </p:nvGraphicFramePr>
+        <p:xfrm>
+          <a:off x="2243137" y="3262312"/>
+          <a:ext cx="6257926" cy="3595688"/>
+        </p:xfrm>
+        <a:graphic>
+          <a:graphicData uri="http://schemas.openxmlformats.org/drawingml/2006/chart">
+            <c:chart xmlns:c="http://schemas.openxmlformats.org/drawingml/2006/chart" xmlns:r="http://schemas.openxmlformats.org/officeDocument/2006/relationships" r:id="rId3"/>
+          </a:graphicData>
+        </a:graphic>
+      </p:graphicFrame>
+      <p:cxnSp>
+        <p:nvCxnSpPr>
+          <p:cNvPr id="7" name="Straight Arrow Connector 6"/>
+          <p:cNvCxnSpPr/>
+          <p:nvPr/>
+        </p:nvCxnSpPr>
+        <p:spPr>
+          <a:xfrm flipV="1">
+            <a:off x="2967038" y="4229100"/>
+            <a:ext cx="2657475" cy="9525"/>
+          </a:xfrm>
+          <a:prstGeom prst="straightConnector1">
+            <a:avLst/>
+          </a:prstGeom>
+          <a:noFill/>
+          <a:ln w="28575" cap="flat" cmpd="sng" algn="ctr">
+            <a:solidFill>
+              <a:srgbClr val="FF0000"/>
+            </a:solidFill>
+            <a:prstDash val="solid"/>
+            <a:tailEnd type="triangle"/>
+          </a:ln>
+          <a:effectLst/>
+        </p:spPr>
+      </p:cxnSp>
+      <p:cxnSp>
+        <p:nvCxnSpPr>
+          <p:cNvPr id="8" name="Straight Arrow Connector 7"/>
+          <p:cNvCxnSpPr/>
+          <p:nvPr/>
+        </p:nvCxnSpPr>
+        <p:spPr>
+          <a:xfrm>
+            <a:off x="5624513" y="4238625"/>
+            <a:ext cx="19050" cy="1981200"/>
+          </a:xfrm>
+          <a:prstGeom prst="straightConnector1">
+            <a:avLst/>
+          </a:prstGeom>
+          <a:noFill/>
+          <a:ln w="28575" cap="flat" cmpd="sng" algn="ctr">
+            <a:solidFill>
+              <a:srgbClr val="FF0000"/>
+            </a:solidFill>
+            <a:prstDash val="solid"/>
+            <a:tailEnd type="triangle"/>
+          </a:ln>
+          <a:effectLst/>
+        </p:spPr>
+      </p:cxnSp>
     </p:spTree>
     <p:extLst>
       <p:ext uri="{BB962C8B-B14F-4D97-AF65-F5344CB8AC3E}">
-        <p14:creationId xmlns:p14="http://schemas.microsoft.com/office/powerpoint/2010/main" val="2269370597"/>
-      </p:ext>
-    </p:extLst>
-  </p:cSld>
-  <p:clrMapOvr>
-    <a:masterClrMapping/>
-  </p:clrMapOvr>
-</p:sld>
-</file>
-
-<file path=ppt/slides/slide11.xml><?xml version="1.0" encoding="utf-8"?>
-<p:sld xmlns:a="http://schemas.openxmlformats.org/drawingml/2006/main" xmlns:r="http://schemas.openxmlformats.org/officeDocument/2006/relationships" xmlns:p="http://schemas.openxmlformats.org/presentationml/2006/main">
-  <p:cSld>
-    <p:spTree>
-      <p:nvGrpSpPr>
-        <p:cNvPr id="1" name=""/>
-        <p:cNvGrpSpPr/>
-        <p:nvPr/>
-      </p:nvGrpSpPr>
-      <p:grpSpPr>
-        <a:xfrm>
-          <a:off x="0" y="0"/>
-          <a:ext cx="0" cy="0"/>
-          <a:chOff x="0" y="0"/>
-          <a:chExt cx="0" cy="0"/>
-        </a:xfrm>
-      </p:grpSpPr>
-      <p:sp>
-        <p:nvSpPr>
-          <p:cNvPr id="2" name="Title 1"/>
-          <p:cNvSpPr>
-            <a:spLocks noGrp="1"/>
-          </p:cNvSpPr>
-          <p:nvPr>
-            <p:ph type="title"/>
-          </p:nvPr>
-        </p:nvSpPr>
-        <p:spPr/>
-        <p:txBody>
-          <a:bodyPr/>
-          <a:lstStyle/>
-          <a:p>
-            <a:r>
-              <a:rPr lang="en-US" dirty="0"/>
-              <a:t>Experiment for the Delay Amounts</a:t>
-            </a:r>
-          </a:p>
-        </p:txBody>
-      </p:sp>
-      <p:sp>
-        <p:nvSpPr>
-          <p:cNvPr id="3" name="Content Placeholder 2"/>
-          <p:cNvSpPr>
-            <a:spLocks noGrp="1"/>
-          </p:cNvSpPr>
-          <p:nvPr>
-            <p:ph idx="1"/>
-          </p:nvPr>
-        </p:nvSpPr>
-        <p:spPr/>
-        <p:txBody>
-          <a:bodyPr/>
-          <a:lstStyle/>
-          <a:p>
-            <a:r>
-              <a:rPr lang="en-US" dirty="0"/>
-              <a:t>Goal: Determine reasonable delay</a:t>
-            </a:r>
-          </a:p>
-          <a:p>
-            <a:pPr lvl="1"/>
-            <a:r>
-              <a:rPr lang="en-US" dirty="0"/>
-              <a:t>Delay governs when text is activated</a:t>
-            </a:r>
-          </a:p>
-          <a:p>
-            <a:r>
-              <a:rPr lang="en-US" dirty="0"/>
-              <a:t>Setup various amounts of manual delay:</a:t>
-            </a:r>
-          </a:p>
-          <a:p>
-            <a:pPr lvl="1"/>
-            <a:r>
-              <a:rPr lang="en-US" dirty="0"/>
-              <a:t>Delay in milliseconds: 250, 500, 750, 1000</a:t>
-            </a:r>
-          </a:p>
-          <a:p>
-            <a:r>
-              <a:rPr lang="en-US" dirty="0"/>
-              <a:t>Ask participants to read segment of text where is word requires delay to activate</a:t>
-            </a:r>
-          </a:p>
-          <a:p>
-            <a:r>
-              <a:rPr lang="en-US" dirty="0"/>
-              <a:t>Participants rate user experience on Likert Scale of 1 to 5</a:t>
-            </a:r>
-          </a:p>
-          <a:p>
-            <a:pPr lvl="1"/>
-            <a:r>
-              <a:rPr lang="en-US" dirty="0"/>
-              <a:t>Require participants to provide feedback explaining choice</a:t>
-            </a:r>
-          </a:p>
-          <a:p>
-            <a:pPr lvl="1"/>
-            <a:r>
-              <a:rPr lang="en-US" dirty="0"/>
-              <a:t>Plan to choose average amount as acceptable delay</a:t>
-            </a:r>
-          </a:p>
-        </p:txBody>
-      </p:sp>
-    </p:spTree>
-    <p:extLst>
-      <p:ext uri="{BB962C8B-B14F-4D97-AF65-F5344CB8AC3E}">
-        <p14:creationId xmlns:p14="http://schemas.microsoft.com/office/powerpoint/2010/main" val="738672203"/>
-      </p:ext>
-    </p:extLst>
-  </p:cSld>
-  <p:clrMapOvr>
-    <a:masterClrMapping/>
-  </p:clrMapOvr>
-</p:sld>
-</file>
-
-<file path=ppt/slides/slide12.xml><?xml version="1.0" encoding="utf-8"?>
-<p:sld xmlns:a="http://schemas.openxmlformats.org/drawingml/2006/main" xmlns:r="http://schemas.openxmlformats.org/officeDocument/2006/relationships" xmlns:p="http://schemas.openxmlformats.org/presentationml/2006/main">
-  <p:cSld>
-    <p:spTree>
-      <p:nvGrpSpPr>
-        <p:cNvPr id="1" name=""/>
-        <p:cNvGrpSpPr/>
-        <p:nvPr/>
-      </p:nvGrpSpPr>
-      <p:grpSpPr>
-        <a:xfrm>
-          <a:off x="0" y="0"/>
-          <a:ext cx="0" cy="0"/>
-          <a:chOff x="0" y="0"/>
-          <a:chExt cx="0" cy="0"/>
-        </a:xfrm>
-      </p:grpSpPr>
-      <p:sp>
-        <p:nvSpPr>
-          <p:cNvPr id="2" name="Title 1"/>
-          <p:cNvSpPr>
-            <a:spLocks noGrp="1"/>
-          </p:cNvSpPr>
-          <p:nvPr>
-            <p:ph type="title"/>
-          </p:nvPr>
-        </p:nvSpPr>
-        <p:spPr/>
-        <p:txBody>
-          <a:bodyPr/>
-          <a:lstStyle/>
-          <a:p>
-            <a:r>
-              <a:rPr lang="en-US" dirty="0"/>
-              <a:t>Experiment on Spacing between Interactors </a:t>
-            </a:r>
-          </a:p>
-        </p:txBody>
-      </p:sp>
-      <p:sp>
-        <p:nvSpPr>
-          <p:cNvPr id="3" name="Content Placeholder 2"/>
-          <p:cNvSpPr>
-            <a:spLocks noGrp="1"/>
-          </p:cNvSpPr>
-          <p:nvPr>
-            <p:ph idx="1"/>
-          </p:nvPr>
-        </p:nvSpPr>
-        <p:spPr/>
-        <p:txBody>
-          <a:bodyPr/>
-          <a:lstStyle/>
-          <a:p>
-            <a:r>
-              <a:rPr lang="en-US" dirty="0"/>
-              <a:t>SUHAS</a:t>
-            </a:r>
-          </a:p>
-        </p:txBody>
-      </p:sp>
-    </p:spTree>
-    <p:extLst>
-      <p:ext uri="{BB962C8B-B14F-4D97-AF65-F5344CB8AC3E}">
-        <p14:creationId xmlns:p14="http://schemas.microsoft.com/office/powerpoint/2010/main" val="3194865933"/>
+        <p14:creationId xmlns:p14="http://schemas.microsoft.com/office/powerpoint/2010/main" val="303750026"/>
       </p:ext>
     </p:extLst>
   </p:cSld>
@@ -4011,6 +5280,200 @@
           <a:p>
             <a:r>
               <a:rPr lang="en-US" dirty="0"/>
+              <a:t>Experiment for the Delay Amounts</a:t>
+            </a:r>
+          </a:p>
+        </p:txBody>
+      </p:sp>
+      <p:sp>
+        <p:nvSpPr>
+          <p:cNvPr id="3" name="Content Placeholder 2"/>
+          <p:cNvSpPr>
+            <a:spLocks noGrp="1"/>
+          </p:cNvSpPr>
+          <p:nvPr>
+            <p:ph idx="1"/>
+          </p:nvPr>
+        </p:nvSpPr>
+        <p:spPr/>
+        <p:txBody>
+          <a:bodyPr/>
+          <a:lstStyle/>
+          <a:p>
+            <a:r>
+              <a:rPr lang="en-US" dirty="0"/>
+              <a:t>Goal: Determine reasonable delay</a:t>
+            </a:r>
+          </a:p>
+          <a:p>
+            <a:pPr lvl="1"/>
+            <a:r>
+              <a:rPr lang="en-US" dirty="0"/>
+              <a:t>Delay governs when text is activated</a:t>
+            </a:r>
+          </a:p>
+          <a:p>
+            <a:r>
+              <a:rPr lang="en-US" dirty="0"/>
+              <a:t>Setup various amounts of manual delay:</a:t>
+            </a:r>
+          </a:p>
+          <a:p>
+            <a:pPr lvl="1"/>
+            <a:r>
+              <a:rPr lang="en-US" dirty="0"/>
+              <a:t>Delay in milliseconds: 250, 500, 750, 1000</a:t>
+            </a:r>
+          </a:p>
+          <a:p>
+            <a:r>
+              <a:rPr lang="en-US" dirty="0"/>
+              <a:t>Ask participants to read segment of text where is word requires delay to activate</a:t>
+            </a:r>
+          </a:p>
+          <a:p>
+            <a:r>
+              <a:rPr lang="en-US" dirty="0"/>
+              <a:t>Participants rate user experience on Likert Scale of 1 to 5</a:t>
+            </a:r>
+          </a:p>
+          <a:p>
+            <a:pPr lvl="1"/>
+            <a:r>
+              <a:rPr lang="en-US" dirty="0"/>
+              <a:t>Require participants to provide feedback explaining choice</a:t>
+            </a:r>
+          </a:p>
+          <a:p>
+            <a:pPr lvl="1"/>
+            <a:r>
+              <a:rPr lang="en-US" dirty="0"/>
+              <a:t>Plan to choose average amount as acceptable delay</a:t>
+            </a:r>
+          </a:p>
+        </p:txBody>
+      </p:sp>
+    </p:spTree>
+    <p:extLst>
+      <p:ext uri="{BB962C8B-B14F-4D97-AF65-F5344CB8AC3E}">
+        <p14:creationId xmlns:p14="http://schemas.microsoft.com/office/powerpoint/2010/main" val="738672203"/>
+      </p:ext>
+    </p:extLst>
+  </p:cSld>
+  <p:clrMapOvr>
+    <a:masterClrMapping/>
+  </p:clrMapOvr>
+</p:sld>
+</file>
+
+<file path=ppt/slides/slide14.xml><?xml version="1.0" encoding="utf-8"?>
+<p:sld xmlns:a="http://schemas.openxmlformats.org/drawingml/2006/main" xmlns:r="http://schemas.openxmlformats.org/officeDocument/2006/relationships" xmlns:p="http://schemas.openxmlformats.org/presentationml/2006/main">
+  <p:cSld>
+    <p:spTree>
+      <p:nvGrpSpPr>
+        <p:cNvPr id="1" name=""/>
+        <p:cNvGrpSpPr/>
+        <p:nvPr/>
+      </p:nvGrpSpPr>
+      <p:grpSpPr>
+        <a:xfrm>
+          <a:off x="0" y="0"/>
+          <a:ext cx="0" cy="0"/>
+          <a:chOff x="0" y="0"/>
+          <a:chExt cx="0" cy="0"/>
+        </a:xfrm>
+      </p:grpSpPr>
+      <p:sp>
+        <p:nvSpPr>
+          <p:cNvPr id="2" name="Title 1"/>
+          <p:cNvSpPr>
+            <a:spLocks noGrp="1"/>
+          </p:cNvSpPr>
+          <p:nvPr>
+            <p:ph type="title"/>
+          </p:nvPr>
+        </p:nvSpPr>
+        <p:spPr/>
+        <p:txBody>
+          <a:bodyPr/>
+          <a:lstStyle/>
+          <a:p>
+            <a:r>
+              <a:rPr lang="en-US" dirty="0"/>
+              <a:t>Experiment on Spacing between Interactors </a:t>
+            </a:r>
+          </a:p>
+        </p:txBody>
+      </p:sp>
+      <p:sp>
+        <p:nvSpPr>
+          <p:cNvPr id="3" name="Content Placeholder 2"/>
+          <p:cNvSpPr>
+            <a:spLocks noGrp="1"/>
+          </p:cNvSpPr>
+          <p:nvPr>
+            <p:ph idx="1"/>
+          </p:nvPr>
+        </p:nvSpPr>
+        <p:spPr/>
+        <p:txBody>
+          <a:bodyPr/>
+          <a:lstStyle/>
+          <a:p>
+            <a:r>
+              <a:rPr lang="en-US" dirty="0"/>
+              <a:t>SUHAS</a:t>
+            </a:r>
+          </a:p>
+        </p:txBody>
+      </p:sp>
+    </p:spTree>
+    <p:extLst>
+      <p:ext uri="{BB962C8B-B14F-4D97-AF65-F5344CB8AC3E}">
+        <p14:creationId xmlns:p14="http://schemas.microsoft.com/office/powerpoint/2010/main" val="3194865933"/>
+      </p:ext>
+    </p:extLst>
+  </p:cSld>
+  <p:clrMapOvr>
+    <a:masterClrMapping/>
+  </p:clrMapOvr>
+</p:sld>
+</file>
+
+<file path=ppt/slides/slide15.xml><?xml version="1.0" encoding="utf-8"?>
+<p:sld xmlns:a="http://schemas.openxmlformats.org/drawingml/2006/main" xmlns:r="http://schemas.openxmlformats.org/officeDocument/2006/relationships" xmlns:p="http://schemas.openxmlformats.org/presentationml/2006/main">
+  <p:cSld>
+    <p:spTree>
+      <p:nvGrpSpPr>
+        <p:cNvPr id="1" name=""/>
+        <p:cNvGrpSpPr/>
+        <p:nvPr/>
+      </p:nvGrpSpPr>
+      <p:grpSpPr>
+        <a:xfrm>
+          <a:off x="0" y="0"/>
+          <a:ext cx="0" cy="0"/>
+          <a:chOff x="0" y="0"/>
+          <a:chExt cx="0" cy="0"/>
+        </a:xfrm>
+      </p:grpSpPr>
+      <p:sp>
+        <p:nvSpPr>
+          <p:cNvPr id="2" name="Title 1"/>
+          <p:cNvSpPr>
+            <a:spLocks noGrp="1"/>
+          </p:cNvSpPr>
+          <p:nvPr>
+            <p:ph type="title"/>
+          </p:nvPr>
+        </p:nvSpPr>
+        <p:spPr/>
+        <p:txBody>
+          <a:bodyPr/>
+          <a:lstStyle/>
+          <a:p>
+            <a:r>
+              <a:rPr lang="en-US" dirty="0"/>
               <a:t>Demo</a:t>
             </a:r>
           </a:p>
@@ -4079,7 +5542,7 @@
 </p:sld>
 </file>
 
-<file path=ppt/slides/slide14.xml><?xml version="1.0" encoding="utf-8"?>
+<file path=ppt/slides/slide16.xml><?xml version="1.0" encoding="utf-8"?>
 <p:sld xmlns:a="http://schemas.openxmlformats.org/drawingml/2006/main" xmlns:r="http://schemas.openxmlformats.org/officeDocument/2006/relationships" xmlns:p="http://schemas.openxmlformats.org/presentationml/2006/main">
   <p:cSld>
     <p:spTree>
@@ -4398,88 +5861,188 @@
             <p:ph type="title"/>
           </p:nvPr>
         </p:nvSpPr>
-        <p:spPr/>
+        <p:spPr>
+          <a:xfrm>
+            <a:off x="794987" y="0"/>
+            <a:ext cx="9692640" cy="1325562"/>
+          </a:xfrm>
+        </p:spPr>
         <p:txBody>
           <a:bodyPr/>
           <a:lstStyle/>
           <a:p>
             <a:r>
-              <a:rPr lang="en-US" dirty="0"/>
-              <a:t>Approach</a:t>
-            </a:r>
-          </a:p>
-        </p:txBody>
-      </p:sp>
-      <p:sp>
-        <p:nvSpPr>
-          <p:cNvPr id="3" name="Content Placeholder 2"/>
-          <p:cNvSpPr>
-            <a:spLocks noGrp="1"/>
-          </p:cNvSpPr>
+              <a:rPr lang="en-US" dirty="0" smtClean="0"/>
+              <a:t>General Idea </a:t>
+            </a:r>
+            <a:endParaRPr lang="en-US" dirty="0"/>
+          </a:p>
+        </p:txBody>
+      </p:sp>
+      <p:pic>
+        <p:nvPicPr>
+          <p:cNvPr id="6" name="Content Placeholder 5"/>
+          <p:cNvPicPr>
+            <a:picLocks noGrp="1" noChangeAspect="1"/>
+          </p:cNvPicPr>
           <p:nvPr>
             <p:ph idx="1"/>
           </p:nvPr>
-        </p:nvSpPr>
-        <p:spPr/>
-        <p:txBody>
-          <a:bodyPr/>
-          <a:lstStyle/>
-          <a:p>
-            <a:r>
-              <a:rPr lang="en-US" dirty="0"/>
-              <a:t>Describe how your system will work</a:t>
-            </a:r>
-          </a:p>
-          <a:p>
-            <a:pPr lvl="1"/>
-            <a:r>
-              <a:rPr lang="en-US" dirty="0"/>
-              <a:t>by now you should have a clear plan of action </a:t>
-            </a:r>
-          </a:p>
-          <a:p>
-            <a:r>
-              <a:rPr lang="en-US" dirty="0"/>
-              <a:t>Make sure to include:</a:t>
-            </a:r>
-          </a:p>
-          <a:p>
-            <a:pPr lvl="1"/>
-            <a:r>
-              <a:rPr lang="en-US" dirty="0"/>
-              <a:t>a diagram of showing the components of the system and how they interact</a:t>
-            </a:r>
-          </a:p>
-          <a:p>
-            <a:pPr lvl="1"/>
-            <a:r>
-              <a:rPr lang="en-US" dirty="0"/>
-              <a:t>a discussion of the technical challenges that you have (or will) overcome</a:t>
-            </a:r>
-          </a:p>
-          <a:p>
-            <a:pPr lvl="1"/>
-            <a:r>
-              <a:rPr lang="en-US" dirty="0"/>
-              <a:t>what have you accomplished thus far</a:t>
-            </a:r>
-          </a:p>
-          <a:p>
-            <a:endParaRPr lang="en-US" dirty="0"/>
-          </a:p>
-          <a:p>
-            <a:endParaRPr lang="en-US" dirty="0"/>
-          </a:p>
-          <a:p>
-            <a:r>
-              <a:rPr lang="en-US" dirty="0"/>
-              <a:t>Su – general idea with diagrams</a:t>
-            </a:r>
-          </a:p>
-          <a:p>
-            <a:r>
-              <a:rPr lang="en-US" dirty="0"/>
-              <a:t>Kyle – technical challenges &amp; what has been accomplished [done]</a:t>
+        </p:nvPicPr>
+        <p:blipFill>
+          <a:blip r:embed="rId2">
+            <a:extLst>
+              <a:ext uri="{28A0092B-C50C-407E-A947-70E740481C1C}">
+                <a14:useLocalDpi xmlns:a14="http://schemas.microsoft.com/office/drawing/2010/main" val="0"/>
+              </a:ext>
+            </a:extLst>
+          </a:blip>
+          <a:stretch>
+            <a:fillRect/>
+          </a:stretch>
+        </p:blipFill>
+        <p:spPr>
+          <a:xfrm>
+            <a:off x="1825624" y="3848100"/>
+            <a:ext cx="7172979" cy="2670969"/>
+          </a:xfrm>
+        </p:spPr>
+      </p:pic>
+      <p:sp>
+        <p:nvSpPr>
+          <p:cNvPr id="7" name="TextBox 6"/>
+          <p:cNvSpPr txBox="1"/>
+          <p:nvPr/>
+        </p:nvSpPr>
+        <p:spPr>
+          <a:xfrm>
+            <a:off x="794987" y="1709668"/>
+            <a:ext cx="7968013" cy="1754326"/>
+          </a:xfrm>
+          <a:prstGeom prst="rect">
+            <a:avLst/>
+          </a:prstGeom>
+          <a:noFill/>
+        </p:spPr>
+        <p:txBody>
+          <a:bodyPr wrap="square" rtlCol="0">
+            <a:spAutoFit/>
+          </a:bodyPr>
+          <a:lstStyle/>
+          <a:p>
+            <a:pPr marL="342900" indent="-342900">
+              <a:buAutoNum type="arabicPeriod"/>
+            </a:pPr>
+            <a:r>
+              <a:rPr lang="en-US" dirty="0" err="1" smtClean="0"/>
+              <a:t>Tobii</a:t>
+            </a:r>
+            <a:r>
+              <a:rPr lang="en-US" dirty="0" smtClean="0"/>
+              <a:t> </a:t>
+            </a:r>
+            <a:r>
+              <a:rPr lang="en-US" dirty="0" err="1" smtClean="0"/>
+              <a:t>EyeX</a:t>
+            </a:r>
+            <a:r>
+              <a:rPr lang="en-US" dirty="0" smtClean="0"/>
+              <a:t> Engine is the core software. It knows how to configure and talk to the eye tracker.</a:t>
+            </a:r>
+          </a:p>
+          <a:p>
+            <a:pPr marL="342900" indent="-342900">
+              <a:buAutoNum type="arabicPeriod"/>
+            </a:pPr>
+            <a:r>
+              <a:rPr lang="en-US" dirty="0" smtClean="0"/>
+              <a:t>Client Application get </a:t>
+            </a:r>
+            <a:r>
+              <a:rPr lang="en-US" dirty="0" err="1" smtClean="0"/>
+              <a:t>uer’s</a:t>
+            </a:r>
+            <a:r>
+              <a:rPr lang="en-US" dirty="0" smtClean="0"/>
+              <a:t> eye-gazing and other input</a:t>
+            </a:r>
+          </a:p>
+          <a:p>
+            <a:pPr marL="342900" indent="-342900">
+              <a:buAutoNum type="arabicPeriod"/>
+            </a:pPr>
+            <a:r>
+              <a:rPr lang="en-US" dirty="0" err="1" smtClean="0"/>
+              <a:t>Tobii</a:t>
+            </a:r>
+            <a:r>
+              <a:rPr lang="en-US" dirty="0" smtClean="0"/>
+              <a:t> </a:t>
+            </a:r>
+            <a:r>
+              <a:rPr lang="en-US" dirty="0" err="1"/>
+              <a:t>E</a:t>
+            </a:r>
+            <a:r>
+              <a:rPr lang="en-US" dirty="0" err="1" smtClean="0"/>
+              <a:t>yeX</a:t>
+            </a:r>
+            <a:r>
+              <a:rPr lang="en-US" dirty="0" smtClean="0"/>
+              <a:t> Interaction is a software built on </a:t>
+            </a:r>
+            <a:r>
+              <a:rPr lang="en-US" dirty="0" err="1" smtClean="0"/>
+              <a:t>Tobii</a:t>
+            </a:r>
+            <a:r>
+              <a:rPr lang="en-US" dirty="0" smtClean="0"/>
+              <a:t> </a:t>
+            </a:r>
+            <a:r>
+              <a:rPr lang="en-US" dirty="0" err="1" smtClean="0"/>
+              <a:t>eyeX</a:t>
+            </a:r>
+            <a:r>
+              <a:rPr lang="en-US" dirty="0" smtClean="0"/>
+              <a:t> Engine, it offer a set of basic eye-gaze interaction in Windows environment</a:t>
+            </a:r>
+          </a:p>
+          <a:p>
+            <a:pPr marL="342900" indent="-342900">
+              <a:buAutoNum type="arabicPeriod"/>
+            </a:pPr>
+            <a:r>
+              <a:rPr lang="en-US" dirty="0" err="1" smtClean="0"/>
+              <a:t>Tobii</a:t>
+            </a:r>
+            <a:r>
+              <a:rPr lang="en-US" dirty="0" smtClean="0"/>
+              <a:t> </a:t>
+            </a:r>
+            <a:r>
+              <a:rPr lang="en-US" dirty="0" err="1" smtClean="0"/>
+              <a:t>EyeX</a:t>
+            </a:r>
+            <a:r>
+              <a:rPr lang="en-US" dirty="0" smtClean="0"/>
+              <a:t> SDK give developer access to </a:t>
+            </a:r>
+            <a:r>
+              <a:rPr lang="en-US" dirty="0" err="1" smtClean="0"/>
+              <a:t>Tobii</a:t>
+            </a:r>
+            <a:r>
+              <a:rPr lang="en-US" dirty="0" smtClean="0"/>
+              <a:t> </a:t>
+            </a:r>
+            <a:r>
+              <a:rPr lang="en-US" dirty="0" err="1" smtClean="0"/>
+              <a:t>EyeX</a:t>
+            </a:r>
+            <a:r>
+              <a:rPr lang="en-US" dirty="0" smtClean="0"/>
+              <a:t> Engine API</a:t>
             </a:r>
           </a:p>
         </p:txBody>
@@ -4487,7 +6050,7 @@
     </p:spTree>
     <p:extLst>
       <p:ext uri="{BB962C8B-B14F-4D97-AF65-F5344CB8AC3E}">
-        <p14:creationId xmlns:p14="http://schemas.microsoft.com/office/powerpoint/2010/main" val="4186265574"/>
+        <p14:creationId xmlns:p14="http://schemas.microsoft.com/office/powerpoint/2010/main" val="1029161811"/>
       </p:ext>
     </p:extLst>
   </p:cSld>
@@ -4498,6 +6061,332 @@
 </file>
 
 <file path=ppt/slides/slide4.xml><?xml version="1.0" encoding="utf-8"?>
+<p:sld xmlns:a="http://schemas.openxmlformats.org/drawingml/2006/main" xmlns:r="http://schemas.openxmlformats.org/officeDocument/2006/relationships" xmlns:p="http://schemas.openxmlformats.org/presentationml/2006/main">
+  <p:cSld>
+    <p:spTree>
+      <p:nvGrpSpPr>
+        <p:cNvPr id="1" name=""/>
+        <p:cNvGrpSpPr/>
+        <p:nvPr/>
+      </p:nvGrpSpPr>
+      <p:grpSpPr>
+        <a:xfrm>
+          <a:off x="0" y="0"/>
+          <a:ext cx="0" cy="0"/>
+          <a:chOff x="0" y="0"/>
+          <a:chExt cx="0" cy="0"/>
+        </a:xfrm>
+      </p:grpSpPr>
+      <p:sp>
+        <p:nvSpPr>
+          <p:cNvPr id="2" name="Title 1"/>
+          <p:cNvSpPr>
+            <a:spLocks noGrp="1"/>
+          </p:cNvSpPr>
+          <p:nvPr>
+            <p:ph type="title"/>
+          </p:nvPr>
+        </p:nvSpPr>
+        <p:spPr>
+          <a:xfrm>
+            <a:off x="1211072" y="0"/>
+            <a:ext cx="9692640" cy="1325562"/>
+          </a:xfrm>
+        </p:spPr>
+        <p:txBody>
+          <a:bodyPr/>
+          <a:lstStyle/>
+          <a:p>
+            <a:r>
+              <a:rPr lang="en-US" dirty="0" smtClean="0"/>
+              <a:t>How the engine work</a:t>
+            </a:r>
+            <a:endParaRPr lang="en-US" dirty="0"/>
+          </a:p>
+        </p:txBody>
+      </p:sp>
+      <p:pic>
+        <p:nvPicPr>
+          <p:cNvPr id="4" name="Content Placeholder 3"/>
+          <p:cNvPicPr>
+            <a:picLocks noGrp="1" noChangeAspect="1"/>
+          </p:cNvPicPr>
+          <p:nvPr>
+            <p:ph idx="1"/>
+          </p:nvPr>
+        </p:nvPicPr>
+        <p:blipFill>
+          <a:blip r:embed="rId2">
+            <a:extLst>
+              <a:ext uri="{28A0092B-C50C-407E-A947-70E740481C1C}">
+                <a14:useLocalDpi xmlns:a14="http://schemas.microsoft.com/office/drawing/2010/main" val="0"/>
+              </a:ext>
+            </a:extLst>
+          </a:blip>
+          <a:stretch>
+            <a:fillRect/>
+          </a:stretch>
+        </p:blipFill>
+        <p:spPr>
+          <a:xfrm>
+            <a:off x="5032375" y="4396581"/>
+            <a:ext cx="6159670" cy="2461419"/>
+          </a:xfrm>
+        </p:spPr>
+      </p:pic>
+      <p:sp>
+        <p:nvSpPr>
+          <p:cNvPr id="6" name="TextBox 5"/>
+          <p:cNvSpPr txBox="1"/>
+          <p:nvPr/>
+        </p:nvSpPr>
+        <p:spPr>
+          <a:xfrm>
+            <a:off x="1211072" y="1745673"/>
+            <a:ext cx="7399528" cy="2031325"/>
+          </a:xfrm>
+          <a:prstGeom prst="rect">
+            <a:avLst/>
+          </a:prstGeom>
+          <a:noFill/>
+        </p:spPr>
+        <p:txBody>
+          <a:bodyPr wrap="square" rtlCol="0">
+            <a:spAutoFit/>
+          </a:bodyPr>
+          <a:lstStyle/>
+          <a:p>
+            <a:pPr marL="342900" indent="-342900">
+              <a:buAutoNum type="arabicPeriod"/>
+            </a:pPr>
+            <a:r>
+              <a:rPr lang="en-US" dirty="0" smtClean="0"/>
+              <a:t>The user looks at the screen, the </a:t>
+            </a:r>
+            <a:r>
+              <a:rPr lang="en-US" dirty="0" err="1" smtClean="0"/>
+              <a:t>EyeX</a:t>
+            </a:r>
+            <a:r>
+              <a:rPr lang="en-US" dirty="0" smtClean="0"/>
+              <a:t> controller calculates the coordinates of the gaze point</a:t>
+            </a:r>
+          </a:p>
+          <a:p>
+            <a:pPr marL="342900" indent="-342900">
+              <a:buAutoNum type="arabicPeriod"/>
+            </a:pPr>
+            <a:r>
+              <a:rPr lang="en-US" dirty="0" err="1" smtClean="0"/>
+              <a:t>EyeX</a:t>
+            </a:r>
+            <a:r>
+              <a:rPr lang="en-US" dirty="0" smtClean="0"/>
+              <a:t> engine use information from client application and understand what kind of object the user is looking at and how to interact with it</a:t>
+            </a:r>
+          </a:p>
+          <a:p>
+            <a:pPr marL="342900" indent="-342900">
+              <a:buAutoNum type="arabicPeriod"/>
+            </a:pPr>
+            <a:r>
+              <a:rPr lang="en-US" dirty="0" smtClean="0"/>
+              <a:t>Client application combine some user input and eye gazing to trigger the click on an object</a:t>
+            </a:r>
+          </a:p>
+        </p:txBody>
+      </p:sp>
+    </p:spTree>
+    <p:extLst>
+      <p:ext uri="{BB962C8B-B14F-4D97-AF65-F5344CB8AC3E}">
+        <p14:creationId xmlns:p14="http://schemas.microsoft.com/office/powerpoint/2010/main" val="1699687976"/>
+      </p:ext>
+    </p:extLst>
+  </p:cSld>
+  <p:clrMapOvr>
+    <a:masterClrMapping/>
+  </p:clrMapOvr>
+</p:sld>
+</file>
+
+<file path=ppt/slides/slide5.xml><?xml version="1.0" encoding="utf-8"?>
+<p:sld xmlns:a="http://schemas.openxmlformats.org/drawingml/2006/main" xmlns:r="http://schemas.openxmlformats.org/officeDocument/2006/relationships" xmlns:p="http://schemas.openxmlformats.org/presentationml/2006/main">
+  <p:cSld>
+    <p:spTree>
+      <p:nvGrpSpPr>
+        <p:cNvPr id="1" name=""/>
+        <p:cNvGrpSpPr/>
+        <p:nvPr/>
+      </p:nvGrpSpPr>
+      <p:grpSpPr>
+        <a:xfrm>
+          <a:off x="0" y="0"/>
+          <a:ext cx="0" cy="0"/>
+          <a:chOff x="0" y="0"/>
+          <a:chExt cx="0" cy="0"/>
+        </a:xfrm>
+      </p:grpSpPr>
+      <p:sp>
+        <p:nvSpPr>
+          <p:cNvPr id="3" name="Content Placeholder 2"/>
+          <p:cNvSpPr>
+            <a:spLocks noGrp="1"/>
+          </p:cNvSpPr>
+          <p:nvPr>
+            <p:ph idx="1"/>
+          </p:nvPr>
+        </p:nvSpPr>
+        <p:spPr>
+          <a:xfrm>
+            <a:off x="1134872" y="386918"/>
+            <a:ext cx="8595360" cy="1762516"/>
+          </a:xfrm>
+        </p:spPr>
+        <p:txBody>
+          <a:bodyPr/>
+          <a:lstStyle/>
+          <a:p>
+            <a:r>
+              <a:rPr lang="en-US" dirty="0" smtClean="0"/>
+              <a:t>4. The user press space bar when he or she is looking at the object and client application will tell </a:t>
+            </a:r>
+            <a:r>
+              <a:rPr lang="en-US" dirty="0" err="1" smtClean="0"/>
+              <a:t>EyeX</a:t>
+            </a:r>
+            <a:r>
+              <a:rPr lang="en-US" dirty="0" smtClean="0"/>
+              <a:t> engine that user want to activate the button. </a:t>
+            </a:r>
+            <a:r>
+              <a:rPr lang="en-US" dirty="0" err="1" smtClean="0"/>
+              <a:t>EyeX</a:t>
+            </a:r>
+            <a:r>
+              <a:rPr lang="en-US" dirty="0" smtClean="0"/>
+              <a:t> engine will trigger an event and tell client application to activate the specific button</a:t>
+            </a:r>
+          </a:p>
+          <a:p>
+            <a:r>
+              <a:rPr lang="en-US" dirty="0" smtClean="0"/>
+              <a:t>5. Client application response to the event and give visual feedback.</a:t>
+            </a:r>
+          </a:p>
+        </p:txBody>
+      </p:sp>
+      <p:pic>
+        <p:nvPicPr>
+          <p:cNvPr id="4" name="Picture 3"/>
+          <p:cNvPicPr>
+            <a:picLocks noChangeAspect="1"/>
+          </p:cNvPicPr>
+          <p:nvPr/>
+        </p:nvPicPr>
+        <p:blipFill>
+          <a:blip r:embed="rId2">
+            <a:extLst>
+              <a:ext uri="{28A0092B-C50C-407E-A947-70E740481C1C}">
+                <a14:useLocalDpi xmlns:a14="http://schemas.microsoft.com/office/drawing/2010/main" val="0"/>
+              </a:ext>
+            </a:extLst>
+          </a:blip>
+          <a:stretch>
+            <a:fillRect/>
+          </a:stretch>
+        </p:blipFill>
+        <p:spPr>
+          <a:xfrm>
+            <a:off x="1134872" y="2836068"/>
+            <a:ext cx="4546600" cy="3352800"/>
+          </a:xfrm>
+          <a:prstGeom prst="rect">
+            <a:avLst/>
+          </a:prstGeom>
+        </p:spPr>
+      </p:pic>
+      <p:sp>
+        <p:nvSpPr>
+          <p:cNvPr id="5" name="TextBox 4"/>
+          <p:cNvSpPr txBox="1"/>
+          <p:nvPr/>
+        </p:nvSpPr>
+        <p:spPr>
+          <a:xfrm>
+            <a:off x="6341424" y="3528795"/>
+            <a:ext cx="3788228" cy="2660073"/>
+          </a:xfrm>
+          <a:prstGeom prst="rect">
+            <a:avLst/>
+          </a:prstGeom>
+          <a:noFill/>
+        </p:spPr>
+        <p:txBody>
+          <a:bodyPr wrap="square" rtlCol="0">
+            <a:spAutoFit/>
+          </a:bodyPr>
+          <a:lstStyle/>
+          <a:p>
+            <a:r>
+              <a:rPr lang="en-US" dirty="0"/>
+              <a:t>In step 3, instead of having some user input and eye gazing to trigger an event, we want to only use  eye gazing to trigger a click on an object.</a:t>
+            </a:r>
+          </a:p>
+          <a:p>
+            <a:r>
+              <a:rPr lang="en-US" dirty="0"/>
+              <a:t>We want to trigger an event after eye gazing an object for a period of time</a:t>
+            </a:r>
+          </a:p>
+          <a:p>
+            <a:endParaRPr lang="en-US" dirty="0"/>
+          </a:p>
+        </p:txBody>
+      </p:sp>
+      <p:sp>
+        <p:nvSpPr>
+          <p:cNvPr id="2" name="TextBox 1"/>
+          <p:cNvSpPr txBox="1"/>
+          <p:nvPr/>
+        </p:nvSpPr>
+        <p:spPr>
+          <a:xfrm>
+            <a:off x="6341424" y="2836068"/>
+            <a:ext cx="1626919" cy="369332"/>
+          </a:xfrm>
+          <a:prstGeom prst="rect">
+            <a:avLst/>
+          </a:prstGeom>
+          <a:noFill/>
+        </p:spPr>
+        <p:txBody>
+          <a:bodyPr wrap="square" rtlCol="0">
+            <a:spAutoFit/>
+          </a:bodyPr>
+          <a:lstStyle/>
+          <a:p>
+            <a:r>
+              <a:rPr lang="en-US" dirty="0" smtClean="0"/>
+              <a:t>Difference:</a:t>
+            </a:r>
+            <a:endParaRPr lang="en-US" dirty="0"/>
+          </a:p>
+        </p:txBody>
+      </p:sp>
+    </p:spTree>
+    <p:extLst>
+      <p:ext uri="{BB962C8B-B14F-4D97-AF65-F5344CB8AC3E}">
+        <p14:creationId xmlns:p14="http://schemas.microsoft.com/office/powerpoint/2010/main" val="1581630088"/>
+      </p:ext>
+    </p:extLst>
+  </p:cSld>
+  <p:clrMapOvr>
+    <a:masterClrMapping/>
+  </p:clrMapOvr>
+</p:sld>
+</file>
+
+<file path=ppt/slides/slide6.xml><?xml version="1.0" encoding="utf-8"?>
 <p:sld xmlns:a="http://schemas.openxmlformats.org/drawingml/2006/main" xmlns:r="http://schemas.openxmlformats.org/officeDocument/2006/relationships" xmlns:p="http://schemas.openxmlformats.org/presentationml/2006/main">
   <p:cSld>
     <p:spTree>
@@ -4575,7 +6464,7 @@
 </p:sld>
 </file>
 
-<file path=ppt/slides/slide5.xml><?xml version="1.0" encoding="utf-8"?>
+<file path=ppt/slides/slide7.xml><?xml version="1.0" encoding="utf-8"?>
 <p:sld xmlns:a="http://schemas.openxmlformats.org/drawingml/2006/main" xmlns:r="http://schemas.openxmlformats.org/officeDocument/2006/relationships" xmlns:p="http://schemas.openxmlformats.org/presentationml/2006/main">
   <p:cSld>
     <p:spTree>
@@ -4717,342 +6606,6 @@
     <p:extLst>
       <p:ext uri="{BB962C8B-B14F-4D97-AF65-F5344CB8AC3E}">
         <p14:creationId xmlns:p14="http://schemas.microsoft.com/office/powerpoint/2010/main" val="1211660829"/>
-      </p:ext>
-    </p:extLst>
-  </p:cSld>
-  <p:clrMapOvr>
-    <a:masterClrMapping/>
-  </p:clrMapOvr>
-</p:sld>
-</file>
-
-<file path=ppt/slides/slide6.xml><?xml version="1.0" encoding="utf-8"?>
-<p:sld xmlns:a="http://schemas.openxmlformats.org/drawingml/2006/main" xmlns:r="http://schemas.openxmlformats.org/officeDocument/2006/relationships" xmlns:p="http://schemas.openxmlformats.org/presentationml/2006/main">
-  <p:cSld>
-    <p:spTree>
-      <p:nvGrpSpPr>
-        <p:cNvPr id="1" name=""/>
-        <p:cNvGrpSpPr/>
-        <p:nvPr/>
-      </p:nvGrpSpPr>
-      <p:grpSpPr>
-        <a:xfrm>
-          <a:off x="0" y="0"/>
-          <a:ext cx="0" cy="0"/>
-          <a:chOff x="0" y="0"/>
-          <a:chExt cx="0" cy="0"/>
-        </a:xfrm>
-      </p:grpSpPr>
-      <p:sp>
-        <p:nvSpPr>
-          <p:cNvPr id="2" name="Title 1"/>
-          <p:cNvSpPr>
-            <a:spLocks noGrp="1"/>
-          </p:cNvSpPr>
-          <p:nvPr>
-            <p:ph type="title"/>
-          </p:nvPr>
-        </p:nvSpPr>
-        <p:spPr/>
-        <p:txBody>
-          <a:bodyPr/>
-          <a:lstStyle/>
-          <a:p>
-            <a:r>
-              <a:rPr lang="en-US" dirty="0"/>
-              <a:t>Gaze-Aware Behavior</a:t>
-            </a:r>
-          </a:p>
-        </p:txBody>
-      </p:sp>
-      <p:sp>
-        <p:nvSpPr>
-          <p:cNvPr id="3" name="Content Placeholder 2"/>
-          <p:cNvSpPr>
-            <a:spLocks noGrp="1"/>
-          </p:cNvSpPr>
-          <p:nvPr>
-            <p:ph idx="1"/>
-          </p:nvPr>
-        </p:nvSpPr>
-        <p:spPr/>
-        <p:txBody>
-          <a:bodyPr>
-            <a:normAutofit/>
-          </a:bodyPr>
-          <a:lstStyle/>
-          <a:p>
-            <a:r>
-              <a:rPr lang="en-US" dirty="0"/>
-              <a:t>Create a set of items that are </a:t>
-            </a:r>
-            <a:r>
-              <a:rPr lang="en-US" dirty="0" err="1"/>
-              <a:t>interactable</a:t>
-            </a:r>
-            <a:r>
-              <a:rPr lang="en-US" dirty="0"/>
-              <a:t> subject to user’s eye-gaze</a:t>
-            </a:r>
-          </a:p>
-          <a:p>
-            <a:r>
-              <a:rPr lang="en-US" dirty="0"/>
-              <a:t>Launch event when user’s gaze enters boundaries of interactor</a:t>
-            </a:r>
-          </a:p>
-          <a:p>
-            <a:r>
-              <a:rPr lang="en-US" dirty="0"/>
-              <a:t>Apply delay time</a:t>
-            </a:r>
-          </a:p>
-          <a:p>
-            <a:pPr lvl="1"/>
-            <a:r>
-              <a:rPr lang="en-US" dirty="0"/>
-              <a:t>Add inertia to account to rapid, random eye movements</a:t>
-            </a:r>
-          </a:p>
-          <a:p>
-            <a:pPr lvl="1"/>
-            <a:r>
-              <a:rPr lang="en-US" dirty="0"/>
-              <a:t>Gaze point must start on interactor until response is triggered</a:t>
-            </a:r>
-          </a:p>
-          <a:p>
-            <a:pPr lvl="1"/>
-            <a:r>
-              <a:rPr lang="en-US" dirty="0"/>
-              <a:t>Manually adjustable delay parameter</a:t>
-            </a:r>
-          </a:p>
-          <a:p>
-            <a:r>
-              <a:rPr lang="en-US" dirty="0"/>
-              <a:t>Provide focus points:</a:t>
-            </a:r>
-          </a:p>
-          <a:p>
-            <a:pPr lvl="1"/>
-            <a:r>
-              <a:rPr lang="en-US" dirty="0"/>
-              <a:t>Visual hotspot: captions, buttons, etc.</a:t>
-            </a:r>
-          </a:p>
-          <a:p>
-            <a:pPr lvl="1"/>
-            <a:r>
-              <a:rPr lang="en-US" dirty="0"/>
-              <a:t>Sufficiently separation. Spacing around/between visual elements and/or increased size.  (</a:t>
-            </a:r>
-            <a:r>
-              <a:rPr lang="en-US" dirty="0" err="1"/>
-              <a:t>Tobii</a:t>
-            </a:r>
-            <a:r>
-              <a:rPr lang="en-US" dirty="0"/>
-              <a:t> developers note: spacing effective than size.)</a:t>
-            </a:r>
-          </a:p>
-          <a:p>
-            <a:pPr lvl="1"/>
-            <a:r>
-              <a:rPr lang="en-US" dirty="0"/>
-              <a:t>Care in visual feedback given.  Example, highlight only text or visual hotspot of button.</a:t>
-            </a:r>
-          </a:p>
-        </p:txBody>
-      </p:sp>
-    </p:spTree>
-    <p:extLst>
-      <p:ext uri="{BB962C8B-B14F-4D97-AF65-F5344CB8AC3E}">
-        <p14:creationId xmlns:p14="http://schemas.microsoft.com/office/powerpoint/2010/main" val="200234278"/>
-      </p:ext>
-    </p:extLst>
-  </p:cSld>
-  <p:clrMapOvr>
-    <a:masterClrMapping/>
-  </p:clrMapOvr>
-</p:sld>
-</file>
-
-<file path=ppt/slides/slide7.xml><?xml version="1.0" encoding="utf-8"?>
-<p:sld xmlns:a="http://schemas.openxmlformats.org/drawingml/2006/main" xmlns:r="http://schemas.openxmlformats.org/officeDocument/2006/relationships" xmlns:p="http://schemas.openxmlformats.org/presentationml/2006/main">
-  <p:cSld>
-    <p:spTree>
-      <p:nvGrpSpPr>
-        <p:cNvPr id="1" name=""/>
-        <p:cNvGrpSpPr/>
-        <p:nvPr/>
-      </p:nvGrpSpPr>
-      <p:grpSpPr>
-        <a:xfrm>
-          <a:off x="0" y="0"/>
-          <a:ext cx="0" cy="0"/>
-          <a:chOff x="0" y="0"/>
-          <a:chExt cx="0" cy="0"/>
-        </a:xfrm>
-      </p:grpSpPr>
-      <p:sp>
-        <p:nvSpPr>
-          <p:cNvPr id="2" name="Title 1"/>
-          <p:cNvSpPr>
-            <a:spLocks noGrp="1"/>
-          </p:cNvSpPr>
-          <p:nvPr>
-            <p:ph type="title"/>
-          </p:nvPr>
-        </p:nvSpPr>
-        <p:spPr/>
-        <p:txBody>
-          <a:bodyPr/>
-          <a:lstStyle/>
-          <a:p>
-            <a:r>
-              <a:rPr lang="en-US" dirty="0"/>
-              <a:t>Gaze vs. Mouse</a:t>
-            </a:r>
-          </a:p>
-        </p:txBody>
-      </p:sp>
-      <p:sp>
-        <p:nvSpPr>
-          <p:cNvPr id="3" name="Content Placeholder 2"/>
-          <p:cNvSpPr>
-            <a:spLocks noGrp="1"/>
-          </p:cNvSpPr>
-          <p:nvPr>
-            <p:ph sz="half" idx="1"/>
-          </p:nvPr>
-        </p:nvSpPr>
-        <p:spPr/>
-        <p:txBody>
-          <a:bodyPr/>
-          <a:lstStyle/>
-          <a:p>
-            <a:r>
-              <a:rPr lang="en-US" dirty="0"/>
-              <a:t>Gaze tends to be quick and natural</a:t>
-            </a:r>
-          </a:p>
-          <a:p>
-            <a:r>
-              <a:rPr lang="en-US" dirty="0"/>
-              <a:t>Can be slow and error prone</a:t>
-            </a:r>
-          </a:p>
-          <a:p>
-            <a:pPr lvl="1"/>
-            <a:r>
-              <a:rPr lang="en-US" dirty="0"/>
-              <a:t>Difficulty distinguishing between intended or unintended gaze</a:t>
-            </a:r>
-          </a:p>
-          <a:p>
-            <a:r>
-              <a:rPr lang="en-US" dirty="0" err="1"/>
-              <a:t>actigaze</a:t>
-            </a:r>
-            <a:endParaRPr lang="en-US" dirty="0"/>
-          </a:p>
-          <a:p>
-            <a:pPr lvl="1"/>
-            <a:r>
-              <a:rPr lang="en-US" dirty="0"/>
-              <a:t>Attempts to solve the problem by using color coordination to confirm gaze targets</a:t>
-            </a:r>
-          </a:p>
-          <a:p>
-            <a:pPr lvl="1"/>
-            <a:r>
-              <a:rPr lang="en-US" dirty="0"/>
-              <a:t>Allows for hands-free browsing of webpages</a:t>
-            </a:r>
-          </a:p>
-          <a:p>
-            <a:pPr lvl="1"/>
-            <a:r>
-              <a:rPr lang="en-US" dirty="0"/>
-              <a:t>Current implementation only on selected Wikipedia articles (offline)</a:t>
-            </a:r>
-          </a:p>
-          <a:p>
-            <a:pPr lvl="1"/>
-            <a:r>
-              <a:rPr lang="en-US" dirty="0"/>
-              <a:t>Requires algorithm to correctly identify and highlight clickable links</a:t>
-            </a:r>
-          </a:p>
-        </p:txBody>
-      </p:sp>
-      <p:pic>
-        <p:nvPicPr>
-          <p:cNvPr id="5" name="Content Placeholder 4"/>
-          <p:cNvPicPr>
-            <a:picLocks noGrp="1" noChangeAspect="1"/>
-          </p:cNvPicPr>
-          <p:nvPr>
-            <p:ph sz="half" idx="2"/>
-          </p:nvPr>
-        </p:nvPicPr>
-        <p:blipFill>
-          <a:blip r:embed="rId2">
-            <a:extLst>
-              <a:ext uri="{28A0092B-C50C-407E-A947-70E740481C1C}">
-                <a14:useLocalDpi xmlns:a14="http://schemas.microsoft.com/office/drawing/2010/main" val="0"/>
-              </a:ext>
-            </a:extLst>
-          </a:blip>
-          <a:stretch>
-            <a:fillRect/>
-          </a:stretch>
-        </p:blipFill>
-        <p:spPr>
-          <a:xfrm>
-            <a:off x="6126163" y="1833385"/>
-            <a:ext cx="4481512" cy="4342167"/>
-          </a:xfrm>
-        </p:spPr>
-      </p:pic>
-      <p:sp>
-        <p:nvSpPr>
-          <p:cNvPr id="6" name="TextBox 5"/>
-          <p:cNvSpPr txBox="1"/>
-          <p:nvPr/>
-        </p:nvSpPr>
-        <p:spPr>
-          <a:xfrm>
-            <a:off x="1261872" y="6175552"/>
-            <a:ext cx="1925782" cy="304800"/>
-          </a:xfrm>
-          <a:prstGeom prst="rect">
-            <a:avLst/>
-          </a:prstGeom>
-          <a:noFill/>
-        </p:spPr>
-        <p:txBody>
-          <a:bodyPr wrap="square" rtlCol="0">
-            <a:spAutoFit/>
-          </a:bodyPr>
-          <a:lstStyle/>
-          <a:p>
-            <a:r>
-              <a:rPr lang="en-US" sz="1400" dirty="0" err="1"/>
-              <a:t>Lutteroth</a:t>
-            </a:r>
-            <a:r>
-              <a:rPr lang="en-US" sz="1400" dirty="0"/>
-              <a:t> et al. 2015</a:t>
-            </a:r>
-          </a:p>
-        </p:txBody>
-      </p:sp>
-    </p:spTree>
-    <p:extLst>
-      <p:ext uri="{BB962C8B-B14F-4D97-AF65-F5344CB8AC3E}">
-        <p14:creationId xmlns:p14="http://schemas.microsoft.com/office/powerpoint/2010/main" val="393577610"/>
       </p:ext>
     </p:extLst>
   </p:cSld>
@@ -5096,182 +6649,107 @@
           <a:p>
             <a:r>
               <a:rPr lang="en-US" dirty="0"/>
-              <a:t>Where does gaze fall?</a:t>
-            </a:r>
-          </a:p>
-        </p:txBody>
-      </p:sp>
-      <p:pic>
-        <p:nvPicPr>
-          <p:cNvPr id="6" name="Content Placeholder 5"/>
-          <p:cNvPicPr>
-            <a:picLocks noGrp="1" noChangeAspect="1"/>
-          </p:cNvPicPr>
-          <p:nvPr>
-            <p:ph sz="half" idx="1"/>
-          </p:nvPr>
-        </p:nvPicPr>
-        <p:blipFill>
-          <a:blip r:embed="rId2">
-            <a:extLst>
-              <a:ext uri="{28A0092B-C50C-407E-A947-70E740481C1C}">
-                <a14:useLocalDpi xmlns:a14="http://schemas.microsoft.com/office/drawing/2010/main" val="0"/>
-              </a:ext>
-            </a:extLst>
-          </a:blip>
-          <a:stretch>
-            <a:fillRect/>
-          </a:stretch>
-        </p:blipFill>
-        <p:spPr>
-          <a:xfrm>
-            <a:off x="326881" y="1691322"/>
-            <a:ext cx="4479925" cy="3357552"/>
-          </a:xfrm>
-        </p:spPr>
-      </p:pic>
-      <p:pic>
-        <p:nvPicPr>
-          <p:cNvPr id="7" name="Content Placeholder 6"/>
-          <p:cNvPicPr>
-            <a:picLocks noGrp="1" noChangeAspect="1"/>
-          </p:cNvPicPr>
-          <p:nvPr>
-            <p:ph sz="half" idx="2"/>
-          </p:nvPr>
-        </p:nvPicPr>
-        <p:blipFill>
-          <a:blip r:embed="rId3">
-            <a:extLst>
-              <a:ext uri="{28A0092B-C50C-407E-A947-70E740481C1C}">
-                <a14:useLocalDpi xmlns:a14="http://schemas.microsoft.com/office/drawing/2010/main" val="0"/>
-              </a:ext>
-            </a:extLst>
-          </a:blip>
-          <a:stretch>
-            <a:fillRect/>
-          </a:stretch>
-        </p:blipFill>
-        <p:spPr>
-          <a:xfrm>
-            <a:off x="2205327" y="5262205"/>
-            <a:ext cx="4481512" cy="975873"/>
-          </a:xfrm>
-        </p:spPr>
-      </p:pic>
-      <p:sp>
-        <p:nvSpPr>
-          <p:cNvPr id="8" name="TextBox 7"/>
-          <p:cNvSpPr txBox="1"/>
-          <p:nvPr/>
-        </p:nvSpPr>
-        <p:spPr>
-          <a:xfrm>
-            <a:off x="3414244" y="6235936"/>
-            <a:ext cx="2063677" cy="276999"/>
-          </a:xfrm>
-          <a:prstGeom prst="rect">
-            <a:avLst/>
-          </a:prstGeom>
-          <a:noFill/>
-        </p:spPr>
-        <p:txBody>
-          <a:bodyPr wrap="square" rtlCol="0">
-            <a:spAutoFit/>
+              <a:t>Gaze-Aware Behavior</a:t>
+            </a:r>
+          </a:p>
+        </p:txBody>
+      </p:sp>
+      <p:sp>
+        <p:nvSpPr>
+          <p:cNvPr id="3" name="Content Placeholder 2"/>
+          <p:cNvSpPr>
+            <a:spLocks noGrp="1"/>
+          </p:cNvSpPr>
+          <p:nvPr>
+            <p:ph idx="1"/>
+          </p:nvPr>
+        </p:nvSpPr>
+        <p:spPr/>
+        <p:txBody>
+          <a:bodyPr>
+            <a:normAutofit/>
           </a:bodyPr>
           <a:lstStyle/>
           <a:p>
             <a:r>
-              <a:rPr lang="en-US" sz="1200" dirty="0"/>
-              <a:t>Retrieved from Wikipedia</a:t>
-            </a:r>
-          </a:p>
-        </p:txBody>
-      </p:sp>
-      <p:sp>
-        <p:nvSpPr>
-          <p:cNvPr id="9" name="TextBox 8"/>
-          <p:cNvSpPr txBox="1"/>
-          <p:nvPr/>
-        </p:nvSpPr>
-        <p:spPr>
-          <a:xfrm>
-            <a:off x="326881" y="5017040"/>
-            <a:ext cx="2327564" cy="276999"/>
-          </a:xfrm>
-          <a:prstGeom prst="rect">
-            <a:avLst/>
-          </a:prstGeom>
-          <a:noFill/>
-        </p:spPr>
-        <p:txBody>
-          <a:bodyPr wrap="square" rtlCol="0">
-            <a:spAutoFit/>
-          </a:bodyPr>
-          <a:lstStyle/>
-          <a:p>
-            <a:r>
-              <a:rPr lang="en-US" sz="1200" dirty="0"/>
-              <a:t>Evans and Saint-Aubin, 2005</a:t>
-            </a:r>
-          </a:p>
-        </p:txBody>
-      </p:sp>
-      <p:pic>
-        <p:nvPicPr>
-          <p:cNvPr id="10" name="Picture 9"/>
-          <p:cNvPicPr>
-            <a:picLocks noChangeAspect="1"/>
-          </p:cNvPicPr>
-          <p:nvPr/>
-        </p:nvPicPr>
-        <p:blipFill>
-          <a:blip r:embed="rId4">
-            <a:extLst>
-              <a:ext uri="{28A0092B-C50C-407E-A947-70E740481C1C}">
-                <a14:useLocalDpi xmlns:a14="http://schemas.microsoft.com/office/drawing/2010/main" val="0"/>
-              </a:ext>
-            </a:extLst>
-          </a:blip>
-          <a:stretch>
-            <a:fillRect/>
-          </a:stretch>
-        </p:blipFill>
-        <p:spPr>
-          <a:xfrm>
-            <a:off x="6247824" y="1828512"/>
-            <a:ext cx="4260848" cy="3195636"/>
-          </a:xfrm>
-          <a:prstGeom prst="rect">
-            <a:avLst/>
-          </a:prstGeom>
-        </p:spPr>
-      </p:pic>
-      <p:sp>
-        <p:nvSpPr>
-          <p:cNvPr id="11" name="TextBox 10"/>
-          <p:cNvSpPr txBox="1"/>
-          <p:nvPr/>
-        </p:nvSpPr>
-        <p:spPr>
-          <a:xfrm>
-            <a:off x="7268459" y="5011988"/>
-            <a:ext cx="2219577" cy="276999"/>
-          </a:xfrm>
-          <a:prstGeom prst="rect">
-            <a:avLst/>
-          </a:prstGeom>
-          <a:noFill/>
-        </p:spPr>
-        <p:txBody>
-          <a:bodyPr wrap="square" rtlCol="0">
-            <a:spAutoFit/>
-          </a:bodyPr>
-          <a:lstStyle/>
-          <a:p>
-            <a:r>
-              <a:rPr lang="en-US" sz="1200" dirty="0"/>
-              <a:t>Retrieved from Usability.gov</a:t>
+              <a:rPr lang="en-US" dirty="0"/>
+              <a:t>Create a set of items that are </a:t>
+            </a:r>
+            <a:r>
+              <a:rPr lang="en-US" dirty="0" err="1"/>
+              <a:t>interactable</a:t>
+            </a:r>
+            <a:r>
+              <a:rPr lang="en-US" dirty="0"/>
+              <a:t> subject to user’s eye-gaze</a:t>
+            </a:r>
+          </a:p>
+          <a:p>
+            <a:r>
+              <a:rPr lang="en-US" dirty="0"/>
+              <a:t>Launch event when user’s gaze enters boundaries of interactor</a:t>
+            </a:r>
+          </a:p>
+          <a:p>
+            <a:r>
+              <a:rPr lang="en-US" dirty="0"/>
+              <a:t>Apply delay time</a:t>
+            </a:r>
+          </a:p>
+          <a:p>
+            <a:pPr lvl="1"/>
+            <a:r>
+              <a:rPr lang="en-US" dirty="0"/>
+              <a:t>Add inertia to account to rapid, random eye movements</a:t>
+            </a:r>
+          </a:p>
+          <a:p>
+            <a:pPr lvl="1"/>
+            <a:r>
+              <a:rPr lang="en-US" dirty="0"/>
+              <a:t>Gaze point must start on interactor until response is triggered</a:t>
+            </a:r>
+          </a:p>
+          <a:p>
+            <a:pPr lvl="1"/>
+            <a:r>
+              <a:rPr lang="en-US" dirty="0"/>
+              <a:t>Manually adjustable delay parameter</a:t>
+            </a:r>
+          </a:p>
+          <a:p>
+            <a:r>
+              <a:rPr lang="en-US" dirty="0"/>
+              <a:t>Provide focus points:</a:t>
+            </a:r>
+          </a:p>
+          <a:p>
+            <a:pPr lvl="1"/>
+            <a:r>
+              <a:rPr lang="en-US" dirty="0"/>
+              <a:t>Visual hotspot: captions, buttons, etc.</a:t>
+            </a:r>
+          </a:p>
+          <a:p>
+            <a:pPr lvl="1"/>
+            <a:r>
+              <a:rPr lang="en-US" dirty="0"/>
+              <a:t>Sufficiently separation. Spacing around/between visual elements and/or increased size.  (</a:t>
+            </a:r>
+            <a:r>
+              <a:rPr lang="en-US" dirty="0" err="1"/>
+              <a:t>Tobii</a:t>
+            </a:r>
+            <a:r>
+              <a:rPr lang="en-US" dirty="0"/>
+              <a:t> developers note: spacing effective than size.)</a:t>
+            </a:r>
+          </a:p>
+          <a:p>
+            <a:pPr lvl="1"/>
+            <a:r>
+              <a:rPr lang="en-US" dirty="0"/>
+              <a:t>Care in visual feedback given.  Example, highlight only text or visual hotspot of button.</a:t>
             </a:r>
           </a:p>
         </p:txBody>
@@ -5279,7 +6757,7 @@
     </p:spTree>
     <p:extLst>
       <p:ext uri="{BB962C8B-B14F-4D97-AF65-F5344CB8AC3E}">
-        <p14:creationId xmlns:p14="http://schemas.microsoft.com/office/powerpoint/2010/main" val="1986291368"/>
+        <p14:creationId xmlns:p14="http://schemas.microsoft.com/office/powerpoint/2010/main" val="200234278"/>
       </p:ext>
     </p:extLst>
   </p:cSld>
@@ -5323,7 +6801,7 @@
           <a:p>
             <a:r>
               <a:rPr lang="en-US" dirty="0"/>
-              <a:t>Experimentation for the Textbox Size </a:t>
+              <a:t>Gaze vs. Mouse</a:t>
             </a:r>
           </a:p>
         </p:txBody>
@@ -5335,7 +6813,7 @@
             <a:spLocks noGrp="1"/>
           </p:cNvSpPr>
           <p:nvPr>
-            <p:ph idx="1"/>
+            <p:ph sz="half" idx="1"/>
           </p:nvPr>
         </p:nvSpPr>
         <p:spPr/>
@@ -5345,24 +6823,68 @@
           <a:p>
             <a:r>
               <a:rPr lang="en-US" dirty="0"/>
-              <a:t>Goal: Determining reasonable word spacing amount:</a:t>
-            </a:r>
-          </a:p>
-          <a:p>
-            <a:r>
-              <a:rPr lang="en-US" dirty="0"/>
-              <a:t>5 initial textbox sizes were selected  </a:t>
+              <a:t>Gaze tends to be quick and natural</a:t>
+            </a:r>
+          </a:p>
+          <a:p>
+            <a:r>
+              <a:rPr lang="en-US" dirty="0"/>
+              <a:t>Can be slow and error prone</a:t>
+            </a:r>
+          </a:p>
+          <a:p>
+            <a:pPr lvl="1"/>
+            <a:r>
+              <a:rPr lang="en-US" dirty="0"/>
+              <a:t>Difficulty distinguishing between intended or unintended gaze</a:t>
+            </a:r>
+          </a:p>
+          <a:p>
+            <a:r>
+              <a:rPr lang="en-US" dirty="0" err="1"/>
+              <a:t>actigaze</a:t>
+            </a:r>
+            <a:endParaRPr lang="en-US" dirty="0"/>
+          </a:p>
+          <a:p>
+            <a:pPr lvl="1"/>
+            <a:r>
+              <a:rPr lang="en-US" dirty="0"/>
+              <a:t>Attempts to solve the problem by using color coordination to confirm gaze targets</a:t>
+            </a:r>
+          </a:p>
+          <a:p>
+            <a:pPr lvl="1"/>
+            <a:r>
+              <a:rPr lang="en-US" dirty="0"/>
+              <a:t>Allows for hands-free browsing of webpages</a:t>
+            </a:r>
+          </a:p>
+          <a:p>
+            <a:pPr lvl="1"/>
+            <a:r>
+              <a:rPr lang="en-US" dirty="0"/>
+              <a:t>Current implementation only on selected Wikipedia articles (offline)</a:t>
+            </a:r>
+          </a:p>
+          <a:p>
+            <a:pPr lvl="1"/>
+            <a:r>
+              <a:rPr lang="en-US" dirty="0"/>
+              <a:t>Requires algorithm to correctly identify and highlight clickable links</a:t>
             </a:r>
           </a:p>
         </p:txBody>
       </p:sp>
       <p:pic>
         <p:nvPicPr>
-          <p:cNvPr id="4" name="Picture 3"/>
+          <p:cNvPr id="5" name="Content Placeholder 4"/>
           <p:cNvPicPr>
-            <a:picLocks noChangeAspect="1"/>
+            <a:picLocks noGrp="1" noChangeAspect="1"/>
           </p:cNvPicPr>
-          <p:nvPr/>
+          <p:nvPr>
+            <p:ph sz="half" idx="2"/>
+          </p:nvPr>
         </p:nvPicPr>
         <p:blipFill>
           <a:blip r:embed="rId2">
@@ -5378,84 +6900,21 @@
         </p:blipFill>
         <p:spPr>
           <a:xfrm>
-            <a:off x="437610" y="3395009"/>
-            <a:ext cx="2743200" cy="1712455"/>
+            <a:off x="6126163" y="1833385"/>
+            <a:ext cx="4481512" cy="4342167"/>
           </a:xfrm>
-          <a:prstGeom prst="rect">
-            <a:avLst/>
-          </a:prstGeom>
         </p:spPr>
       </p:pic>
-      <p:pic>
-        <p:nvPicPr>
-          <p:cNvPr id="5" name="Picture 4"/>
-          <p:cNvPicPr>
-            <a:picLocks noChangeAspect="1"/>
-          </p:cNvPicPr>
+      <p:sp>
+        <p:nvSpPr>
+          <p:cNvPr id="6" name="TextBox 5"/>
+          <p:cNvSpPr txBox="1"/>
           <p:nvPr/>
-        </p:nvPicPr>
-        <p:blipFill>
-          <a:blip r:embed="rId3">
-            <a:extLst>
-              <a:ext uri="{28A0092B-C50C-407E-A947-70E740481C1C}">
-                <a14:useLocalDpi xmlns:a14="http://schemas.microsoft.com/office/drawing/2010/main" val="0"/>
-              </a:ext>
-            </a:extLst>
-          </a:blip>
-          <a:stretch>
-            <a:fillRect/>
-          </a:stretch>
-        </p:blipFill>
+        </p:nvSpPr>
         <p:spPr>
           <a:xfrm>
-            <a:off x="3775821" y="3386894"/>
-            <a:ext cx="2743200" cy="1728683"/>
-          </a:xfrm>
-          <a:prstGeom prst="rect">
-            <a:avLst/>
-          </a:prstGeom>
-        </p:spPr>
-      </p:pic>
-      <p:pic>
-        <p:nvPicPr>
-          <p:cNvPr id="6" name="Picture 5"/>
-          <p:cNvPicPr>
-            <a:picLocks noChangeAspect="1"/>
-          </p:cNvPicPr>
-          <p:nvPr/>
-        </p:nvPicPr>
-        <p:blipFill>
-          <a:blip r:embed="rId4">
-            <a:extLst>
-              <a:ext uri="{28A0092B-C50C-407E-A947-70E740481C1C}">
-                <a14:useLocalDpi xmlns:a14="http://schemas.microsoft.com/office/drawing/2010/main" val="0"/>
-              </a:ext>
-            </a:extLst>
-          </a:blip>
-          <a:stretch>
-            <a:fillRect/>
-          </a:stretch>
-        </p:blipFill>
-        <p:spPr>
-          <a:xfrm>
-            <a:off x="7254102" y="3395009"/>
-            <a:ext cx="2743200" cy="1734576"/>
-          </a:xfrm>
-          <a:prstGeom prst="rect">
-            <a:avLst/>
-          </a:prstGeom>
-        </p:spPr>
-      </p:pic>
-      <p:sp>
-        <p:nvSpPr>
-          <p:cNvPr id="7" name="TextBox 6"/>
-          <p:cNvSpPr txBox="1"/>
-          <p:nvPr/>
-        </p:nvSpPr>
-        <p:spPr>
-          <a:xfrm>
-            <a:off x="890327" y="5280211"/>
-            <a:ext cx="1837765" cy="369332"/>
+            <a:off x="1261872" y="6175552"/>
+            <a:ext cx="1925782" cy="304800"/>
           </a:xfrm>
           <a:prstGeom prst="rect">
             <a:avLst/>
@@ -5469,66 +6928,12 @@
           <a:lstStyle/>
           <a:p>
             <a:r>
-              <a:rPr lang="en-US" dirty="0"/>
-              <a:t>11 * 5 grid line</a:t>
-            </a:r>
-          </a:p>
-        </p:txBody>
-      </p:sp>
-      <p:sp>
-        <p:nvSpPr>
-          <p:cNvPr id="8" name="TextBox 7"/>
-          <p:cNvSpPr txBox="1"/>
-          <p:nvPr/>
-        </p:nvSpPr>
-        <p:spPr>
-          <a:xfrm>
-            <a:off x="4228538" y="5298141"/>
-            <a:ext cx="1837765" cy="369332"/>
-          </a:xfrm>
-          <a:prstGeom prst="rect">
-            <a:avLst/>
-          </a:prstGeom>
-          <a:noFill/>
-        </p:spPr>
-        <p:txBody>
-          <a:bodyPr wrap="square" rtlCol="0">
-            <a:spAutoFit/>
-          </a:bodyPr>
-          <a:lstStyle/>
-          <a:p>
-            <a:r>
-              <a:rPr lang="en-US" dirty="0"/>
-              <a:t>11 * 9 grid line</a:t>
-            </a:r>
-          </a:p>
-        </p:txBody>
-      </p:sp>
-      <p:sp>
-        <p:nvSpPr>
-          <p:cNvPr id="9" name="TextBox 8"/>
-          <p:cNvSpPr txBox="1"/>
-          <p:nvPr/>
-        </p:nvSpPr>
-        <p:spPr>
-          <a:xfrm>
-            <a:off x="7706819" y="5285583"/>
-            <a:ext cx="1912310" cy="369332"/>
-          </a:xfrm>
-          <a:prstGeom prst="rect">
-            <a:avLst/>
-          </a:prstGeom>
-          <a:noFill/>
-        </p:spPr>
-        <p:txBody>
-          <a:bodyPr wrap="square" rtlCol="0">
-            <a:spAutoFit/>
-          </a:bodyPr>
-          <a:lstStyle/>
-          <a:p>
-            <a:r>
-              <a:rPr lang="en-US" dirty="0"/>
-              <a:t>11 * 11 grid line</a:t>
+              <a:rPr lang="en-US" sz="1400" dirty="0" err="1"/>
+              <a:t>Lutteroth</a:t>
+            </a:r>
+            <a:r>
+              <a:rPr lang="en-US" sz="1400" dirty="0"/>
+              <a:t> et al. 2015</a:t>
             </a:r>
           </a:p>
         </p:txBody>
@@ -5536,7 +6941,7 @@
     </p:spTree>
     <p:extLst>
       <p:ext uri="{BB962C8B-B14F-4D97-AF65-F5344CB8AC3E}">
-        <p14:creationId xmlns:p14="http://schemas.microsoft.com/office/powerpoint/2010/main" val="3628369559"/>
+        <p14:creationId xmlns:p14="http://schemas.microsoft.com/office/powerpoint/2010/main" val="393577610"/>
       </p:ext>
     </p:extLst>
   </p:cSld>
@@ -5797,4 +7202,285 @@
     </a:ext>
   </a:extLst>
 </a:theme>
+</file>
+
+<file path=ppt/theme/themeOverride1.xml><?xml version="1.0" encoding="utf-8"?>
+<a:themeOverride xmlns:a="http://schemas.openxmlformats.org/drawingml/2006/main">
+  <a:clrScheme name="Office">
+    <a:dk1>
+      <a:sysClr val="windowText" lastClr="000000"/>
+    </a:dk1>
+    <a:lt1>
+      <a:sysClr val="window" lastClr="FFFFFF"/>
+    </a:lt1>
+    <a:dk2>
+      <a:srgbClr val="1F497D"/>
+    </a:dk2>
+    <a:lt2>
+      <a:srgbClr val="EEECE1"/>
+    </a:lt2>
+    <a:accent1>
+      <a:srgbClr val="4F81BD"/>
+    </a:accent1>
+    <a:accent2>
+      <a:srgbClr val="C0504D"/>
+    </a:accent2>
+    <a:accent3>
+      <a:srgbClr val="9BBB59"/>
+    </a:accent3>
+    <a:accent4>
+      <a:srgbClr val="8064A2"/>
+    </a:accent4>
+    <a:accent5>
+      <a:srgbClr val="4BACC6"/>
+    </a:accent5>
+    <a:accent6>
+      <a:srgbClr val="F79646"/>
+    </a:accent6>
+    <a:hlink>
+      <a:srgbClr val="0000FF"/>
+    </a:hlink>
+    <a:folHlink>
+      <a:srgbClr val="800080"/>
+    </a:folHlink>
+  </a:clrScheme>
+  <a:fontScheme name="Office">
+    <a:majorFont>
+      <a:latin typeface="Cambria" panose="020F0302020204030204"/>
+      <a:ea typeface=""/>
+      <a:cs typeface=""/>
+      <a:font script="Jpan" typeface="ＭＳ Ｐゴシック"/>
+      <a:font script="Hang" typeface="맑은 고딕"/>
+      <a:font script="Hans" typeface="宋体"/>
+      <a:font script="Hant" typeface="新細明體"/>
+      <a:font script="Arab" typeface="Times New Roman"/>
+      <a:font script="Hebr" typeface="Times New Roman"/>
+      <a:font script="Thai" typeface="Tahoma"/>
+      <a:font script="Ethi" typeface="Nyala"/>
+      <a:font script="Beng" typeface="Vrinda"/>
+      <a:font script="Gujr" typeface="Shruti"/>
+      <a:font script="Khmr" typeface="MoolBoran"/>
+      <a:font script="Knda" typeface="Tunga"/>
+      <a:font script="Guru" typeface="Raavi"/>
+      <a:font script="Cans" typeface="Euphemia"/>
+      <a:font script="Cher" typeface="Plantagenet Cherokee"/>
+      <a:font script="Yiii" typeface="Microsoft Yi Baiti"/>
+      <a:font script="Tibt" typeface="Microsoft Himalaya"/>
+      <a:font script="Thaa" typeface="MV Boli"/>
+      <a:font script="Deva" typeface="Mangal"/>
+      <a:font script="Telu" typeface="Gautami"/>
+      <a:font script="Taml" typeface="Latha"/>
+      <a:font script="Syrc" typeface="Estrangelo Edessa"/>
+      <a:font script="Orya" typeface="Kalinga"/>
+      <a:font script="Mlym" typeface="Kartika"/>
+      <a:font script="Laoo" typeface="DokChampa"/>
+      <a:font script="Sinh" typeface="Iskoola Pota"/>
+      <a:font script="Mong" typeface="Mongolian Baiti"/>
+      <a:font script="Viet" typeface="Times New Roman"/>
+      <a:font script="Uigh" typeface="Microsoft Uighur"/>
+      <a:font script="Geor" typeface="Sylfaen"/>
+    </a:majorFont>
+    <a:minorFont>
+      <a:latin typeface="Calibri" panose="020F0502020204030204"/>
+      <a:ea typeface=""/>
+      <a:cs typeface=""/>
+      <a:font script="Jpan" typeface="ＭＳ Ｐゴシック"/>
+      <a:font script="Hang" typeface="맑은 고딕"/>
+      <a:font script="Hans" typeface="宋体"/>
+      <a:font script="Hant" typeface="新細明體"/>
+      <a:font script="Arab" typeface="Arial"/>
+      <a:font script="Hebr" typeface="Arial"/>
+      <a:font script="Thai" typeface="Tahoma"/>
+      <a:font script="Ethi" typeface="Nyala"/>
+      <a:font script="Beng" typeface="Vrinda"/>
+      <a:font script="Gujr" typeface="Shruti"/>
+      <a:font script="Khmr" typeface="DaunPenh"/>
+      <a:font script="Knda" typeface="Tunga"/>
+      <a:font script="Guru" typeface="Raavi"/>
+      <a:font script="Cans" typeface="Euphemia"/>
+      <a:font script="Cher" typeface="Plantagenet Cherokee"/>
+      <a:font script="Yiii" typeface="Microsoft Yi Baiti"/>
+      <a:font script="Tibt" typeface="Microsoft Himalaya"/>
+      <a:font script="Thaa" typeface="MV Boli"/>
+      <a:font script="Deva" typeface="Mangal"/>
+      <a:font script="Telu" typeface="Gautami"/>
+      <a:font script="Taml" typeface="Latha"/>
+      <a:font script="Syrc" typeface="Estrangelo Edessa"/>
+      <a:font script="Orya" typeface="Kalinga"/>
+      <a:font script="Mlym" typeface="Kartika"/>
+      <a:font script="Laoo" typeface="DokChampa"/>
+      <a:font script="Sinh" typeface="Iskoola Pota"/>
+      <a:font script="Mong" typeface="Mongolian Baiti"/>
+      <a:font script="Viet" typeface="Arial"/>
+      <a:font script="Uigh" typeface="Microsoft Uighur"/>
+      <a:font script="Geor" typeface="Sylfaen"/>
+    </a:minorFont>
+  </a:fontScheme>
+  <a:fmtScheme name="Office">
+    <a:fillStyleLst>
+      <a:solidFill>
+        <a:schemeClr val="phClr"/>
+      </a:solidFill>
+      <a:gradFill rotWithShape="1">
+        <a:gsLst>
+          <a:gs pos="0">
+            <a:schemeClr val="phClr">
+              <a:tint val="50000"/>
+              <a:satMod val="300000"/>
+            </a:schemeClr>
+          </a:gs>
+          <a:gs pos="35000">
+            <a:schemeClr val="phClr">
+              <a:tint val="37000"/>
+              <a:satMod val="300000"/>
+            </a:schemeClr>
+          </a:gs>
+          <a:gs pos="100000">
+            <a:schemeClr val="phClr">
+              <a:tint val="15000"/>
+              <a:satMod val="350000"/>
+            </a:schemeClr>
+          </a:gs>
+        </a:gsLst>
+        <a:lin ang="16200000" scaled="1"/>
+      </a:gradFill>
+      <a:gradFill rotWithShape="1">
+        <a:gsLst>
+          <a:gs pos="0">
+            <a:schemeClr val="phClr">
+              <a:shade val="51000"/>
+              <a:satMod val="130000"/>
+            </a:schemeClr>
+          </a:gs>
+          <a:gs pos="80000">
+            <a:schemeClr val="phClr">
+              <a:shade val="93000"/>
+              <a:satMod val="130000"/>
+            </a:schemeClr>
+          </a:gs>
+          <a:gs pos="100000">
+            <a:schemeClr val="phClr">
+              <a:shade val="94000"/>
+              <a:satMod val="135000"/>
+            </a:schemeClr>
+          </a:gs>
+        </a:gsLst>
+        <a:lin ang="16200000" scaled="0"/>
+      </a:gradFill>
+    </a:fillStyleLst>
+    <a:lnStyleLst>
+      <a:ln w="9525" cap="flat" cmpd="sng" algn="ctr">
+        <a:solidFill>
+          <a:schemeClr val="phClr">
+            <a:shade val="95000"/>
+            <a:satMod val="105000"/>
+          </a:schemeClr>
+        </a:solidFill>
+        <a:prstDash val="solid"/>
+      </a:ln>
+      <a:ln w="25400" cap="flat" cmpd="sng" algn="ctr">
+        <a:solidFill>
+          <a:schemeClr val="phClr"/>
+        </a:solidFill>
+        <a:prstDash val="solid"/>
+      </a:ln>
+      <a:ln w="38100" cap="flat" cmpd="sng" algn="ctr">
+        <a:solidFill>
+          <a:schemeClr val="phClr"/>
+        </a:solidFill>
+        <a:prstDash val="solid"/>
+      </a:ln>
+    </a:lnStyleLst>
+    <a:effectStyleLst>
+      <a:effectStyle>
+        <a:effectLst>
+          <a:outerShdw blurRad="40000" dist="20000" dir="5400000" rotWithShape="0">
+            <a:srgbClr val="000000">
+              <a:alpha val="38000"/>
+            </a:srgbClr>
+          </a:outerShdw>
+        </a:effectLst>
+      </a:effectStyle>
+      <a:effectStyle>
+        <a:effectLst>
+          <a:outerShdw blurRad="40000" dist="23000" dir="5400000" rotWithShape="0">
+            <a:srgbClr val="000000">
+              <a:alpha val="35000"/>
+            </a:srgbClr>
+          </a:outerShdw>
+        </a:effectLst>
+      </a:effectStyle>
+      <a:effectStyle>
+        <a:effectLst>
+          <a:outerShdw blurRad="40000" dist="23000" dir="5400000" rotWithShape="0">
+            <a:srgbClr val="000000">
+              <a:alpha val="35000"/>
+            </a:srgbClr>
+          </a:outerShdw>
+        </a:effectLst>
+        <a:scene3d>
+          <a:camera prst="orthographicFront">
+            <a:rot lat="0" lon="0" rev="0"/>
+          </a:camera>
+          <a:lightRig rig="threePt" dir="t">
+            <a:rot lat="0" lon="0" rev="1200000"/>
+          </a:lightRig>
+        </a:scene3d>
+        <a:sp3d>
+          <a:bevelT w="63500" h="25400"/>
+        </a:sp3d>
+      </a:effectStyle>
+    </a:effectStyleLst>
+    <a:bgFillStyleLst>
+      <a:solidFill>
+        <a:schemeClr val="phClr"/>
+      </a:solidFill>
+      <a:gradFill rotWithShape="1">
+        <a:gsLst>
+          <a:gs pos="0">
+            <a:schemeClr val="phClr">
+              <a:tint val="40000"/>
+              <a:satMod val="350000"/>
+            </a:schemeClr>
+          </a:gs>
+          <a:gs pos="40000">
+            <a:schemeClr val="phClr">
+              <a:tint val="45000"/>
+              <a:shade val="99000"/>
+              <a:satMod val="350000"/>
+            </a:schemeClr>
+          </a:gs>
+          <a:gs pos="100000">
+            <a:schemeClr val="phClr">
+              <a:shade val="20000"/>
+              <a:satMod val="255000"/>
+            </a:schemeClr>
+          </a:gs>
+        </a:gsLst>
+        <a:path path="circle">
+          <a:fillToRect l="50000" t="-80000" r="50000" b="180000"/>
+        </a:path>
+      </a:gradFill>
+      <a:gradFill rotWithShape="1">
+        <a:gsLst>
+          <a:gs pos="0">
+            <a:schemeClr val="phClr">
+              <a:tint val="80000"/>
+              <a:satMod val="300000"/>
+            </a:schemeClr>
+          </a:gs>
+          <a:gs pos="100000">
+            <a:schemeClr val="phClr">
+              <a:shade val="30000"/>
+              <a:satMod val="200000"/>
+            </a:schemeClr>
+          </a:gs>
+        </a:gsLst>
+        <a:path path="circle">
+          <a:fillToRect l="50000" t="50000" r="50000" b="50000"/>
+        </a:path>
+      </a:gradFill>
+    </a:bgFillStyleLst>
+  </a:fmtScheme>
+</a:themeOverride>
 </file>
</xml_diff>

<commit_message>
most updated version ppt
midterm presentation most updated version
</commit_message>
<xml_diff>
--- a/MidtermPresentation/MidtermPresentation.pptx
+++ b/MidtermPresentation/MidtermPresentation.pptx
@@ -18,8 +18,8 @@
     <p:sldId id="270" r:id="rId12"/>
     <p:sldId id="278" r:id="rId13"/>
     <p:sldId id="272" r:id="rId14"/>
-    <p:sldId id="273" r:id="rId15"/>
-    <p:sldId id="264" r:id="rId16"/>
+    <p:sldId id="279" r:id="rId15"/>
+    <p:sldId id="280" r:id="rId16"/>
     <p:sldId id="274" r:id="rId17"/>
   </p:sldIdLst>
   <p:sldSz cx="12192000" cy="6858000"/>
@@ -232,11 +232,11 @@
           <c:showBubbleSize val="0"/>
         </c:dLbls>
         <c:smooth val="0"/>
-        <c:axId val="2146871792"/>
-        <c:axId val="2146966592"/>
+        <c:axId val="2123078784"/>
+        <c:axId val="2144979056"/>
       </c:lineChart>
       <c:catAx>
-        <c:axId val="2146871792"/>
+        <c:axId val="2123078784"/>
         <c:scaling>
           <c:orientation val="minMax"/>
         </c:scaling>
@@ -326,7 +326,7 @@
             <a:endParaRPr lang="en-US"/>
           </a:p>
         </c:txPr>
-        <c:crossAx val="2146966592"/>
+        <c:crossAx val="2144979056"/>
         <c:crosses val="autoZero"/>
         <c:auto val="1"/>
         <c:lblAlgn val="ctr"/>
@@ -334,7 +334,7 @@
         <c:noMultiLvlLbl val="0"/>
       </c:catAx>
       <c:valAx>
-        <c:axId val="2146966592"/>
+        <c:axId val="2144979056"/>
         <c:scaling>
           <c:orientation val="minMax"/>
         </c:scaling>
@@ -432,7 +432,7 @@
             <a:endParaRPr lang="en-US"/>
           </a:p>
         </c:txPr>
-        <c:crossAx val="2146871792"/>
+        <c:crossAx val="2123078784"/>
         <c:crosses val="autoZero"/>
         <c:crossBetween val="between"/>
       </c:valAx>
@@ -5393,14 +5393,26 @@
             <p:ph type="title"/>
           </p:nvPr>
         </p:nvSpPr>
-        <p:spPr/>
+        <p:spPr>
+          <a:xfrm>
+            <a:off x="1261872" y="448409"/>
+            <a:ext cx="9692640" cy="1855176"/>
+          </a:xfrm>
+        </p:spPr>
         <p:txBody>
           <a:bodyPr/>
           <a:lstStyle/>
           <a:p>
             <a:r>
               <a:rPr lang="en-US" dirty="0"/>
-              <a:t>Experiment on Spacing between Interactors </a:t>
+              <a:t>Experiment on Spacing between</a:t>
+            </a:r>
+            <a:br>
+              <a:rPr lang="en-US" dirty="0"/>
+            </a:br>
+            <a:r>
+              <a:rPr lang="en-US" dirty="0"/>
+              <a:t>			Interactors</a:t>
             </a:r>
           </a:p>
         </p:txBody>
@@ -5415,14 +5427,68 @@
             <p:ph idx="1"/>
           </p:nvPr>
         </p:nvSpPr>
-        <p:spPr/>
+        <p:spPr>
+          <a:xfrm>
+            <a:off x="1261872" y="2004646"/>
+            <a:ext cx="8595360" cy="3815007"/>
+          </a:xfrm>
+        </p:spPr>
         <p:txBody>
           <a:bodyPr/>
           <a:lstStyle/>
           <a:p>
-            <a:r>
-              <a:rPr lang="en-US" dirty="0"/>
-              <a:t>SUHAS</a:t>
+            <a:pPr marL="0" indent="0">
+              <a:buNone/>
+            </a:pPr>
+            <a:endParaRPr lang="en-US" dirty="0"/>
+          </a:p>
+          <a:p>
+            <a:pPr algn="just"/>
+            <a:r>
+              <a:rPr lang="en-US" dirty="0"/>
+              <a:t>Goal: Determine reasonable spacing between Interactors. </a:t>
+            </a:r>
+          </a:p>
+          <a:p>
+            <a:pPr algn="just"/>
+            <a:r>
+              <a:rPr lang="en-US" dirty="0"/>
+              <a:t>Setup by placing space between text in various lengths:</a:t>
+            </a:r>
+          </a:p>
+          <a:p>
+            <a:pPr lvl="1" algn="just"/>
+            <a:r>
+              <a:rPr lang="en-US" dirty="0"/>
+              <a:t>Length in centimeters: 0.25, 0.5, 0.75, 1, 1.25, ….. 3.</a:t>
+            </a:r>
+          </a:p>
+          <a:p>
+            <a:pPr algn="just"/>
+            <a:r>
+              <a:rPr lang="en-US" dirty="0"/>
+              <a:t>Ask participants to read segment of text to determine the right amount of  spacing required to activate the text, to achieve higher accuracy. </a:t>
+            </a:r>
+          </a:p>
+          <a:p>
+            <a:pPr algn="just"/>
+            <a:r>
+              <a:rPr lang="en-US" dirty="0"/>
+              <a:t>Participants rate user experience on likely scale of 1 to 5</a:t>
+            </a:r>
+          </a:p>
+          <a:p>
+            <a:pPr lvl="1" algn="just"/>
+            <a:r>
+              <a:rPr lang="en-US" dirty="0"/>
+              <a:t>Require participants to provide feedback explaining choice of space.</a:t>
+            </a:r>
+          </a:p>
+          <a:p>
+            <a:pPr lvl="1" algn="just"/>
+            <a:r>
+              <a:rPr lang="en-US" dirty="0"/>
+              <a:t>Plan to choose average amount as acceptable spacing between Interactors.</a:t>
             </a:r>
           </a:p>
         </p:txBody>
@@ -5430,7 +5496,7 @@
     </p:spTree>
     <p:extLst>
       <p:ext uri="{BB962C8B-B14F-4D97-AF65-F5344CB8AC3E}">
-        <p14:creationId xmlns:p14="http://schemas.microsoft.com/office/powerpoint/2010/main" val="3194865933"/>
+        <p14:creationId xmlns:p14="http://schemas.microsoft.com/office/powerpoint/2010/main" val="865622118"/>
       </p:ext>
     </p:extLst>
   </p:cSld>
@@ -5494,45 +5560,106 @@
           <a:bodyPr/>
           <a:lstStyle/>
           <a:p>
-            <a:r>
-              <a:rPr lang="en-US" dirty="0"/>
-              <a:t>Show what you have accomplished thus far</a:t>
-            </a:r>
-          </a:p>
-          <a:p>
-            <a:r>
-              <a:rPr lang="en-US" dirty="0"/>
-              <a:t>I expect to see the basic functionality of your system up and running</a:t>
-            </a:r>
-          </a:p>
-          <a:p>
+            <a:pPr algn="just"/>
+            <a:r>
+              <a:rPr lang="en-US" dirty="0"/>
+              <a:t>We have accomplished following so far.</a:t>
+            </a:r>
+          </a:p>
+          <a:p>
+            <a:pPr lvl="1" algn="just"/>
+            <a:endParaRPr lang="en-US" sz="1800" dirty="0"/>
+          </a:p>
+          <a:p>
+            <a:pPr lvl="1" algn="just"/>
+            <a:r>
+              <a:rPr lang="en-US" sz="1800" dirty="0"/>
+              <a:t> Highlighting and changing the color of the text inside a Grid, through Gaze. </a:t>
+            </a:r>
+          </a:p>
+          <a:p>
+            <a:pPr lvl="2" algn="just"/>
+            <a:r>
+              <a:rPr lang="en-US" sz="1600" dirty="0"/>
+              <a:t>Dimension of Grid is 11x9.</a:t>
+            </a:r>
+          </a:p>
+          <a:p>
+            <a:pPr lvl="2" algn="just"/>
+            <a:r>
+              <a:rPr lang="en-US" sz="1600" dirty="0"/>
+              <a:t>Reset the Grid to Start Again, through Gaze.</a:t>
+            </a:r>
+          </a:p>
+          <a:p>
+            <a:pPr lvl="2" algn="just"/>
+            <a:r>
+              <a:rPr lang="en-US" sz="1600" dirty="0"/>
+              <a:t>Close the Grid, through Gaze.</a:t>
+            </a:r>
+          </a:p>
+          <a:p>
+            <a:pPr lvl="1" algn="just"/>
             <a:endParaRPr lang="en-US" dirty="0"/>
           </a:p>
           <a:p>
-            <a:r>
-              <a:rPr lang="en-US" dirty="0"/>
-              <a:t>SUHAS</a:t>
-            </a:r>
-          </a:p>
-          <a:p>
+            <a:pPr lvl="1" algn="just"/>
             <a:endParaRPr lang="en-US" dirty="0"/>
           </a:p>
           <a:p>
-            <a:r>
-              <a:rPr lang="en-US" dirty="0" err="1"/>
-              <a:t>Suhas</a:t>
-            </a:r>
-            <a:r>
-              <a:rPr lang="en-US" dirty="0"/>
-              <a:t>’ computer</a:t>
-            </a:r>
+            <a:pPr lvl="1" algn="just"/>
+            <a:r>
+              <a:rPr lang="en-US" sz="1800" dirty="0"/>
+              <a:t>Highlighting the text in a story mode on Windows Form. </a:t>
+            </a:r>
+          </a:p>
+          <a:p>
+            <a:pPr lvl="2" algn="just"/>
+            <a:r>
+              <a:rPr lang="en-US" sz="1600" dirty="0"/>
+              <a:t>Navigation to next page, through Gaze with delay.</a:t>
+            </a:r>
+          </a:p>
+          <a:p>
+            <a:pPr lvl="2" algn="just"/>
+            <a:r>
+              <a:rPr lang="en-US" sz="1600" dirty="0"/>
+              <a:t>Closing the application, through Gaze with delay. </a:t>
+            </a:r>
+          </a:p>
+          <a:p>
+            <a:pPr lvl="2"/>
+            <a:endParaRPr lang="en-US" dirty="0"/>
+          </a:p>
+          <a:p>
+            <a:pPr marL="274320" lvl="1" indent="0">
+              <a:buNone/>
+            </a:pPr>
+            <a:endParaRPr lang="en-US" dirty="0"/>
+          </a:p>
+          <a:p>
+            <a:pPr lvl="2"/>
+            <a:endParaRPr lang="en-US" dirty="0"/>
+          </a:p>
+          <a:p>
+            <a:pPr lvl="2"/>
+            <a:endParaRPr lang="en-US" dirty="0"/>
+          </a:p>
+          <a:p>
+            <a:pPr marL="548640" lvl="2" indent="0">
+              <a:buNone/>
+            </a:pPr>
+            <a:endParaRPr lang="en-US" dirty="0"/>
+          </a:p>
+          <a:p>
+            <a:endParaRPr lang="en-US" dirty="0"/>
           </a:p>
         </p:txBody>
       </p:sp>
     </p:spTree>
     <p:extLst>
       <p:ext uri="{BB962C8B-B14F-4D97-AF65-F5344CB8AC3E}">
-        <p14:creationId xmlns:p14="http://schemas.microsoft.com/office/powerpoint/2010/main" val="4098738424"/>
+        <p14:creationId xmlns:p14="http://schemas.microsoft.com/office/powerpoint/2010/main" val="795722301"/>
       </p:ext>
     </p:extLst>
   </p:cSld>

</xml_diff>